<commit_message>
updated chapter 3 notes
</commit_message>
<xml_diff>
--- a/lecture_notes/chapter3/chapter3.pptx
+++ b/lecture_notes/chapter3/chapter3.pptx
@@ -228,6 +228,7 @@
 <p1510:revInfo xmlns:a="http://schemas.openxmlformats.org/drawingml/2006/main" xmlns:r="http://schemas.openxmlformats.org/officeDocument/2006/relationships" xmlns:p1510="http://schemas.microsoft.com/office/powerpoint/2015/10/main">
   <p1510:revLst>
     <p1510:client id="{2BF3FD1A-385D-DB41-A50E-ACE98A5EE503}" v="13" dt="2026-01-26T05:42:08.839"/>
+    <p1510:client id="{B551FABF-F8DF-464C-9646-57D3EE45E185}" v="21" dt="2026-01-26T19:10:27.274"/>
     <p1510:client id="{FAAE65A1-11D4-8041-95F4-9EE00B79E438}" v="15" dt="2026-01-26T04:25:19.948"/>
   </p1510:revLst>
 </p1510:revInfo>
@@ -235,6 +236,370 @@
 
 <file path=ppt/changesInfos/changesInfo1.xml><?xml version="1.0" encoding="utf-8"?>
 <pc:chgInfo xmlns:a="http://schemas.openxmlformats.org/drawingml/2006/main" xmlns:r="http://schemas.openxmlformats.org/officeDocument/2006/relationships" xmlns:ac="http://schemas.microsoft.com/office/drawing/2013/main/command" xmlns:pc="http://schemas.microsoft.com/office/powerpoint/2013/main/command">
+  <pc:docChgLst>
+    <pc:chgData name="Toby Donaldson" userId="2e6e5431-bb17-4c41-9985-d39c50d83c73" providerId="ADAL" clId="{F31BC264-820E-54C4-A6D1-F92AF9CC222E}"/>
+    <pc:docChg chg="undo custSel modSld">
+      <pc:chgData name="Toby Donaldson" userId="2e6e5431-bb17-4c41-9985-d39c50d83c73" providerId="ADAL" clId="{F31BC264-820E-54C4-A6D1-F92AF9CC222E}" dt="2026-01-26T19:10:27.274" v="269"/>
+      <pc:docMkLst>
+        <pc:docMk/>
+      </pc:docMkLst>
+      <pc:sldChg chg="modSp mod">
+        <pc:chgData name="Toby Donaldson" userId="2e6e5431-bb17-4c41-9985-d39c50d83c73" providerId="ADAL" clId="{F31BC264-820E-54C4-A6D1-F92AF9CC222E}" dt="2026-01-26T17:27:09.553" v="0" actId="20577"/>
+        <pc:sldMkLst>
+          <pc:docMk/>
+          <pc:sldMk cId="3113156551" sldId="256"/>
+        </pc:sldMkLst>
+        <pc:spChg chg="mod">
+          <ac:chgData name="Toby Donaldson" userId="2e6e5431-bb17-4c41-9985-d39c50d83c73" providerId="ADAL" clId="{F31BC264-820E-54C4-A6D1-F92AF9CC222E}" dt="2026-01-26T17:27:09.553" v="0" actId="20577"/>
+          <ac:spMkLst>
+            <pc:docMk/>
+            <pc:sldMk cId="3113156551" sldId="256"/>
+            <ac:spMk id="4" creationId="{1C211242-B5A3-D371-4A7A-C8E9982D7CD5}"/>
+          </ac:spMkLst>
+        </pc:spChg>
+      </pc:sldChg>
+      <pc:sldChg chg="addSp">
+        <pc:chgData name="Toby Donaldson" userId="2e6e5431-bb17-4c41-9985-d39c50d83c73" providerId="ADAL" clId="{F31BC264-820E-54C4-A6D1-F92AF9CC222E}" dt="2026-01-26T18:00:46.162" v="1"/>
+        <pc:sldMkLst>
+          <pc:docMk/>
+          <pc:sldMk cId="1732205588" sldId="302"/>
+        </pc:sldMkLst>
+        <pc:inkChg chg="add">
+          <ac:chgData name="Toby Donaldson" userId="2e6e5431-bb17-4c41-9985-d39c50d83c73" providerId="ADAL" clId="{F31BC264-820E-54C4-A6D1-F92AF9CC222E}" dt="2026-01-26T18:00:46.162" v="1"/>
+          <ac:inkMkLst>
+            <pc:docMk/>
+            <pc:sldMk cId="1732205588" sldId="302"/>
+            <ac:inkMk id="6" creationId="{7525F485-C60F-9B81-0507-E92A5BA7E0B8}"/>
+          </ac:inkMkLst>
+        </pc:inkChg>
+      </pc:sldChg>
+      <pc:sldChg chg="addSp">
+        <pc:chgData name="Toby Donaldson" userId="2e6e5431-bb17-4c41-9985-d39c50d83c73" providerId="ADAL" clId="{F31BC264-820E-54C4-A6D1-F92AF9CC222E}" dt="2026-01-26T18:00:46.162" v="1"/>
+        <pc:sldMkLst>
+          <pc:docMk/>
+          <pc:sldMk cId="4097905578" sldId="303"/>
+        </pc:sldMkLst>
+        <pc:inkChg chg="add">
+          <ac:chgData name="Toby Donaldson" userId="2e6e5431-bb17-4c41-9985-d39c50d83c73" providerId="ADAL" clId="{F31BC264-820E-54C4-A6D1-F92AF9CC222E}" dt="2026-01-26T18:00:46.162" v="1"/>
+          <ac:inkMkLst>
+            <pc:docMk/>
+            <pc:sldMk cId="4097905578" sldId="303"/>
+            <ac:inkMk id="2" creationId="{BB5A0492-1B02-1A32-7E35-CB46037ECB04}"/>
+          </ac:inkMkLst>
+        </pc:inkChg>
+      </pc:sldChg>
+      <pc:sldChg chg="addSp">
+        <pc:chgData name="Toby Donaldson" userId="2e6e5431-bb17-4c41-9985-d39c50d83c73" providerId="ADAL" clId="{F31BC264-820E-54C4-A6D1-F92AF9CC222E}" dt="2026-01-26T18:00:46.162" v="1"/>
+        <pc:sldMkLst>
+          <pc:docMk/>
+          <pc:sldMk cId="3573607454" sldId="306"/>
+        </pc:sldMkLst>
+        <pc:inkChg chg="add">
+          <ac:chgData name="Toby Donaldson" userId="2e6e5431-bb17-4c41-9985-d39c50d83c73" providerId="ADAL" clId="{F31BC264-820E-54C4-A6D1-F92AF9CC222E}" dt="2026-01-26T18:00:46.162" v="1"/>
+          <ac:inkMkLst>
+            <pc:docMk/>
+            <pc:sldMk cId="3573607454" sldId="306"/>
+            <ac:inkMk id="2" creationId="{DA8BCBCF-429B-2BEA-8060-E24277374D2B}"/>
+          </ac:inkMkLst>
+        </pc:inkChg>
+      </pc:sldChg>
+      <pc:sldChg chg="addSp">
+        <pc:chgData name="Toby Donaldson" userId="2e6e5431-bb17-4c41-9985-d39c50d83c73" providerId="ADAL" clId="{F31BC264-820E-54C4-A6D1-F92AF9CC222E}" dt="2026-01-26T18:00:46.162" v="1"/>
+        <pc:sldMkLst>
+          <pc:docMk/>
+          <pc:sldMk cId="2375367705" sldId="328"/>
+        </pc:sldMkLst>
+        <pc:inkChg chg="add">
+          <ac:chgData name="Toby Donaldson" userId="2e6e5431-bb17-4c41-9985-d39c50d83c73" providerId="ADAL" clId="{F31BC264-820E-54C4-A6D1-F92AF9CC222E}" dt="2026-01-26T18:00:46.162" v="1"/>
+          <ac:inkMkLst>
+            <pc:docMk/>
+            <pc:sldMk cId="2375367705" sldId="328"/>
+            <ac:inkMk id="9" creationId="{C8FEEEAD-1F46-E126-4E6A-2BCF89A95167}"/>
+          </ac:inkMkLst>
+        </pc:inkChg>
+      </pc:sldChg>
+      <pc:sldChg chg="addSp delSp modSp mod">
+        <pc:chgData name="Toby Donaldson" userId="2e6e5431-bb17-4c41-9985-d39c50d83c73" providerId="ADAL" clId="{F31BC264-820E-54C4-A6D1-F92AF9CC222E}" dt="2026-01-26T19:08:29.338" v="253" actId="313"/>
+        <pc:sldMkLst>
+          <pc:docMk/>
+          <pc:sldMk cId="3424091404" sldId="349"/>
+        </pc:sldMkLst>
+        <pc:spChg chg="add del mod">
+          <ac:chgData name="Toby Donaldson" userId="2e6e5431-bb17-4c41-9985-d39c50d83c73" providerId="ADAL" clId="{F31BC264-820E-54C4-A6D1-F92AF9CC222E}" dt="2026-01-26T19:08:02.617" v="226" actId="21"/>
+          <ac:spMkLst>
+            <pc:docMk/>
+            <pc:sldMk cId="3424091404" sldId="349"/>
+            <ac:spMk id="3" creationId="{ED4A5FC3-3592-AED5-3DA8-448BAAD37ECD}"/>
+          </ac:spMkLst>
+        </pc:spChg>
+        <pc:spChg chg="add del mod">
+          <ac:chgData name="Toby Donaldson" userId="2e6e5431-bb17-4c41-9985-d39c50d83c73" providerId="ADAL" clId="{F31BC264-820E-54C4-A6D1-F92AF9CC222E}" dt="2026-01-26T19:08:02.617" v="226" actId="21"/>
+          <ac:spMkLst>
+            <pc:docMk/>
+            <pc:sldMk cId="3424091404" sldId="349"/>
+            <ac:spMk id="5" creationId="{FD401CF1-9BC4-E33E-34DA-467919123E1F}"/>
+          </ac:spMkLst>
+        </pc:spChg>
+        <pc:spChg chg="add del mod">
+          <ac:chgData name="Toby Donaldson" userId="2e6e5431-bb17-4c41-9985-d39c50d83c73" providerId="ADAL" clId="{F31BC264-820E-54C4-A6D1-F92AF9CC222E}" dt="2026-01-26T19:08:02.617" v="226" actId="21"/>
+          <ac:spMkLst>
+            <pc:docMk/>
+            <pc:sldMk cId="3424091404" sldId="349"/>
+            <ac:spMk id="6" creationId="{DDC0CA87-906F-55EF-A75E-29FF5E38EAEE}"/>
+          </ac:spMkLst>
+        </pc:spChg>
+        <pc:spChg chg="mod">
+          <ac:chgData name="Toby Donaldson" userId="2e6e5431-bb17-4c41-9985-d39c50d83c73" providerId="ADAL" clId="{F31BC264-820E-54C4-A6D1-F92AF9CC222E}" dt="2026-01-26T19:08:29.338" v="253" actId="313"/>
+          <ac:spMkLst>
+            <pc:docMk/>
+            <pc:sldMk cId="3424091404" sldId="349"/>
+            <ac:spMk id="8" creationId="{EBF13AB2-5AD9-06A3-8878-8C7D218D0FE8}"/>
+          </ac:spMkLst>
+        </pc:spChg>
+        <pc:spChg chg="mod">
+          <ac:chgData name="Toby Donaldson" userId="2e6e5431-bb17-4c41-9985-d39c50d83c73" providerId="ADAL" clId="{F31BC264-820E-54C4-A6D1-F92AF9CC222E}" dt="2026-01-26T19:08:13.344" v="229" actId="20577"/>
+          <ac:spMkLst>
+            <pc:docMk/>
+            <pc:sldMk cId="3424091404" sldId="349"/>
+            <ac:spMk id="10" creationId="{1E9732CF-CCC7-9A45-5C3F-AD20710202D3}"/>
+          </ac:spMkLst>
+        </pc:spChg>
+        <pc:inkChg chg="add del">
+          <ac:chgData name="Toby Donaldson" userId="2e6e5431-bb17-4c41-9985-d39c50d83c73" providerId="ADAL" clId="{F31BC264-820E-54C4-A6D1-F92AF9CC222E}" dt="2026-01-26T19:05:22.256" v="28" actId="21"/>
+          <ac:inkMkLst>
+            <pc:docMk/>
+            <pc:sldMk cId="3424091404" sldId="349"/>
+            <ac:inkMk id="2" creationId="{5AC1A167-78C3-B1EB-0C06-C5EB3DB9A9AB}"/>
+          </ac:inkMkLst>
+        </pc:inkChg>
+      </pc:sldChg>
+      <pc:sldChg chg="modSp mod">
+        <pc:chgData name="Toby Donaldson" userId="2e6e5431-bb17-4c41-9985-d39c50d83c73" providerId="ADAL" clId="{F31BC264-820E-54C4-A6D1-F92AF9CC222E}" dt="2026-01-26T19:08:49.135" v="255" actId="122"/>
+        <pc:sldMkLst>
+          <pc:docMk/>
+          <pc:sldMk cId="4047988885" sldId="350"/>
+        </pc:sldMkLst>
+        <pc:spChg chg="mod">
+          <ac:chgData name="Toby Donaldson" userId="2e6e5431-bb17-4c41-9985-d39c50d83c73" providerId="ADAL" clId="{F31BC264-820E-54C4-A6D1-F92AF9CC222E}" dt="2026-01-26T19:08:43.846" v="254"/>
+          <ac:spMkLst>
+            <pc:docMk/>
+            <pc:sldMk cId="4047988885" sldId="350"/>
+            <ac:spMk id="8" creationId="{7F1FC73A-BD70-4F9F-9DF1-3A2D449C19B9}"/>
+          </ac:spMkLst>
+        </pc:spChg>
+        <pc:spChg chg="mod">
+          <ac:chgData name="Toby Donaldson" userId="2e6e5431-bb17-4c41-9985-d39c50d83c73" providerId="ADAL" clId="{F31BC264-820E-54C4-A6D1-F92AF9CC222E}" dt="2026-01-26T19:08:49.135" v="255" actId="122"/>
+          <ac:spMkLst>
+            <pc:docMk/>
+            <pc:sldMk cId="4047988885" sldId="350"/>
+            <ac:spMk id="10" creationId="{81F4909D-7E95-24DF-593D-2BD363EDAF09}"/>
+          </ac:spMkLst>
+        </pc:spChg>
+      </pc:sldChg>
+      <pc:sldChg chg="modSp mod">
+        <pc:chgData name="Toby Donaldson" userId="2e6e5431-bb17-4c41-9985-d39c50d83c73" providerId="ADAL" clId="{F31BC264-820E-54C4-A6D1-F92AF9CC222E}" dt="2026-01-26T19:09:00.472" v="257" actId="122"/>
+        <pc:sldMkLst>
+          <pc:docMk/>
+          <pc:sldMk cId="3726468053" sldId="351"/>
+        </pc:sldMkLst>
+        <pc:spChg chg="mod">
+          <ac:chgData name="Toby Donaldson" userId="2e6e5431-bb17-4c41-9985-d39c50d83c73" providerId="ADAL" clId="{F31BC264-820E-54C4-A6D1-F92AF9CC222E}" dt="2026-01-26T19:08:55.793" v="256"/>
+          <ac:spMkLst>
+            <pc:docMk/>
+            <pc:sldMk cId="3726468053" sldId="351"/>
+            <ac:spMk id="8" creationId="{2732C568-9F9C-0E9B-20B7-1AC8D98B005F}"/>
+          </ac:spMkLst>
+        </pc:spChg>
+        <pc:spChg chg="mod">
+          <ac:chgData name="Toby Donaldson" userId="2e6e5431-bb17-4c41-9985-d39c50d83c73" providerId="ADAL" clId="{F31BC264-820E-54C4-A6D1-F92AF9CC222E}" dt="2026-01-26T19:09:00.472" v="257" actId="122"/>
+          <ac:spMkLst>
+            <pc:docMk/>
+            <pc:sldMk cId="3726468053" sldId="351"/>
+            <ac:spMk id="10" creationId="{781E5070-F8B5-75E7-E2FB-D3FBDEEFDA72}"/>
+          </ac:spMkLst>
+        </pc:spChg>
+      </pc:sldChg>
+      <pc:sldChg chg="addSp modSp mod">
+        <pc:chgData name="Toby Donaldson" userId="2e6e5431-bb17-4c41-9985-d39c50d83c73" providerId="ADAL" clId="{F31BC264-820E-54C4-A6D1-F92AF9CC222E}" dt="2026-01-26T19:09:25.234" v="260"/>
+        <pc:sldMkLst>
+          <pc:docMk/>
+          <pc:sldMk cId="1966231317" sldId="352"/>
+        </pc:sldMkLst>
+        <pc:spChg chg="mod">
+          <ac:chgData name="Toby Donaldson" userId="2e6e5431-bb17-4c41-9985-d39c50d83c73" providerId="ADAL" clId="{F31BC264-820E-54C4-A6D1-F92AF9CC222E}" dt="2026-01-26T19:09:25.234" v="260"/>
+          <ac:spMkLst>
+            <pc:docMk/>
+            <pc:sldMk cId="1966231317" sldId="352"/>
+            <ac:spMk id="8" creationId="{3E4C639E-C9C9-2259-9B1A-DE3F11D1A0FF}"/>
+          </ac:spMkLst>
+        </pc:spChg>
+        <pc:spChg chg="mod">
+          <ac:chgData name="Toby Donaldson" userId="2e6e5431-bb17-4c41-9985-d39c50d83c73" providerId="ADAL" clId="{F31BC264-820E-54C4-A6D1-F92AF9CC222E}" dt="2026-01-26T19:09:10.928" v="258" actId="122"/>
+          <ac:spMkLst>
+            <pc:docMk/>
+            <pc:sldMk cId="1966231317" sldId="352"/>
+            <ac:spMk id="10" creationId="{9C003066-34E4-0177-5670-176E7793C03C}"/>
+          </ac:spMkLst>
+        </pc:spChg>
+        <pc:inkChg chg="add">
+          <ac:chgData name="Toby Donaldson" userId="2e6e5431-bb17-4c41-9985-d39c50d83c73" providerId="ADAL" clId="{F31BC264-820E-54C4-A6D1-F92AF9CC222E}" dt="2026-01-26T18:00:46.162" v="1"/>
+          <ac:inkMkLst>
+            <pc:docMk/>
+            <pc:sldMk cId="1966231317" sldId="352"/>
+            <ac:inkMk id="12" creationId="{8CB4EF3D-790C-C835-087D-CC0B3DBFC0BE}"/>
+          </ac:inkMkLst>
+        </pc:inkChg>
+      </pc:sldChg>
+      <pc:sldChg chg="addSp modSp mod">
+        <pc:chgData name="Toby Donaldson" userId="2e6e5431-bb17-4c41-9985-d39c50d83c73" providerId="ADAL" clId="{F31BC264-820E-54C4-A6D1-F92AF9CC222E}" dt="2026-01-26T19:09:37.605" v="262" actId="122"/>
+        <pc:sldMkLst>
+          <pc:docMk/>
+          <pc:sldMk cId="209797261" sldId="353"/>
+        </pc:sldMkLst>
+        <pc:spChg chg="mod">
+          <ac:chgData name="Toby Donaldson" userId="2e6e5431-bb17-4c41-9985-d39c50d83c73" providerId="ADAL" clId="{F31BC264-820E-54C4-A6D1-F92AF9CC222E}" dt="2026-01-26T19:09:32.828" v="261"/>
+          <ac:spMkLst>
+            <pc:docMk/>
+            <pc:sldMk cId="209797261" sldId="353"/>
+            <ac:spMk id="8" creationId="{D79770E6-EA68-5D63-91CE-23982775952B}"/>
+          </ac:spMkLst>
+        </pc:spChg>
+        <pc:spChg chg="mod">
+          <ac:chgData name="Toby Donaldson" userId="2e6e5431-bb17-4c41-9985-d39c50d83c73" providerId="ADAL" clId="{F31BC264-820E-54C4-A6D1-F92AF9CC222E}" dt="2026-01-26T19:09:37.605" v="262" actId="122"/>
+          <ac:spMkLst>
+            <pc:docMk/>
+            <pc:sldMk cId="209797261" sldId="353"/>
+            <ac:spMk id="10" creationId="{2B7D724B-FA0B-B17F-272A-DEFD28C78296}"/>
+          </ac:spMkLst>
+        </pc:spChg>
+        <pc:inkChg chg="add">
+          <ac:chgData name="Toby Donaldson" userId="2e6e5431-bb17-4c41-9985-d39c50d83c73" providerId="ADAL" clId="{F31BC264-820E-54C4-A6D1-F92AF9CC222E}" dt="2026-01-26T18:00:46.162" v="1"/>
+          <ac:inkMkLst>
+            <pc:docMk/>
+            <pc:sldMk cId="209797261" sldId="353"/>
+            <ac:inkMk id="16" creationId="{9B2B3945-84E3-4E41-3541-D3F1BDA21295}"/>
+          </ac:inkMkLst>
+        </pc:inkChg>
+      </pc:sldChg>
+      <pc:sldChg chg="addSp modSp">
+        <pc:chgData name="Toby Donaldson" userId="2e6e5431-bb17-4c41-9985-d39c50d83c73" providerId="ADAL" clId="{F31BC264-820E-54C4-A6D1-F92AF9CC222E}" dt="2026-01-26T19:09:53.512" v="263"/>
+        <pc:sldMkLst>
+          <pc:docMk/>
+          <pc:sldMk cId="2138968120" sldId="354"/>
+        </pc:sldMkLst>
+        <pc:spChg chg="mod">
+          <ac:chgData name="Toby Donaldson" userId="2e6e5431-bb17-4c41-9985-d39c50d83c73" providerId="ADAL" clId="{F31BC264-820E-54C4-A6D1-F92AF9CC222E}" dt="2026-01-26T19:09:53.512" v="263"/>
+          <ac:spMkLst>
+            <pc:docMk/>
+            <pc:sldMk cId="2138968120" sldId="354"/>
+            <ac:spMk id="8" creationId="{78242C90-4079-CC54-4105-863C63F52FDC}"/>
+          </ac:spMkLst>
+        </pc:spChg>
+        <pc:spChg chg="mod">
+          <ac:chgData name="Toby Donaldson" userId="2e6e5431-bb17-4c41-9985-d39c50d83c73" providerId="ADAL" clId="{F31BC264-820E-54C4-A6D1-F92AF9CC222E}" dt="2026-01-26T19:03:19.957" v="2"/>
+          <ac:spMkLst>
+            <pc:docMk/>
+            <pc:sldMk cId="2138968120" sldId="354"/>
+            <ac:spMk id="18" creationId="{33778CFF-73F2-588D-45A8-1B75C430F6CC}"/>
+          </ac:spMkLst>
+        </pc:spChg>
+        <pc:inkChg chg="add">
+          <ac:chgData name="Toby Donaldson" userId="2e6e5431-bb17-4c41-9985-d39c50d83c73" providerId="ADAL" clId="{F31BC264-820E-54C4-A6D1-F92AF9CC222E}" dt="2026-01-26T18:00:46.162" v="1"/>
+          <ac:inkMkLst>
+            <pc:docMk/>
+            <pc:sldMk cId="2138968120" sldId="354"/>
+            <ac:inkMk id="10" creationId="{6C07CB9B-B47A-02A0-1D75-0A47F96213EE}"/>
+          </ac:inkMkLst>
+        </pc:inkChg>
+      </pc:sldChg>
+      <pc:sldChg chg="addSp modSp mod">
+        <pc:chgData name="Toby Donaldson" userId="2e6e5431-bb17-4c41-9985-d39c50d83c73" providerId="ADAL" clId="{F31BC264-820E-54C4-A6D1-F92AF9CC222E}" dt="2026-01-26T19:10:05.105" v="265" actId="122"/>
+        <pc:sldMkLst>
+          <pc:docMk/>
+          <pc:sldMk cId="3628936488" sldId="355"/>
+        </pc:sldMkLst>
+        <pc:spChg chg="mod">
+          <ac:chgData name="Toby Donaldson" userId="2e6e5431-bb17-4c41-9985-d39c50d83c73" providerId="ADAL" clId="{F31BC264-820E-54C4-A6D1-F92AF9CC222E}" dt="2026-01-26T19:09:59.817" v="264"/>
+          <ac:spMkLst>
+            <pc:docMk/>
+            <pc:sldMk cId="3628936488" sldId="355"/>
+            <ac:spMk id="8" creationId="{C77F9965-6A34-72C4-FE7B-49BA4630C2F1}"/>
+          </ac:spMkLst>
+        </pc:spChg>
+        <pc:spChg chg="mod">
+          <ac:chgData name="Toby Donaldson" userId="2e6e5431-bb17-4c41-9985-d39c50d83c73" providerId="ADAL" clId="{F31BC264-820E-54C4-A6D1-F92AF9CC222E}" dt="2026-01-26T19:03:31.427" v="3"/>
+          <ac:spMkLst>
+            <pc:docMk/>
+            <pc:sldMk cId="3628936488" sldId="355"/>
+            <ac:spMk id="19" creationId="{3AE23573-7525-28ED-0E2D-D2EEE3F60AA3}"/>
+          </ac:spMkLst>
+        </pc:spChg>
+        <pc:spChg chg="mod">
+          <ac:chgData name="Toby Donaldson" userId="2e6e5431-bb17-4c41-9985-d39c50d83c73" providerId="ADAL" clId="{F31BC264-820E-54C4-A6D1-F92AF9CC222E}" dt="2026-01-26T19:10:05.105" v="265" actId="122"/>
+          <ac:spMkLst>
+            <pc:docMk/>
+            <pc:sldMk cId="3628936488" sldId="355"/>
+            <ac:spMk id="20" creationId="{E2810027-EFBA-E0B9-38D0-90E166F9AE63}"/>
+          </ac:spMkLst>
+        </pc:spChg>
+        <pc:inkChg chg="add">
+          <ac:chgData name="Toby Donaldson" userId="2e6e5431-bb17-4c41-9985-d39c50d83c73" providerId="ADAL" clId="{F31BC264-820E-54C4-A6D1-F92AF9CC222E}" dt="2026-01-26T18:00:46.162" v="1"/>
+          <ac:inkMkLst>
+            <pc:docMk/>
+            <pc:sldMk cId="3628936488" sldId="355"/>
+            <ac:inkMk id="3" creationId="{36179C37-6CCD-D4C6-08D1-D9CEFCF03F5E}"/>
+          </ac:inkMkLst>
+        </pc:inkChg>
+      </pc:sldChg>
+      <pc:sldChg chg="addSp delSp modSp mod">
+        <pc:chgData name="Toby Donaldson" userId="2e6e5431-bb17-4c41-9985-d39c50d83c73" providerId="ADAL" clId="{F31BC264-820E-54C4-A6D1-F92AF9CC222E}" dt="2026-01-26T19:10:27.274" v="269"/>
+        <pc:sldMkLst>
+          <pc:docMk/>
+          <pc:sldMk cId="4284578572" sldId="356"/>
+        </pc:sldMkLst>
+        <pc:spChg chg="mod">
+          <ac:chgData name="Toby Donaldson" userId="2e6e5431-bb17-4c41-9985-d39c50d83c73" providerId="ADAL" clId="{F31BC264-820E-54C4-A6D1-F92AF9CC222E}" dt="2026-01-26T19:10:09.627" v="266"/>
+          <ac:spMkLst>
+            <pc:docMk/>
+            <pc:sldMk cId="4284578572" sldId="356"/>
+            <ac:spMk id="8" creationId="{F5BD96D3-6CBF-866F-BA2C-D0A5CF16406E}"/>
+          </ac:spMkLst>
+        </pc:spChg>
+        <pc:spChg chg="mod">
+          <ac:chgData name="Toby Donaldson" userId="2e6e5431-bb17-4c41-9985-d39c50d83c73" providerId="ADAL" clId="{F31BC264-820E-54C4-A6D1-F92AF9CC222E}" dt="2026-01-26T19:10:27.274" v="269"/>
+          <ac:spMkLst>
+            <pc:docMk/>
+            <pc:sldMk cId="4284578572" sldId="356"/>
+            <ac:spMk id="9" creationId="{67726028-2AC8-A022-A0DF-148EE9C7FED7}"/>
+          </ac:spMkLst>
+        </pc:spChg>
+        <pc:spChg chg="mod">
+          <ac:chgData name="Toby Donaldson" userId="2e6e5431-bb17-4c41-9985-d39c50d83c73" providerId="ADAL" clId="{F31BC264-820E-54C4-A6D1-F92AF9CC222E}" dt="2026-01-26T19:03:39.156" v="4"/>
+          <ac:spMkLst>
+            <pc:docMk/>
+            <pc:sldMk cId="4284578572" sldId="356"/>
+            <ac:spMk id="18" creationId="{AF83B70D-016B-FAC8-28B6-866D5EAD583E}"/>
+          </ac:spMkLst>
+        </pc:spChg>
+        <pc:inkChg chg="add del">
+          <ac:chgData name="Toby Donaldson" userId="2e6e5431-bb17-4c41-9985-d39c50d83c73" providerId="ADAL" clId="{F31BC264-820E-54C4-A6D1-F92AF9CC222E}" dt="2026-01-26T19:10:13.472" v="267" actId="21"/>
+          <ac:inkMkLst>
+            <pc:docMk/>
+            <pc:sldMk cId="4284578572" sldId="356"/>
+            <ac:inkMk id="12" creationId="{3905B010-A453-B22B-ECDF-95791E688901}"/>
+          </ac:inkMkLst>
+        </pc:inkChg>
+        <pc:inkChg chg="add mod">
+          <ac:chgData name="Toby Donaldson" userId="2e6e5431-bb17-4c41-9985-d39c50d83c73" providerId="ADAL" clId="{F31BC264-820E-54C4-A6D1-F92AF9CC222E}" dt="2026-01-26T19:10:16.350" v="268"/>
+          <ac:inkMkLst>
+            <pc:docMk/>
+            <pc:sldMk cId="4284578572" sldId="356"/>
+            <ac:inkMk id="13" creationId="{DE74E998-0342-6B31-0A7A-7D280BBF7BC8}"/>
+          </ac:inkMkLst>
+        </pc:inkChg>
+      </pc:sldChg>
+    </pc:docChg>
+  </pc:docChgLst>
   <pc:docChgLst>
     <pc:chgData name="Toby Donaldson" userId="2e6e5431-bb17-4c41-9985-d39c50d83c73" providerId="ADAL" clId="{7F9681A8-EEE2-56F4-9B39-ECCBEE0471AC}"/>
     <pc:docChg chg="undo custSel addSld delSld modSld sldOrd addSection delSection modSection">
@@ -1197,6 +1562,264 @@
 </pc:chgInfo>
 </file>
 
+<file path=ppt/ink/ink1.xml><?xml version="1.0" encoding="utf-8"?>
+<inkml:ink xmlns:inkml="http://www.w3.org/2003/InkML">
+  <inkml:definitions>
+    <inkml:context xml:id="ctx0">
+      <inkml:inkSource xml:id="inkSrc0">
+        <inkml:traceFormat>
+          <inkml:channel name="X" type="integer" min="-2.14748E9" max="2.14748E9" units="cm"/>
+          <inkml:channel name="Y" type="integer" min="-2.14748E9" max="2.14748E9" units="cm"/>
+          <inkml:channel name="F" type="integer" max="32767" units="dev"/>
+        </inkml:traceFormat>
+        <inkml:channelProperties>
+          <inkml:channelProperty channel="X" name="resolution" value="1000" units="1/cm"/>
+          <inkml:channelProperty channel="Y" name="resolution" value="1000" units="1/cm"/>
+          <inkml:channelProperty channel="F" name="resolution" value="0" units="1/dev"/>
+        </inkml:channelProperties>
+      </inkml:inkSource>
+      <inkml:timestamp xml:id="ts0" timeString="2026-01-26T17:43:34.394"/>
+    </inkml:context>
+    <inkml:brush xml:id="br0">
+      <inkml:brushProperty name="width" value="0.05292" units="cm"/>
+      <inkml:brushProperty name="height" value="0.05292" units="cm"/>
+      <inkml:brushProperty name="color" value="#FF0000"/>
+    </inkml:brush>
+  </inkml:definitions>
+  <inkml:trace contextRef="#ctx0" brushRef="#br0">13740 8206 24575,'13'0'0,"2"0"0,1 0 0,-1 0 0,1 0 0,-1 0 0,-1 0 0,-2 0 0,-2 0 0,-1 0 0,-1 0 0,1 0 0,0 0 0,2 0 0,-2 0 0,-1 0 0,1 0 0,-1 0 0,0-2 0,1 1 0,-2 0 0,2-1 0,-2 2 0,-1 0 0,-3 0 0,-1 0 0</inkml:trace>
+  <inkml:trace contextRef="#ctx0" brushRef="#br0" timeOffset="2349">14319 8174 24575,'5'0'0,"4"0"0,-1 0 0,3 0 0,-3 0 0,1 0 0,-2 0 0,1 0 0,0 0 0,1 0 0,3 0 0,1 0 0,2 0 0,2 0 0,2 0 0,-1 0 0,-2 0 0,-1 0 0,-4 0 0,0 0 0,-1 0 0,-1 0 0,-2 0 0,0 0 0,-5 0 0,1 0 0</inkml:trace>
+  <inkml:trace contextRef="#ctx0" brushRef="#br0" timeOffset="25048">9467 9694 24575,'17'0'0,"6"0"0,9 0 0,1 0 0,-2 0 0,-4 0 0,-4 0 0,-1-2 0,-7 1 0,-1 0 0,-5 0 0,-1-1 0,3 1 0,0-2 0,4-1 0,2 1 0,0-1 0,0 0 0,-2 1 0,-2 0 0,-4 1 0,-4 0 0,-1 1 0</inkml:trace>
+  <inkml:trace contextRef="#ctx0" brushRef="#br0" timeOffset="28315">17522 9461 24575,'7'0'0,"2"0"0,0 0 0,-1 0 0,0 0 0,-1 0 0,-2 0 0,1 0 0,1 0 0,0 0 0,1 0 0,0 0 0,0 0 0,0 0 0,-1 0 0,-1 0 0,-2 0 0,1 0 0,1 0 0,1 0 0,0 0 0,-1 0 0,0 0 0,0 0 0,0 0 0,0-1 0,3 0 0,7-2 0,10-2 0,9-1 0,3-1 0,-6 1 0,-8 2 0,-8 1 0,-7 2 0,-2 0 0,-4 1 0,-2 0 0</inkml:trace>
+</inkml:ink>
+</file>
+
+<file path=ppt/ink/ink2.xml><?xml version="1.0" encoding="utf-8"?>
+<inkml:ink xmlns:inkml="http://www.w3.org/2003/InkML">
+  <inkml:definitions>
+    <inkml:context xml:id="ctx0">
+      <inkml:inkSource xml:id="inkSrc0">
+        <inkml:traceFormat>
+          <inkml:channel name="X" type="integer" min="-2.14748E9" max="2.14748E9" units="cm"/>
+          <inkml:channel name="Y" type="integer" min="-2.14748E9" max="2.14748E9" units="cm"/>
+          <inkml:channel name="F" type="integer" max="32767" units="dev"/>
+        </inkml:traceFormat>
+        <inkml:channelProperties>
+          <inkml:channelProperty channel="X" name="resolution" value="1000" units="1/cm"/>
+          <inkml:channelProperty channel="Y" name="resolution" value="1000" units="1/cm"/>
+          <inkml:channelProperty channel="F" name="resolution" value="0" units="1/dev"/>
+        </inkml:channelProperties>
+      </inkml:inkSource>
+      <inkml:timestamp xml:id="ts0" timeString="2026-01-26T17:45:49.844"/>
+    </inkml:context>
+    <inkml:brush xml:id="br0">
+      <inkml:brushProperty name="width" value="0.05292" units="cm"/>
+      <inkml:brushProperty name="height" value="0.05292" units="cm"/>
+      <inkml:brushProperty name="color" value="#FF0000"/>
+    </inkml:brush>
+  </inkml:definitions>
+  <inkml:trace contextRef="#ctx0" brushRef="#br0">5048 9521 24575,'32'0'0,"-1"0"0,2-1 0,-3-3 0,-4-2 0,-4 0 0,-1 0 0,-2 2 0,3 2 0,1-1 0,6 1 0,3 0 0,6 1 0,0 0 0,-2-1 0,-3-1 0,-5 0 0,0 0 0,-1-1 0,2 1 0,2 0 0,-1 1 0,0 1 0,-2 1 0,-2 0 0,-2 0 0,-2 0 0,-2 0 0,-1 0 0,-2 0 0,-4 0 0,-3 0 0,-2 0 0,-2 0 0,2 0 0,1 0 0,0 0 0,3 0 0,3 0 0,2 0 0,2-1 0,0 0 0,-2-2 0,-4 0 0,-4 0 0,-3 1 0,-1 0 0,1 2 0,5 0 0,4 0 0,3 0 0,-1 0 0,-2 0 0,-8 0 0,-2 0 0</inkml:trace>
+  <inkml:trace contextRef="#ctx0" brushRef="#br0" timeOffset="6766">5024 10568 24575,'7'0'0,"2"0"0,6 0 0,10 0 0,11 0 0,5-1 0,-3-2 0,-8-2 0,-10 0 0,-8 1 0,-4 2 0,5-1 0,11-2 0,14-4 0,-10 3 0,1 0 0,5-2 0,2 1 0,3 0 0,1 0 0,-6 2 0,2 0 0,-3 1 0,2 0 0,-2 0 0,4 1 0,-4 0 0,-8 3 0,-8 0 0,-1 0 0,3 0 0,6 0 0,5 0 0,8 0 0,4 0 0,0 0 0,0 0 0,-8 0 0,-8 0 0,-7 0 0,-8 0 0,-5 0 0,-3 0 0</inkml:trace>
+  <inkml:trace contextRef="#ctx0" brushRef="#br0" timeOffset="8716">5096 11739 24575,'22'0'0,"13"0"0,12 0 0,-19 0 0,1 0 0,-1 0 0,0 0 0,-1 0 0,1 0 0,10 0 0,0 0 0,-7 0 0,0 0 0,7 0 0,-1 0 0,-10 0 0,-1 0 0,20 0 0,-6 0 0,-6 0 0,-6 0 0,-3 0 0,-2 0 0,0 0 0,1 0 0,1 0 0,1 0 0,-2 0 0,-1 0 0,-3 0 0,0 0 0,0 0 0,3 0 0,2 0 0,0 0 0,-3 0 0,-4 0 0,-9 0 0,-4 0 0</inkml:trace>
+  <inkml:trace contextRef="#ctx0" brushRef="#br0" timeOffset="12897">5136 12989 24575,'0'0'0</inkml:trace>
+  <inkml:trace contextRef="#ctx0" brushRef="#br0" timeOffset="14114">6586 12720 24575,'12'0'0,"-6"0"0,-6 0 0,-9 0 0,-1 0 0,0 0 0,6 0 0,0 0 0</inkml:trace>
+  <inkml:trace contextRef="#ctx0" brushRef="#br0" timeOffset="16000">5041 12914 24575,'14'0'0,"7"0"0,14 0 0,12 0 0,-21 0 0,0 0 0,2 0 0,1 0 0,0 0 0,0 0 0,12 0 0,0 0 0,-11 0 0,0 0 0,7 0 0,0 0 0,8 1 0,1 3 0,-3 1 0,0 1 0,0-2 0,1-2 0,1-2 0,0 0 0,1 0 0,-1 0 0,0 0 0,-2 0 0,-8 0 0,-7 0 0,-9 0 0,-9 0 0,-2 0 0,2 0 0,8 0 0,10 0 0,5 0 0,-3 0 0,-7 0 0,-11 1 0,-6 1 0,-4 1 0,-2 2 0,0-2 0,0-1 0</inkml:trace>
+  <inkml:trace contextRef="#ctx0" brushRef="#br0" timeOffset="17649">5208 13888 24575,'26'3'0,"15"-2"0,-13 0 0,2-2 0,4 1 0,2 0 0,2 0 0,2 0 0,1 0 0,0 0 0,2 0 0,0 0 0,-2 0 0,0 0 0,5 0 0,-1 0 0,-12 0 0,-2 0 0,4 0 0,-1 0 0,7 0 0,-6 0 0,-4 0 0,-2 2 0,5-1 0,6 3 0,8-1 0,1-1 0,-6 0 0,-9-2 0,-10 0 0,-8 0 0,-5 1 0,-3 0 0,-2 1 0,-3-1 0,-1 0 0</inkml:trace>
+  <inkml:trace contextRef="#ctx0" brushRef="#br0" timeOffset="41798">15240 8221 24575,'18'0'0,"4"0"0,16 0 0,-5 0 0,12 0 0,-10 0 0,-2-1 0,-1-2 0,-1-1 0,-1 0 0,1-1 0,-3 0 0,-2 0 0,-3 0 0,-2 0 0,0-2 0,0 1 0,0 0 0,3-2 0,2-1 0,-1 0 0,-1-2 0,-6-1 0,-3-2 0,-1-2 0,-3-2 0,1-2 0,0-1 0,0-3 0,1-3 0,0 0 0,2-2 0,1-2 0,2-2 0,-2-3 0,-3 0 0,-5-3 0,-4-6 0,-3 20 0,0 0 0,-1-3 0,0 1 0,0 0 0,0-1 0,-1 3 0,0-1 0,-4-20 0,-5 7 0,-4 6 0,-3 5 0,-3 4 0,-1 0 0,-3 3 0,0 4 0,-2 1 0,1 1 0,0 2 0,-2-2 0,-1 1 0,2 3 0,1 4 0,3 5 0,0 2 0,0 0 0,1 0 0,0 4 0,-1 6 0,-8 9 0,-8 9 0,16-11 0,-1-1 0,0 1 0,0-1 0,2-1 0,1 0 0,-11 11 0,6-2 0,4 1 0,1 6 0,-4 9 0,11-16 0,0 1 0,-1 5 0,1 1 0,-2 4 0,1 1 0,1 2 0,1 1 0,-1 1 0,0 1 0,1-3 0,1-2 0,2-3 0,0-2 0,2-3 0,1-3 0,-1 15 0,4-8 0,3-6 0,0-4 0,0 0 0,0 13 0,0-6 0,2 8 0,2-12 0,4-3 0,2 0 0,1 2 0,2-1 0,-2 1 0,-1-5 0,-1-5 0,-3-5 0,1-5 0,-2-2 0,-1-2 0,1 0 0,-1-1 0,1-2 0,1-4 0,2-1 0,2-3 0,6-1 0,6-2 0,5-1 0,1 1 0,-2 1 0,-5 1 0,-4 2 0,-4 0 0,0 2 0,-1 0 0,1-1 0,-3 2 0,-4 2 0,-4 3 0,-4 1 0,-2 0 0</inkml:trace>
+  <inkml:trace contextRef="#ctx0" brushRef="#br0" timeOffset="45365">6483 15240 24575,'17'26'0,"3"2"0,5 3 0,4-3 0,1-4 0,0-7 0,0-2 0,-2-3 0,-1-3 0,-2-3 0,3-2 0,0-2 0,2-1 0,-1-1 0,-3-1 0,-1-2 0,-4-3 0,-2-3 0,0-3 0,-1-3 0,0-1 0,-3-2 0,-2 2 0,-3 2 0,-2 2 0,-1 0 0,-2-2 0,-1-5 0,-1-6 0,-1-6 0,-1-7 0,-1 0 0,0 1 0,0 5 0,0 9 0,0 6 0,-1 6 0,-1 5 0,-1 3 0,-2 2 0,-1 1 0,0 0 0,-2 0 0,-6 0 0,-2 0 0,-4 0 0,1 0 0,1 0 0,1 0 0,3 0 0,1 0 0,1 0 0,0 3 0,2 0 0,0 2 0,2 2 0,-1-2 0,-1 2 0,-1 0 0,-1 0 0,0 1 0,-3 1 0,-14 9 0,2-1 0,-4 2 0,-10 5 0,-3 1-214,11-6 1,-2 1 0,1-1 213,-1-1 0,1 0 0,1-1 0,-9 3 0,4-2 0,9-5 0,4-2 0,-4 1 0,19-10 0,10-2 0,10-1 0,-6 1 0,5 0 0</inkml:trace>
+</inkml:ink>
+</file>
+
+<file path=ppt/ink/ink3.xml><?xml version="1.0" encoding="utf-8"?>
+<inkml:ink xmlns:inkml="http://www.w3.org/2003/InkML">
+  <inkml:definitions>
+    <inkml:context xml:id="ctx0">
+      <inkml:inkSource xml:id="inkSrc0">
+        <inkml:traceFormat>
+          <inkml:channel name="X" type="integer" min="-2.14748E9" max="2.14748E9" units="cm"/>
+          <inkml:channel name="Y" type="integer" min="-2.14748E9" max="2.14748E9" units="cm"/>
+          <inkml:channel name="F" type="integer" max="32767" units="dev"/>
+        </inkml:traceFormat>
+        <inkml:channelProperties>
+          <inkml:channelProperty channel="X" name="resolution" value="1000" units="1/cm"/>
+          <inkml:channelProperty channel="Y" name="resolution" value="1000" units="1/cm"/>
+          <inkml:channelProperty channel="F" name="resolution" value="0" units="1/dev"/>
+        </inkml:channelProperties>
+      </inkml:inkSource>
+      <inkml:timestamp xml:id="ts0" timeString="2026-01-26T17:48:56.009"/>
+    </inkml:context>
+    <inkml:brush xml:id="br0">
+      <inkml:brushProperty name="width" value="0.05292" units="cm"/>
+      <inkml:brushProperty name="height" value="0.05292" units="cm"/>
+      <inkml:brushProperty name="color" value="#FF0000"/>
+    </inkml:brush>
+  </inkml:definitions>
+  <inkml:trace contextRef="#ctx0" brushRef="#br0">11875 2138 24575,'46'0'0,"-7"0"0,-8 0 0,0 0 0,-5 0 0,-1 0 0,22 0 0,-1 0 0,-2-2 0,-6-1 0,-3-1 0,-7-1 0,-4 0 0,-5 0 0,0-2 0,1 0 0,0 0 0,2 1 0,1-1 0,-1-1 0,-1-4 0,-3-3 0,-3 0 0,-1-1 0,0 2 0,-1-2 0,3-5 0,2-3 0,0-2 0,1 0 0,-3 3 0,-1 4 0,-5 2 0,-4 2 0,-3 1 0,-3-3 0,0 0 0,0-2 0,0 0 0,-1 1 0,-4 2 0,-3 3 0,-5 0 0,-4 1 0,-3-1 0,-2-1 0,-3 1 0,-3 0 0,0 4 0,1 2 0,3 4 0,3 2 0,1 1 0,1 0 0,-2 0 0,1 0 0,-2 0 0,-1 0 0,1 0 0,1 2 0,3 1 0,3 2 0,3 0 0,6-2 0,1-2 0</inkml:trace>
+  <inkml:trace contextRef="#ctx0" brushRef="#br0" timeOffset="2967">1103 2376 24575,'47'0'0,"-19"0"0,1 0 0,8 0 0,2 0 0,3 0 0,0-1 0,2-1 0,2-1 0,0-1 0,2-1 0,-4-1 0,2-2 0,-3 1 0,4 0 0,-2-1 0,-8 2 0,1-1 0,-5 1 0,-6 1 0,-3 0 0,16-4 0,-6 0 0,-6 2 0,-4 2 0,-4 0 0,-2 3 0,-4 0 0,-6 1 0,-2 1 0</inkml:trace>
+  <inkml:trace contextRef="#ctx0" brushRef="#br0" timeOffset="4817">1170 3005 24575,'22'-3'0,"13"1"0,13 2 0,-21 0 0,1 0 0,0 0 0,-1 0 0,-1 0 0,0 0 0,10 0 0,0 0 0,-10 0 0,-1 0 0,6 0 0,-1 0 0,-1 0 0,-8-1 0,-5 0 0,-1-2 0,0 0 0,3 0 0,0 0 0,-1 1 0,-3 1 0,-3 1 0,-3 0 0,-2 0 0,-1-1 0,0 0 0,1-1 0,-1 1 0,0 1 0,0 0 0,1 0 0,2 0 0,0 0 0,1 0 0,-3 0 0,-2 0 0,-1 0 0</inkml:trace>
+  <inkml:trace contextRef="#ctx0" brushRef="#br0" timeOffset="14166">1763 7963 24575,'0'15'0,"0"8"0,0 9 0,0 2 0,0-4 0,0 3 0,0-10 0,0 5 0,0-5 0,0 5 0,0 7 0,0 4 0,0 1 0,0-2 0,0-3 0,0 1 0,0-2 0,0 6 0,0 9 0,0-20 0,0 0 0,0 3 0,0 0 0,0 1 0,0 1 0,0-2 0,0 0 0,0 0 0,0 0 0,-1 1 0,0 0 0,0 2 0,0 1 0,0 2 0,-1 0 0,1 0 0,0 0 0,1-3 0,0 0 0,0-4 0,0-1 0,0-2 0,0 0 0,0 0 0,0 0 0,0 2 0,0 0 0,0 1 0,0-1 0,0 1 0,0-1 0,0 0 0,0-2 0,0 0 0,0-1 0,0 0 0,0 0 0,0 1 0,0-1 0,1 2 0,0 0 0,0 4 0,0 1 0,1 2 0,1 1 0,-1 2 0,0 0 0,-1-1 0,1-1 0,-1-4 0,-1-3 0,0 15 0,0-15 0,0-14 0,0-6 0,0-3 0,0 0 0,0 0 0,0 1 0,0 3 0,0 3 0,0 5 0,0 3 0,0-1 0,0-1 0,0-2 0,0-2 0,0-3 0,0-1 0,0-2 0,0-3 0,0-1 0,0-1 0,0-2 0,0 2 0,0-1 0,0-1 0,0-1 0</inkml:trace>
+  <inkml:trace contextRef="#ctx0" brushRef="#br0" timeOffset="16100">1771 10586 24575,'0'15'0,"0"10"0,0 11 0,0 11 0,0 1 0,0-1 0,0-6 0,0-7 0,0-9 0,0-9 0,0 1 0,0-1 0,0 7 0,0 3 0,0 3 0,0 6 0,0 4 0,0 1 0,0 2 0,0 2 0,0 1 0,0-4 0,0-5 0,-1-11 0,-1-8 0,1-6 0,-1-5 0,1-1 0,0-2 0,0 1 0,1-1 0,0 1 0,0 1 0,0 1 0,0 1 0,0-3 0,0-1 0</inkml:trace>
+  <inkml:trace contextRef="#ctx0" brushRef="#br0" timeOffset="40867">12013 7310 24575,'0'20'0,"0"1"0,0 4 0,0-1 0,1-2 0,1 0 0,3-1 0,1 3 0,2 2 0,4 1 0,2 1 0,4 3 0,3 3 0,3 7 0,-11-19 0,1 2 0,9 14 0,0 0 0,-7-10 0,-1-2 0,5 9 0,-1-4 0,-2-2 0,-4-10 0,-5-7 0,-3-2 0,-1 1 0,1 3 0,4 11 0,4 12 0,-7-14 0,1 2 0,0-1 0,-1 0-820,4 14 1,-5-17 0,-1-13 0</inkml:trace>
+  <inkml:trace contextRef="#ctx0" brushRef="#br0" timeOffset="42033">11521 8002 24575,'27'0'0,"-3"0"0,3 0 0,14 1 0,4-2 0,-7 0 0,2-1 0,1-1-539,2-1 0,0-1 0,0-1 539,-1 0 0,-1-2 0,-1 0 0,-2-2 0,-1 0 0,-2 0 262,9-5 1,-2 0-263,-2 1 0,-2-1 133,-10 3 1,-1 1-134,-1 2 0,-2 1 0,1 0 0,-6 5 825,-11 4-825,-6 1 0,-3-1 0,-3-2 0,3 1 0,-1-1 0</inkml:trace>
+  <inkml:trace contextRef="#ctx0" brushRef="#br0" timeOffset="46330">10951 13841 24575,'24'3'0,"10"-1"0,13-2 0,-20 0 0,0 0 0,0 0 0,1 0 0,0 0 0,1 0 0,-1 0 0,1 0 0,0 0 0,-1 0 0,-1 0 0,0 0 0,22 0 0,-4 0 0,-4 0 0,-7 0 0,1 0 0,-13 0 0,4 0 0,-10-1 0,3-1 0,1-1 0,2 0 0,3 0 0,1 0 0,3 1 0,4 0 0,1 2 0,-1 0 0,-2 0 0,-1-2 0,1-1 0,-1 0 0,-3 0 0,-5 1 0,-9 0 0,-7 2 0,-4-1 0</inkml:trace>
+  <inkml:trace contextRef="#ctx0" brushRef="#br0" timeOffset="48683">11169 13655 24575,'-7'0'0,"-1"1"0,-1 2 0,2 1 0,-1 0 0,1 1 0,0 0 0,-4 2 0,-4 2 0,-4 2 0,-4 0 0,2 0 0,5-2 0,3-2 0,-5 2 0,-12 10 0,8-5 0,-2 3 0,-6 5 0,-1 2 0,-4 3 0,1 1 0,2-1 0,1-1 0,4-2 0,2-2 0,-10 10 0,16-12 0,10-9 0,8-7 0,4-2 0,1-2 0,0 0 0,2 0 0,0 0 0,2 0 0,1 0 0,2 0 0,4 3 0,7 6 0,8 6 0,5 7 0,4 2 0,0 0 0,0-1 0,1-1 0,1 0 0,-1-2 0,-2-2 0,-4-2 0,-4-3 0,-4 0 0,-6-2 0,-5-4 0,-8-3 0,-2-3 0</inkml:trace>
+  <inkml:trace contextRef="#ctx0" brushRef="#br0" timeOffset="71783">1225 2069 24575,'24'0'0,"6"0"0,7 0 0,9 0 0,-21 0 0,2 0 0,19 0 0,3 0 0,-14 0 0,1 0 0,-3-1 0,2 1 0,-2 1 0,-2-1 0,-2 1 0,-1 0 0,-1 1 0,20 2 0,-8 0 0,-6-2 0,-7-2 0,-2 0 0,-1 0 0,-1 0 0,1 0 0,-2 0 0,-3 0 0,-3 0 0,-3 1 0,-2 0 0,0 1 0,1 1 0,-1-2 0,0 1 0,-1-2 0,-1 0 0,-3 0 0,-2 1 0,-2 0 0,-1 2 0,-1 0 0,0 0 0,-1-1 0,1-1 0,0 0 0</inkml:trace>
+  <inkml:trace contextRef="#ctx0" brushRef="#br0" timeOffset="85534">20062 3325 24575,'-8'0'0,"1"0"0,0 0 0,-2 0 0,0 0 0,-2 1 0,-12 11 0,3 0 0,-13 10 0,4-1 0,3-2 0,0-1 0,6-4 0,3-3 0,3-3 0,3-1 0,3-2 0,2-1 0,2-2 0,0 0 0,1 0 0,0 1 0,-1 1 0,0 3 0,-3 1 0,-2 2 0,1 0 0,-1 0 0,1 2 0,1 0 0,1 2 0,0 0 0,0-2 0,2 0 0,1 0 0,0 2 0,0 3 0,0 2 0,0 3 0,0 0 0,1-1 0,1-3 0,1-2 0,0-3 0,0-1 0,0-4 0,0-1 0,0-2 0,1-1 0,1 1 0,2 0 0,2 2 0,1 0 0,1 1 0,1 0 0,-2-2 0,1-1 0,1-1 0,1 0 0,0-1 0,0 1 0,2 0 0,3 2 0,4-2 0,5 1 0,3-2 0,2-1 0,1-1 0,1-1 0,-3 0 0,-1 0 0,-2 0 0,-4 0 0,-4 0 0,-4-1 0,-5 0 0,-2-2 0,-1-1 0,0-2 0,1-1 0,1-2 0,1 2 0,-1 1 0,0 1 0,1 0 0,1-1 0,-1-1 0,2 0 0,-1-1 0,-3 1 0,-1-3 0,-4 0 0,1-7 0,1-2 0,1-4 0,0-3 0,1 1 0,-2 1 0,0 2 0,-2 2 0,-1 3 0,0 0 0,0 1 0,0 3 0,0 0 0,0 1 0,-3-2 0,-2 0 0,-1 1 0,-1 1 0,0 3 0,2 1 0,0 1 0,-1 0 0,0-1 0,0 2 0,0-1 0,0 1 0,2 0 0,1 2 0,0 0 0,0 2 0,0 0 0,-1-1 0,-1 1 0,1 0 0,1-1 0,0 1 0,0-1 0,0 0 0,2 1 0,-1 1 0</inkml:trace>
+  <inkml:trace contextRef="#ctx0" brushRef="#br0" timeOffset="98966">20158 9482 24575,'11'0'0,"9"0"0,0-3 0,13-2 0,1-1 0,2-2 0,-2 2 0,-7 1 0,-7 2 0,-4 1 0,-3 0 0,-2 0 0,-2 0 0,-2-2 0,-3 3 0,-2-1 0</inkml:trace>
+</inkml:ink>
+</file>
+
+<file path=ppt/ink/ink4.xml><?xml version="1.0" encoding="utf-8"?>
+<inkml:ink xmlns:inkml="http://www.w3.org/2003/InkML">
+  <inkml:definitions>
+    <inkml:context xml:id="ctx0">
+      <inkml:inkSource xml:id="inkSrc0">
+        <inkml:traceFormat>
+          <inkml:channel name="X" type="integer" min="-2.14748E9" max="2.14748E9" units="cm"/>
+          <inkml:channel name="Y" type="integer" min="-2.14748E9" max="2.14748E9" units="cm"/>
+          <inkml:channel name="F" type="integer" max="32767" units="dev"/>
+        </inkml:traceFormat>
+        <inkml:channelProperties>
+          <inkml:channelProperty channel="X" name="resolution" value="1000" units="1/cm"/>
+          <inkml:channelProperty channel="Y" name="resolution" value="1000" units="1/cm"/>
+          <inkml:channelProperty channel="F" name="resolution" value="0" units="1/dev"/>
+        </inkml:channelProperties>
+      </inkml:inkSource>
+      <inkml:timestamp xml:id="ts0" timeString="2026-01-26T17:52:47.479"/>
+    </inkml:context>
+    <inkml:brush xml:id="br0">
+      <inkml:brushProperty name="width" value="0.05292" units="cm"/>
+      <inkml:brushProperty name="height" value="0.05292" units="cm"/>
+      <inkml:brushProperty name="color" value="#FF0000"/>
+    </inkml:brush>
+  </inkml:definitions>
+  <inkml:trace contextRef="#ctx0" brushRef="#br0">1611 7464 24575,'35'0'0,"8"0"0,-16 0 0,2 0 0,1 0 0,2 0 0,-1 0 0,0 0 0,1-1 0,0 0 0,-1-1 0,0 0 0,0 0 0,-1-1 0,-2 1 0,2 0 0,8 0 0,0 1 0,-9 1 0,1 0 0,10 0 0,3 0 0,-8 1 0,1-1 0,-2-1 0,6 1 0,0-1 0,-6-1 0,1 1 0,-3 0 0,-2-1 0,-5 0 0,0-2 0,-7 3 0</inkml:trace>
+  <inkml:trace contextRef="#ctx0" brushRef="#br0" timeOffset="2202">13519 7097 24575,'17'2'0,"9"0"0,9-2 0,6 0 0,-2 0 0,6 0 0,-18 0 0,2 0 0,-22 0 0,-3 0 0</inkml:trace>
+  <inkml:trace contextRef="#ctx0" brushRef="#br0" timeOffset="4652">10393 7292 24575,'27'0'0,"16"0"0,-12 0 0,4 0 0,4 0 0,3 0 0,-1 0 0,3 0 0,-2 0 0,-7 0 0,-1 0 0,2 0 0,8 0 0,1 0 0,-2 0 0,3 0 0,-2 0 0,-4 0 0,0 0 0,-2 0 0,-1 0 0,-2 0 0,1 0 0,0 0 0,-1 0 0,0 0 0,1 0 0,-2 0 0,0 0 0,-1 0 0,0 0 0,-1 0 0,0 0 0,2 0 0,-1 0 0,3 0 0,1 0 0,4 0 0,1 0 0,3 0 0,2 0 0,1 0 0,1 0 0,-1 0 0,-1 0 0,-5 0 0,-2 0 0,-7 0 0,-4 0 0,12 0 0,-15 0 0,-12-1 0,-4 0 0,-6 0 0,-3 0 0,-5 1 0,1 0 0,-1 0 0</inkml:trace>
+  <inkml:trace contextRef="#ctx0" brushRef="#br0" timeOffset="15735">4141 8503 24575,'26'0'0,"15"0"0,-11 0 0,3 0 0,3 0 0,1 0 0,3 0 0,2 0 0,1 0 0,1 0 0,-11 0 0,1 0 0,1 0 0,3 0 0,1 0 0,2 0 0,3-1 0,5 1 0,-1-1 0,-3 1 0,0-1 0,-3 0 0,2 0-191,-3 0 1,1 0-1,0-1 1,-4 1 190,8-2 0,-3-1 0,2 1 0,0 0 0,3-1 0,2 2 0,-15 0 0,1 1 0,0 0 0,0 0 0,0 0 0,0 0 0,-1 0 0,0 1 0,0-1-31,13-1 0,0-1 31,-2 1 0,1-1 0,-14 1 0,0 0 0,1 0-231,2 0 0,1 1 0,0-1 231,2 1 0,1 0 0,-1 0 0,1 0 0,-1 0 0,0 1 0,-1 0 0,0 0 0,0 0 0,3 0 0,0 0 0,0 0 0,2 0 0,0 0 0,1 0 0,1 0 0,0 0 0,0 0 0,-1 0 0,1 0 0,-1 0 0,-3 0 0,0 0 0,-1 0 0,-1 0 0,-1 0 0,-1 0 0,-1 0 0,-1 0 0,0 0 0,15 0 0,-1 0 0,0-1 0,-1-1 0,1 1 0,0-2 0,-15 2 0,1-1 0,0 0 0,0 0 0,1 0 0,-1-1 0,0 1 0,0-1 0,1 1 0,-1 0 0,2 0 0,-1-1 0,2 0 0,1 0 0,0 0 0,2-1 0,1 1 0,1-1-413,-7 1 0,2-1 0,0 0 0,1 0 413,3 0 0,0-1 0,1 0 0,1 1 0,3-1 0,1 1 0,1 0 0,0 0-322,-7 0 1,0 1-1,1-1 1,0 1-1,-1 0 322,1 0 0,-1 1 0,1-1 0,-1 0 0,1 1 0,-2-1 0,1 1 0,-1-1 0,0 1 0,0 0 0,8-1 0,-1 0 0,0 1 0,0-1 0,-1 1 0,0 0 0,-1 0 0,0 0-363,0 0 0,0 1 1,-1 0-1,1-1 363,0 1 0,0 1 0,0-1 0,-1 0 0,1 1 0,0-1 0,-1 1 0,1 0 0,-2-1 0,0 1 0,1 1 0,-2-1 0,-1 0 0,0 0 0,0 0 0,-1 0 0,-1 0 0,-1 0 0,1 0 0,1 0 0,0 0 0,1 0 0,1 0 0,-1 0 0,-2 0 0,1 0 0,-2 0 0,0 0 0,4 0 0,-3 0 0,4 0 0,1 0 0,0 0 0,-1 0 0,-4 0 0,1 0 0,-2 0 0,-1 0 0,2 0 0,6 0 0,3 0 0,-1 0 0,-3 0-40,2 0 1,-2 0 0,-1 0 39,-1 0 0,0 0 0,1 0 0,0 0 0,1 0 0,0 0 0,1 0 0,1 0 0,0 0 0,-1 0 0,0 0 0,1 0 0,0 0 0,0 0 0,0 0 0,-1 0 0,1 0 0,-1 0 0,-1 0 0,-1 0 0,0 0 0,1 0 0,-1 0 0,0 0 0,-2 0 0,-1 0 0,1 0 0,-2 0 0,1 0 0,-1 0 0,-1 0 0,-1-1 0,0 2 390,-2-1 0,-1 1 1,0 0-391,14 1 0,0 0 0,-2 2 0,0-1 0,-1 1 0,1 0 0,2-1 0,0 0 0,-16-1 0,1 1 0,0-1 0,15 1 0,-1 0 0,-2 1 0,-3-1 1109,-4 0 1,-3 0-1110,-8-1 0,-2 0 1844,10 1-1844,-15-1 876,-8-1-876,-7 0 236,-2-1-236,0 2 0,1-1 0,2-1 0,4 1 0,2 1 0,1 0 0,0-1 0,-2-1 0,-3 1 0,-3 1 0,-3 1 0,-3 0 0,0-1 0,0-1 0</inkml:trace>
+  <inkml:trace contextRef="#ctx0" brushRef="#br0" timeOffset="32868">6485 8908 24575,'5'-2'0,"9"0"0,13 2 0,17 0 0,-17 0 0,2 0 0,0 0 0,-1 0 0,0 0 0,0 0 0,-1 0 0,1 0 0,2 0 0,2 0 0,15 0 0,2 0 0,-13 0 0,1 0 0,8 0 0,-1 0 0,-18 0 0,-2 0 0,22 0 0,2 0 0,-22-2 0,-1 0 0,1 0 0,-1-1 0,23-3 0,-7 0 0,-4 1 0,3-2 0,6 0 0,-7 1 0,2 0 0,-8 1 0,0 1 0,12-3 0,1 0 0,-13 0 0,0 1 0,-1-2 0,1 0 0,1 0 0,0-1 0,-1-1 0,0 1 0,0-1 0,0 0 0,0 0 0,1 0 0,12-4 0,0 0 0,-11 3 0,0 1 0,8-3 0,-1 1 0,-15 4 0,-2 2 0,23-2 0,0 4 0,-22 2 0,0 0 0,2 1 0,0-1 0,1 0 0,-1 0 0,0-1 0,0 0 0,-2 0 0,-1 0 0,23-3 0,1 1 0,-24 3 0,0-1 0,2 1 0,0-1 0,2-1 0,1 0 0,3-1 0,1 0 0,4-1 0,1 0 0,4 1 0,1 0 0,3 1 0,0 1 0,1 1 0,1 1 0,-2 1 0,0 0 0,-2-1 0,-2 2 0,-2 0 0,-1 2 0,-4-1 0,-1 1 0,-3 0 0,0 1 0,-3-1 0,-1-1 0,-2 0 0,-1-1 0,22 0 0,-3-1 0,-1 0 0,-1 0 0,-2 0 0,0 1 0,-3 2 0,0 3 0,-2 1 0,2 1 0,0-1 0,1 1 0,1-1 0,2-2 0,-2 1 0,-5-1 0,-7-1 0,-9 0 0,-7 0 0,-5 0 0,-3 0 0,-3 1 0,1-1 0,-1 1 0,0 0 0,-3 0 0,2-1 0,-1-2 0</inkml:trace>
+  <inkml:trace contextRef="#ctx0" brushRef="#br0" timeOffset="100369">8190 11284 24575,'15'0'0,"10"0"0,18 0 0,-16 0 0,0 0 0,-1 0 0,1 0 0,19 0 0,-9 0 0,-7 0 0,5 0 0,-11 0 0,4 0 0,-10 0 0,1 0 0,5-2 0,5 0 0,7-2 0,2-2 0,0 2 0,-3-1 0,-7 2 0,-4-1 0,-3 0 0,1 1 0,0 0 0,-2 2 0,-4 1 0,-8 0 0,-3 0 0</inkml:trace>
+  <inkml:trace contextRef="#ctx0" brushRef="#br0" timeOffset="102669">10172 11266 24575,'21'0'0,"1"0"0,0 0 0,12 0 0,-8 0 0,8 0 0,-14 0 0,-5 0 0,-4 0 0,-2 0 0,4 0 0,-2 0 0,6 0 0,-3 0 0,0 0 0,1 0 0,-1 0 0,2 0 0,2 0 0,-1 0 0,-1 0 0,-2 0 0,-5 1 0,-4 1 0,-3 1 0,-1 0 0,2-1 0,3-1 0,6-1 0,3 0 0,3 0 0,-2 0 0,-3 0 0,-1 0 0,-2 0 0,0 0 0,-2 1 0,-2 1 0,-4-1 0,-2 0 0</inkml:trace>
+</inkml:ink>
+</file>
+
+<file path=ppt/ink/ink5.xml><?xml version="1.0" encoding="utf-8"?>
+<inkml:ink xmlns:inkml="http://www.w3.org/2003/InkML">
+  <inkml:definitions>
+    <inkml:context xml:id="ctx0">
+      <inkml:inkSource xml:id="inkSrc0">
+        <inkml:traceFormat>
+          <inkml:channel name="X" type="integer" min="-2.14748E9" max="2.14748E9" units="cm"/>
+          <inkml:channel name="Y" type="integer" min="-2.14748E9" max="2.14748E9" units="cm"/>
+          <inkml:channel name="F" type="integer" max="32767" units="dev"/>
+        </inkml:traceFormat>
+        <inkml:channelProperties>
+          <inkml:channelProperty channel="X" name="resolution" value="1000" units="1/cm"/>
+          <inkml:channelProperty channel="Y" name="resolution" value="1000" units="1/cm"/>
+          <inkml:channelProperty channel="F" name="resolution" value="0" units="1/dev"/>
+        </inkml:channelProperties>
+      </inkml:inkSource>
+      <inkml:timestamp xml:id="ts0" timeString="2026-01-26T17:56:56.780"/>
+    </inkml:context>
+    <inkml:brush xml:id="br0">
+      <inkml:brushProperty name="width" value="0.05292" units="cm"/>
+      <inkml:brushProperty name="height" value="0.05292" units="cm"/>
+      <inkml:brushProperty name="color" value="#FF0000"/>
+    </inkml:brush>
+  </inkml:definitions>
+  <inkml:trace contextRef="#ctx0" brushRef="#br0">11248 11461 24575,'16'-3'0,"17"1"0,-7 2 0,4 0 0,5 0 0,1 0 0,3 0 0,-1 0 0,-3 0 0,0 0 0,-4 0 0,-1 0 0,1 0 0,-2 0 0,7 0 0,-1 0 0,-22 0 0,-3 0 0,-2 0 0,0 0 0,0 0 0,1 0 0,0 0 0,-2 0 0,-1 0 0,-2 0 0,-2 0 0,-2 0 0</inkml:trace>
+</inkml:ink>
+</file>
+
+<file path=ppt/ink/ink6.xml><?xml version="1.0" encoding="utf-8"?>
+<inkml:ink xmlns:inkml="http://www.w3.org/2003/InkML">
+  <inkml:definitions>
+    <inkml:context xml:id="ctx0">
+      <inkml:inkSource xml:id="inkSrc0">
+        <inkml:traceFormat>
+          <inkml:channel name="X" type="integer" min="-2.14748E9" max="2.14748E9" units="cm"/>
+          <inkml:channel name="Y" type="integer" min="-2.14748E9" max="2.14748E9" units="cm"/>
+          <inkml:channel name="F" type="integer" max="32767" units="dev"/>
+        </inkml:traceFormat>
+        <inkml:channelProperties>
+          <inkml:channelProperty channel="X" name="resolution" value="1000" units="1/cm"/>
+          <inkml:channelProperty channel="Y" name="resolution" value="1000" units="1/cm"/>
+          <inkml:channelProperty channel="F" name="resolution" value="0" units="1/dev"/>
+        </inkml:channelProperties>
+      </inkml:inkSource>
+      <inkml:timestamp xml:id="ts0" timeString="2026-01-26T17:57:10.281"/>
+    </inkml:context>
+    <inkml:brush xml:id="br0">
+      <inkml:brushProperty name="width" value="0.05292" units="cm"/>
+      <inkml:brushProperty name="height" value="0.05292" units="cm"/>
+      <inkml:brushProperty name="color" value="#FF0000"/>
+    </inkml:brush>
+  </inkml:definitions>
+  <inkml:trace contextRef="#ctx0" brushRef="#br0">3845 7518 24575,'-12'0'0,"-6"0"0,-6 0 0,-4 0 0,0 0 0,0 0 0,2 0 0,1 0 0,4 0 0,-4 0 0,6 0 0,-7 0 0,6 0 0,-3 0 0,-6 0 0,-14 0 0,15 0 0,-1 0 0,-1 0 0,0 0 0,3 0 0,1 0 0,-11 0 0,17 1 0,11 1 0,6 3 0,3 3 0,-1 1 0,2 3 0,1 3 0,2 7 0,1 10 0,1 12 0,-3-17 0,0 1 0,1 4 0,-1 0 0,1 3 0,0 1 0,1 2 0,-1 1 0,0 3 0,0-1 0,0 3 0,-1-1 0,1-1 0,-1 0 0,0-2 0,-1-2 0,0-1 0,0 0 0,-1-3 0,0 0 0,-1-2 0,1 1 0,0-1 0,0-1 0,0 1 0,0 1 0,0 2 0,0 1 0,0 3 0,-1 0 0,1 3 0,-2 1 0,1 1 0,0 0 0,0 1 0,0 0 0,0 2 0,0 0-247,0 1 0,0 1 247,1-15 0,-1 2 0,-1 0 0,1 2 0,-1 1 0,0 1 0,-1 1 0,1 1 0,-2 0 0,1 3 0,-1 0 0,0 0 0,-1-1 0,1 0 0,-1-1 0,1-2 0,-1 0 0,1-1 0,-1-4 0,1 0 0,0-1 0,-1 11 0,0-2 0,0-6 0,1-1 0,0-5 0,1-2 0,0-2 0,0 0 0,0 0 0,-1 0 0,1 2 0,0 0 0,0 4 0,0 1 247,-1 2 0,0 1-247,-1 2 0,1 0 0,-2 2 0,0 1 0,-1 1 0,0 0 0,-1 0 0,1 0 0,-1-2 0,-1-1 0,2-3 0,1-2 0,0-6 0,2-3 0,-3 12 0,5-16 0,0-11 0,1-4 0,0-2 0,0 0 0,0 10 0,-3 14 0,-1 14 0,1-18 0,0 0 0,-3 19 0,3-12 0,1-13 0,3-10 0,1-5 0,3-4 0,10-1 0,11 0 0,14 0 0,8 0 0,-23 0 0,1 0 0,2 0 0,-1 0 0,1 0 0,0 0 0,2 0 0,1 0 0,1 0 0,0 0 0,1 0 0,-1 0 0,-2 0 0,-1 0 0,-2 1 0,-2 0 0,19 1 0,-8 1 0,-5 2 0,-4 0 0,-1 1 0,-4-1 0,-4-2 0,-6-1 0,-6 0 0,-3 1 0,-2 2 0,-1-2 0,0-1 0</inkml:trace>
+</inkml:ink>
+</file>
+
+<file path=ppt/ink/ink7.xml><?xml version="1.0" encoding="utf-8"?>
+<inkml:ink xmlns:inkml="http://www.w3.org/2003/InkML">
+  <inkml:definitions>
+    <inkml:context xml:id="ctx0">
+      <inkml:inkSource xml:id="inkSrc0">
+        <inkml:traceFormat>
+          <inkml:channel name="X" type="integer" min="-2.14748E9" max="2.14748E9" units="cm"/>
+          <inkml:channel name="Y" type="integer" min="-2.14748E9" max="2.14748E9" units="cm"/>
+          <inkml:channel name="F" type="integer" max="32767" units="dev"/>
+        </inkml:traceFormat>
+        <inkml:channelProperties>
+          <inkml:channelProperty channel="X" name="resolution" value="1000" units="1/cm"/>
+          <inkml:channelProperty channel="Y" name="resolution" value="1000" units="1/cm"/>
+          <inkml:channelProperty channel="F" name="resolution" value="0" units="1/dev"/>
+        </inkml:channelProperties>
+      </inkml:inkSource>
+      <inkml:timestamp xml:id="ts0" timeString="2026-01-26T17:57:52.463"/>
+    </inkml:context>
+    <inkml:brush xml:id="br0">
+      <inkml:brushProperty name="width" value="0.05292" units="cm"/>
+      <inkml:brushProperty name="height" value="0.05292" units="cm"/>
+      <inkml:brushProperty name="color" value="#FF0000"/>
+    </inkml:brush>
+  </inkml:definitions>
+  <inkml:trace contextRef="#ctx0" brushRef="#br0">23944 2893 24575,'0'13'0,"0"8"0,0 12 0,0 13 0,0-20 0,0 2 0,0 0 0,0 1 0,0 0 0,0 0 0,0 0 0,0 0 0,0 2 0,0 0 0,0-1 0,0 2 0,0 14 0,0 1 0,0-12 0,0-1 0,0 11 0,0-2 0,0-13 0,0-2 0,0 0 0,0 0 0,0 0 0,0-1 0,0-2 0,0 0 0,0 20 0,0-5 0,0-9 0,0-8 0,0-6 0,0-6 0,0-3 0,0-1 0,0 0 0,0 2 0,0 5 0,0 6 0,0 5 0,0 3 0,0 2 0,0-2 0,0 2 0,0-1 0,0-4 0,0-4 0,0-6 0,0-5 0,0-2 0,0-3 0,0 0 0,0 1 0,0 9 0,-1 14 0,-3 17 0,1-15 0,-2 2 0,0 1 0,-1 0 0,-1-3 0,0 0 0,-5 16 0,3-19 0,5-14 0,3-9 0</inkml:trace>
+  <inkml:trace contextRef="#ctx0" brushRef="#br0" timeOffset="2102">26391 4692 24575,'7'0'0,"3"0"0,-1 0 0,0 0 0,-3 0 0,0 0 0,3 0 0,2 0 0,1 0 0,2 0 0,-1 0 0,1 0 0,3 0 0,1 0 0,1 0 0,-1 0 0,-1 0 0,0 0 0,2 0 0,1 0 0,2 0 0,0 0 0,-2 0 0,-3 0 0,-3 0 0,-2 0 0,-2 1 0,0 1 0,-3-1 0,0 0 0,-3-1 0,0 0 0,-2 0 0,0 0 0</inkml:trace>
+  <inkml:trace contextRef="#ctx0" brushRef="#br0" timeOffset="3650">26456 4848 24575,'10'2'0,"1"-1"0,1-1 0,4 0 0,3 0 0,4 0 0,3 0 0,13 2 0,-10 0 0,6 1 0,-17 0 0,-4 0 0,-3-1 0,-2 0 0,0 0 0,-2-1 0,-1 0 0,0 0 0,-1-1 0,0 0 0,-1 0 0,0 0 0,-1 1 0,0-1 0,-1 1 0</inkml:trace>
+  <inkml:trace contextRef="#ctx0" brushRef="#br0" timeOffset="7052">4240 8387 24575,'15'0'0,"18"0"0,-5 0 0,5-2 0,14-2 0,3-2-737,-11 1 0,2-2 1,0-1 736,4-1 0,2-2 0,-1-1 0,0 1 0,-1-1 0,-1 0 154,-5 2 0,-2-1 0,-1 2-154,10-2 0,-3 2 211,-13 4 0,-3 1-211,11 1 0,-12 3 0,-10 0 1126,-9 0-1126,-8 0 200,-7 0-200,-9 0 0,-6 3 0,-8 4 0,-11 5 0,14-4 0,-1 2 0,-5 2 0,-2 1 0,-4 3 0,-1 1 0,-2 1 0,-1 0 0,1 0 0,0-1 0,0-2 0,1-1 0,3-2 0,2-2 0,4-1 0,2-2 0,-17 2 0,18-4 0,11-5 0,10 0 0,3 0 0,-4 0 0,-7 0 0,-10 2 0,-9 2 0,-3 0 0,1 2 0,4-3 0,7-1 0,7-1 0,6-1 0,7 0 0,4 0 0</inkml:trace>
+  <inkml:trace contextRef="#ctx0" brushRef="#br0" timeOffset="26234">23189 4099 24575,'16'0'0,"-1"0"0,3 0 0,-1 0 0,-4 0 0,1 0 0,-3 0 0,3 0 0,7 0 0,5 0 0,8-1 0,6-1 0,0 0 0,3 0 0,-2 2 0,-3 0 0,0 0 0,-5 0 0,0 0 0,-3 0 0,-2 0 0,-2 0 0,-3 0 0,-1 0 0,-3 0 0,-4 0 0,-2 0 0,-2 0 0,-1 1 0,-2 0 0,-1 0 0,-2 0 0,0 0 0,2 0 0,0 1 0,1-1 0,1-1 0,4 0 0,3 0 0,3 0 0,2 0 0,2 0 0,-1 0 0,-2 0 0,-4 2 0,-4-1 0,-2 1 0,-4 1 0,-3-2 0,-2 1 0</inkml:trace>
+</inkml:ink>
+</file>
+
+<file path=ppt/ink/ink8.xml><?xml version="1.0" encoding="utf-8"?>
+<inkml:ink xmlns:inkml="http://www.w3.org/2003/InkML">
+  <inkml:definitions>
+    <inkml:context xml:id="ctx0">
+      <inkml:inkSource xml:id="inkSrc0">
+        <inkml:traceFormat>
+          <inkml:channel name="X" type="integer" min="-2.14748E9" max="2.14748E9" units="cm"/>
+          <inkml:channel name="Y" type="integer" min="-2.14748E9" max="2.14748E9" units="cm"/>
+          <inkml:channel name="F" type="integer" max="32767" units="dev"/>
+        </inkml:traceFormat>
+        <inkml:channelProperties>
+          <inkml:channelProperty channel="X" name="resolution" value="1000" units="1/cm"/>
+          <inkml:channelProperty channel="Y" name="resolution" value="1000" units="1/cm"/>
+          <inkml:channelProperty channel="F" name="resolution" value="0" units="1/dev"/>
+        </inkml:channelProperties>
+      </inkml:inkSource>
+      <inkml:timestamp xml:id="ts0" timeString="2026-01-26T17:59:04.081"/>
+    </inkml:context>
+    <inkml:brush xml:id="br0">
+      <inkml:brushProperty name="width" value="0.05292" units="cm"/>
+      <inkml:brushProperty name="height" value="0.05292" units="cm"/>
+      <inkml:brushProperty name="color" value="#FF0000"/>
+    </inkml:brush>
+  </inkml:definitions>
+  <inkml:trace contextRef="#ctx0" brushRef="#br0">2373 7399 24575,'18'0'0,"8"0"0,15 0 0,-16 0 0,1 0 0,1 0 0,0 0 0,2 0 0,0 0 0,4 0 0,1 0 0,1 0 0,4 0 0,2 0 0,5 0 0,-3 0 0,2-1 0,0 0 0,-6 1 0,2-1 0,-5 0 0,-10 0 0,-2-1 0,17 1 0,-6 1 0,-1 0 0,2 0 0,-3 0 0,-4 0 0,-4 0 0,-5 0 0,-1 0 0,-1 0 0,3 0 0,2 0 0,2 0 0,3 0 0,18 0 0,-20 0 0,1 0 0,0 0 0,-1 0 0,19 0 0,-18 0 0,-5 0 0,-1 0 0,-2 0 0,-2 1 0,1 1 0,-3-1 0,-1 1 0,-2-2 0,-1 0 0,-3 0 0,-1 0 0,-3 0 0,-2 0 0</inkml:trace>
+  <inkml:trace contextRef="#ctx0" brushRef="#br0" timeOffset="2051">3929 7397 24575,'-21'-7'0,"0"0"0,-5-1 0,3 0 0,1 2 0,4-1 0,0-2 0,1-1 0,1-1 0,1-2 0,-1-1 0,-2-2 0,-1-2 0,-1 0 0,2-1 0,4 4 0,3 3 0,5 6 0,5 4 0,8 7 0,2 2 0,3 5 0,-3-3 0,0 0 0,0 0 0,2 0 0,4 2 0,4 0 0,4 2 0,2-1 0,0 1 0,0-1 0,1 1 0,-2 0 0,-2-3 0,-5-1 0,-3-3 0,-5-2 0,-4 1 0,-4-1 0,-4 0 0,-2 3 0,-3 0 0,-1 1 0,0 0 0,0-1 0,0 0 0,-2 0 0,-3 1 0,-2 2 0,-2 0 0,3 0 0,4-2 0,3-2 0,3-2 0,2-1 0,1-2 0,0 2 0,-2 0 0,-2 2 0,-4 4 0,-3 5 0,-3 4 0,1 2 0,2 0 0,2-3 0,4-5 0,3-5 0,3-5 0,2-2 0</inkml:trace>
+  <inkml:trace contextRef="#ctx0" brushRef="#br0" timeOffset="19166">10363 7224 24575,'32'0'0,"1"0"0,6 0 0,-1 0 0,4 0 0,1 0-820,-4 0 1,1 0 0,1 0 0,1 0 670,6 0 0,1 0 0,0 0 1,0 0 148,0 0 0,0 0 0,0 0 0,-1 0 0,-1 0 0,0 0 0,-1 0 0,0 0 0,-2 0 0,0 0 0,0 0 0,-2 0 400,7 0 1,-2 0-1,2 0-400,-8 0 0,1 0 0,-1 0 0,-3 0 0,-3 0 0,-3 0 0,1 0 316,19 0 1,-7 0-317,-14 0 0,-13 0 0,-8 0 2038,-1 0-2038,-1 0 0,-1 0 0,1 0 0,-1 0 0,-1 0 0,-4 0 0,-2 1 0,-4 1 0,2 0 0,-2 1 0,3 0 0,-1 0 0,0 0 0,-1-1 0,1-1 0,0-1 0</inkml:trace>
+</inkml:ink>
+</file>
+
 <file path=ppt/notesMasters/notesMaster1.xml><?xml version="1.0" encoding="utf-8"?>
 <p:notesMaster xmlns:a="http://schemas.openxmlformats.org/drawingml/2006/main" xmlns:r="http://schemas.openxmlformats.org/officeDocument/2006/relationships" xmlns:p="http://schemas.openxmlformats.org/presentationml/2006/main">
   <p:cSld>
@@ -1279,7 +1902,7 @@
           <a:p>
             <a:fld id="{F8162804-B246-4973-81E8-228E8D571902}" type="datetimeFigureOut">
               <a:rPr lang="en-AU" smtClean="0"/>
-              <a:t>25/1/2026</a:t>
+              <a:t>26/1/2026</a:t>
             </a:fld>
             <a:endParaRPr lang="en-AU"/>
           </a:p>
@@ -1696,7 +2319,7 @@
           <a:p>
             <a:fld id="{05FEF993-8C17-4AA1-A568-B2EE0046F6BB}" type="datetime1">
               <a:rPr lang="en-AU" smtClean="0"/>
-              <a:t>25/1/2026</a:t>
+              <a:t>26/1/2026</a:t>
             </a:fld>
             <a:endParaRPr lang="en-AU"/>
           </a:p>
@@ -1896,7 +2519,7 @@
           <a:p>
             <a:fld id="{E3B588EE-5698-4527-9DB2-ACD518686AB3}" type="datetime1">
               <a:rPr lang="en-AU" smtClean="0"/>
-              <a:t>25/1/2026</a:t>
+              <a:t>26/1/2026</a:t>
             </a:fld>
             <a:endParaRPr lang="en-AU"/>
           </a:p>
@@ -2106,7 +2729,7 @@
           <a:p>
             <a:fld id="{EB1AEAFD-673C-49C9-9E87-345916F4966D}" type="datetime1">
               <a:rPr lang="en-AU" smtClean="0"/>
-              <a:t>25/1/2026</a:t>
+              <a:t>26/1/2026</a:t>
             </a:fld>
             <a:endParaRPr lang="en-AU"/>
           </a:p>
@@ -2306,7 +2929,7 @@
           <a:p>
             <a:fld id="{A343F544-1CF7-4940-8A71-C151BB078596}" type="datetime1">
               <a:rPr lang="en-AU" smtClean="0"/>
-              <a:t>25/1/2026</a:t>
+              <a:t>26/1/2026</a:t>
             </a:fld>
             <a:endParaRPr lang="en-AU"/>
           </a:p>
@@ -2582,7 +3205,7 @@
           <a:p>
             <a:fld id="{EEC9A0B8-47BE-4EBE-895C-4C62B36C50AF}" type="datetime1">
               <a:rPr lang="en-AU" smtClean="0"/>
-              <a:t>25/1/2026</a:t>
+              <a:t>26/1/2026</a:t>
             </a:fld>
             <a:endParaRPr lang="en-AU"/>
           </a:p>
@@ -2850,7 +3473,7 @@
           <a:p>
             <a:fld id="{7217689D-5032-4671-91C5-541D88033229}" type="datetime1">
               <a:rPr lang="en-AU" smtClean="0"/>
-              <a:t>25/1/2026</a:t>
+              <a:t>26/1/2026</a:t>
             </a:fld>
             <a:endParaRPr lang="en-AU"/>
           </a:p>
@@ -3265,7 +3888,7 @@
           <a:p>
             <a:fld id="{467A03C3-44F2-41B6-ADB8-009D9A974BEC}" type="datetime1">
               <a:rPr lang="en-AU" smtClean="0"/>
-              <a:t>25/1/2026</a:t>
+              <a:t>26/1/2026</a:t>
             </a:fld>
             <a:endParaRPr lang="en-AU"/>
           </a:p>
@@ -3407,7 +4030,7 @@
           <a:p>
             <a:fld id="{5AA8176C-6D36-44C4-8474-01BB2AF97904}" type="datetime1">
               <a:rPr lang="en-AU" smtClean="0"/>
-              <a:t>25/1/2026</a:t>
+              <a:t>26/1/2026</a:t>
             </a:fld>
             <a:endParaRPr lang="en-AU"/>
           </a:p>
@@ -3520,7 +4143,7 @@
           <a:p>
             <a:fld id="{ABCF4B4C-1DF1-4DDF-8F39-0671CF1075AF}" type="datetime1">
               <a:rPr lang="en-AU" smtClean="0"/>
-              <a:t>25/1/2026</a:t>
+              <a:t>26/1/2026</a:t>
             </a:fld>
             <a:endParaRPr lang="en-AU"/>
           </a:p>
@@ -3833,7 +4456,7 @@
           <a:p>
             <a:fld id="{CC6863CD-B029-4C34-BC29-C1A363BBC9B9}" type="datetime1">
               <a:rPr lang="en-AU" smtClean="0"/>
-              <a:t>25/1/2026</a:t>
+              <a:t>26/1/2026</a:t>
             </a:fld>
             <a:endParaRPr lang="en-AU"/>
           </a:p>
@@ -4122,7 +4745,7 @@
           <a:p>
             <a:fld id="{6E1F883F-65A2-4D24-B482-47EA72C1614F}" type="datetime1">
               <a:rPr lang="en-AU" smtClean="0"/>
-              <a:t>25/1/2026</a:t>
+              <a:t>26/1/2026</a:t>
             </a:fld>
             <a:endParaRPr lang="en-AU"/>
           </a:p>
@@ -4365,7 +4988,7 @@
           <a:p>
             <a:fld id="{526482F6-BAC0-4446-873D-C3498BDB5CA0}" type="datetime1">
               <a:rPr lang="en-AU" smtClean="0"/>
-              <a:t>25/1/2026</a:t>
+              <a:t>26/1/2026</a:t>
             </a:fld>
             <a:endParaRPr lang="en-AU"/>
           </a:p>
@@ -5425,7 +6048,7 @@
         <p:spPr>
           <a:xfrm>
             <a:off x="6860453" y="866125"/>
-            <a:ext cx="5161830" cy="3231654"/>
+            <a:ext cx="5161830" cy="2862322"/>
           </a:xfrm>
           <a:prstGeom prst="rect">
             <a:avLst/>
@@ -5484,7 +6107,7 @@
             </a:pPr>
             <a:r>
               <a:rPr lang="en-CA" sz="2400" dirty="0"/>
-              <a:t>Start to look at </a:t>
+              <a:t>Start </a:t>
             </a:r>
             <a:r>
               <a:rPr lang="en-CA" sz="2400" b="1" dirty="0"/>
@@ -6293,6 +6916,57 @@
           </a:fontRef>
         </p:style>
       </p:cxnSp>
+      <mc:AlternateContent xmlns:mc="http://schemas.openxmlformats.org/markup-compatibility/2006">
+        <mc:Choice xmlns:p14="http://schemas.microsoft.com/office/powerpoint/2010/main" Requires="p14">
+          <p:contentPart p14:bwMode="auto" r:id="rId2">
+            <p14:nvContentPartPr>
+              <p14:cNvPr id="9" name="Ink 8">
+                <a:extLst>
+                  <a:ext uri="{FF2B5EF4-FFF2-40B4-BE49-F238E27FC236}">
+                    <a16:creationId xmlns:a16="http://schemas.microsoft.com/office/drawing/2014/main" id="{C8FEEEAD-1F46-E126-4E6A-2BCF89A95167}"/>
+                  </a:ext>
+                </a:extLst>
+              </p14:cNvPr>
+              <p14:cNvContentPartPr/>
+              <p14:nvPr/>
+            </p14:nvContentPartPr>
+            <p14:xfrm>
+              <a:off x="3408120" y="2942640"/>
+              <a:ext cx="3041640" cy="547560"/>
+            </p14:xfrm>
+          </p:contentPart>
+        </mc:Choice>
+        <mc:Fallback>
+          <p:pic>
+            <p:nvPicPr>
+              <p:cNvPr id="9" name="Ink 8">
+                <a:extLst>
+                  <a:ext uri="{FF2B5EF4-FFF2-40B4-BE49-F238E27FC236}">
+                    <a16:creationId xmlns:a16="http://schemas.microsoft.com/office/drawing/2014/main" id="{C8FEEEAD-1F46-E126-4E6A-2BCF89A95167}"/>
+                  </a:ext>
+                </a:extLst>
+              </p:cNvPr>
+              <p:cNvPicPr/>
+              <p:nvPr/>
+            </p:nvPicPr>
+            <p:blipFill>
+              <a:blip r:embed="rId3"/>
+              <a:stretch>
+                <a:fillRect/>
+              </a:stretch>
+            </p:blipFill>
+            <p:spPr>
+              <a:xfrm>
+                <a:off x="3398760" y="2933280"/>
+                <a:ext cx="3060360" cy="566280"/>
+              </a:xfrm>
+              <a:prstGeom prst="rect">
+                <a:avLst/>
+              </a:prstGeom>
+            </p:spPr>
+          </p:pic>
+        </mc:Fallback>
+      </mc:AlternateContent>
     </p:spTree>
     <p:extLst>
       <p:ext uri="{BB962C8B-B14F-4D97-AF65-F5344CB8AC3E}">
@@ -7867,6 +8541,57 @@
           </a:fontRef>
         </p:style>
       </p:cxnSp>
+      <mc:AlternateContent xmlns:mc="http://schemas.openxmlformats.org/markup-compatibility/2006">
+        <mc:Choice xmlns:p14="http://schemas.microsoft.com/office/powerpoint/2010/main" Requires="p14">
+          <p:contentPart p14:bwMode="auto" r:id="rId2">
+            <p14:nvContentPartPr>
+              <p14:cNvPr id="6" name="Ink 5">
+                <a:extLst>
+                  <a:ext uri="{FF2B5EF4-FFF2-40B4-BE49-F238E27FC236}">
+                    <a16:creationId xmlns:a16="http://schemas.microsoft.com/office/drawing/2014/main" id="{7525F485-C60F-9B81-0507-E92A5BA7E0B8}"/>
+                  </a:ext>
+                </a:extLst>
+              </p14:cNvPr>
+              <p14:cNvContentPartPr/>
+              <p14:nvPr/>
+            </p14:nvContentPartPr>
+            <p14:xfrm>
+              <a:off x="1808640" y="2579040"/>
+              <a:ext cx="3973320" cy="2980800"/>
+            </p14:xfrm>
+          </p:contentPart>
+        </mc:Choice>
+        <mc:Fallback>
+          <p:pic>
+            <p:nvPicPr>
+              <p:cNvPr id="6" name="Ink 5">
+                <a:extLst>
+                  <a:ext uri="{FF2B5EF4-FFF2-40B4-BE49-F238E27FC236}">
+                    <a16:creationId xmlns:a16="http://schemas.microsoft.com/office/drawing/2014/main" id="{7525F485-C60F-9B81-0507-E92A5BA7E0B8}"/>
+                  </a:ext>
+                </a:extLst>
+              </p:cNvPr>
+              <p:cNvPicPr/>
+              <p:nvPr/>
+            </p:nvPicPr>
+            <p:blipFill>
+              <a:blip r:embed="rId3"/>
+              <a:stretch>
+                <a:fillRect/>
+              </a:stretch>
+            </p:blipFill>
+            <p:spPr>
+              <a:xfrm>
+                <a:off x="1799280" y="2569680"/>
+                <a:ext cx="3992040" cy="2999520"/>
+              </a:xfrm>
+              <a:prstGeom prst="rect">
+                <a:avLst/>
+              </a:prstGeom>
+            </p:spPr>
+          </p:pic>
+        </mc:Fallback>
+      </mc:AlternateContent>
     </p:spTree>
     <p:extLst>
       <p:ext uri="{BB962C8B-B14F-4D97-AF65-F5344CB8AC3E}">
@@ -8453,6 +9178,57 @@
           </a:p>
         </p:txBody>
       </p:sp>
+      <mc:AlternateContent xmlns:mc="http://schemas.openxmlformats.org/markup-compatibility/2006">
+        <mc:Choice xmlns:p14="http://schemas.microsoft.com/office/powerpoint/2010/main" Requires="p14">
+          <p:contentPart p14:bwMode="auto" r:id="rId2">
+            <p14:nvContentPartPr>
+              <p14:cNvPr id="2" name="Ink 1">
+                <a:extLst>
+                  <a:ext uri="{FF2B5EF4-FFF2-40B4-BE49-F238E27FC236}">
+                    <a16:creationId xmlns:a16="http://schemas.microsoft.com/office/drawing/2014/main" id="{BB5A0492-1B02-1A32-7E35-CB46037ECB04}"/>
+                  </a:ext>
+                </a:extLst>
+              </p14:cNvPr>
+              <p14:cNvContentPartPr/>
+              <p14:nvPr/>
+            </p14:nvContentPartPr>
+            <p14:xfrm>
+              <a:off x="397080" y="569520"/>
+              <a:ext cx="6967080" cy="4592160"/>
+            </p14:xfrm>
+          </p:contentPart>
+        </mc:Choice>
+        <mc:Fallback>
+          <p:pic>
+            <p:nvPicPr>
+              <p:cNvPr id="2" name="Ink 1">
+                <a:extLst>
+                  <a:ext uri="{FF2B5EF4-FFF2-40B4-BE49-F238E27FC236}">
+                    <a16:creationId xmlns:a16="http://schemas.microsoft.com/office/drawing/2014/main" id="{BB5A0492-1B02-1A32-7E35-CB46037ECB04}"/>
+                  </a:ext>
+                </a:extLst>
+              </p:cNvPr>
+              <p:cNvPicPr/>
+              <p:nvPr/>
+            </p:nvPicPr>
+            <p:blipFill>
+              <a:blip r:embed="rId3"/>
+              <a:stretch>
+                <a:fillRect/>
+              </a:stretch>
+            </p:blipFill>
+            <p:spPr>
+              <a:xfrm>
+                <a:off x="387720" y="560160"/>
+                <a:ext cx="6985800" cy="4610880"/>
+              </a:xfrm>
+              <a:prstGeom prst="rect">
+                <a:avLst/>
+              </a:prstGeom>
+            </p:spPr>
+          </p:pic>
+        </mc:Fallback>
+      </mc:AlternateContent>
     </p:spTree>
     <p:extLst>
       <p:ext uri="{BB962C8B-B14F-4D97-AF65-F5344CB8AC3E}">
@@ -9498,6 +10274,57 @@
           </a:p>
         </p:txBody>
       </p:sp>
+      <mc:AlternateContent xmlns:mc="http://schemas.openxmlformats.org/markup-compatibility/2006">
+        <mc:Choice xmlns:p14="http://schemas.microsoft.com/office/powerpoint/2010/main" Requires="p14">
+          <p:contentPart p14:bwMode="auto" r:id="rId2">
+            <p14:nvContentPartPr>
+              <p14:cNvPr id="2" name="Ink 1">
+                <a:extLst>
+                  <a:ext uri="{FF2B5EF4-FFF2-40B4-BE49-F238E27FC236}">
+                    <a16:creationId xmlns:a16="http://schemas.microsoft.com/office/drawing/2014/main" id="{DA8BCBCF-429B-2BEA-8060-E24277374D2B}"/>
+                  </a:ext>
+                </a:extLst>
+              </p14:cNvPr>
+              <p14:cNvContentPartPr/>
+              <p14:nvPr/>
+            </p14:nvContentPartPr>
+            <p14:xfrm>
+              <a:off x="579960" y="2554920"/>
+              <a:ext cx="4677120" cy="1507680"/>
+            </p14:xfrm>
+          </p:contentPart>
+        </mc:Choice>
+        <mc:Fallback>
+          <p:pic>
+            <p:nvPicPr>
+              <p:cNvPr id="2" name="Ink 1">
+                <a:extLst>
+                  <a:ext uri="{FF2B5EF4-FFF2-40B4-BE49-F238E27FC236}">
+                    <a16:creationId xmlns:a16="http://schemas.microsoft.com/office/drawing/2014/main" id="{DA8BCBCF-429B-2BEA-8060-E24277374D2B}"/>
+                  </a:ext>
+                </a:extLst>
+              </p:cNvPr>
+              <p:cNvPicPr/>
+              <p:nvPr/>
+            </p:nvPicPr>
+            <p:blipFill>
+              <a:blip r:embed="rId3"/>
+              <a:stretch>
+                <a:fillRect/>
+              </a:stretch>
+            </p:blipFill>
+            <p:spPr>
+              <a:xfrm>
+                <a:off x="570600" y="2545560"/>
+                <a:ext cx="4695840" cy="1526400"/>
+              </a:xfrm>
+              <a:prstGeom prst="rect">
+                <a:avLst/>
+              </a:prstGeom>
+            </p:spPr>
+          </p:pic>
+        </mc:Fallback>
+      </mc:AlternateContent>
     </p:spTree>
     <p:extLst>
       <p:ext uri="{BB962C8B-B14F-4D97-AF65-F5344CB8AC3E}">
@@ -9536,6 +10363,53 @@
       </p:grpSpPr>
       <p:sp>
         <p:nvSpPr>
+          <p:cNvPr id="10" name="TextBox 9">
+            <a:extLst>
+              <a:ext uri="{FF2B5EF4-FFF2-40B4-BE49-F238E27FC236}">
+                <a16:creationId xmlns:a16="http://schemas.microsoft.com/office/drawing/2014/main" id="{1E9732CF-CCC7-9A45-5C3F-AD20710202D3}"/>
+              </a:ext>
+            </a:extLst>
+          </p:cNvPr>
+          <p:cNvSpPr txBox="1"/>
+          <p:nvPr/>
+        </p:nvSpPr>
+        <p:spPr>
+          <a:xfrm>
+            <a:off x="9567334" y="2375748"/>
+            <a:ext cx="1405467" cy="646331"/>
+          </a:xfrm>
+          <a:prstGeom prst="rect">
+            <a:avLst/>
+          </a:prstGeom>
+          <a:noFill/>
+        </p:spPr>
+        <p:txBody>
+          <a:bodyPr wrap="square" rtlCol="0">
+            <a:spAutoFit/>
+          </a:bodyPr>
+          <a:lstStyle/>
+          <a:p>
+            <a:pPr algn="ctr"/>
+            <a:r>
+              <a:rPr lang="en-AU" dirty="0">
+                <a:latin typeface="Consolas" panose="020B0609020204030204" pitchFamily="49" charset="0"/>
+              </a:rPr>
+              <a:t>Hello</a:t>
+            </a:r>
+          </a:p>
+          <a:p>
+            <a:pPr algn="ctr"/>
+            <a:r>
+              <a:rPr lang="en-AU" dirty="0">
+                <a:latin typeface="Consolas" panose="020B0609020204030204" pitchFamily="49" charset="0"/>
+              </a:rPr>
+              <a:t>-------</a:t>
+            </a:r>
+          </a:p>
+        </p:txBody>
+      </p:sp>
+      <p:sp>
+        <p:nvSpPr>
           <p:cNvPr id="4" name="Slide Number Placeholder 3">
             <a:extLst>
               <a:ext uri="{FF2B5EF4-FFF2-40B4-BE49-F238E27FC236}">
@@ -9623,7 +10497,7 @@
               <a:rPr lang="en-US" sz="3200" dirty="0">
                 <a:latin typeface="Consolas" panose="020B0609020204030204" pitchFamily="49" charset="0"/>
               </a:rPr>
-              <a:t>    print(word)</a:t>
+              <a:t>    print(' ' + word)</a:t>
             </a:r>
           </a:p>
           <a:p>
@@ -9692,53 +10566,6 @@
               <a:t>What does it do?</a:t>
             </a:r>
             <a:endParaRPr lang="en-AU"/>
-          </a:p>
-        </p:txBody>
-      </p:sp>
-      <p:sp>
-        <p:nvSpPr>
-          <p:cNvPr id="10" name="TextBox 9">
-            <a:extLst>
-              <a:ext uri="{FF2B5EF4-FFF2-40B4-BE49-F238E27FC236}">
-                <a16:creationId xmlns:a16="http://schemas.microsoft.com/office/drawing/2014/main" id="{1E9732CF-CCC7-9A45-5C3F-AD20710202D3}"/>
-              </a:ext>
-            </a:extLst>
-          </p:cNvPr>
-          <p:cNvSpPr txBox="1"/>
-          <p:nvPr/>
-        </p:nvSpPr>
-        <p:spPr>
-          <a:xfrm>
-            <a:off x="9567334" y="2375748"/>
-            <a:ext cx="1405467" cy="646331"/>
-          </a:xfrm>
-          <a:prstGeom prst="rect">
-            <a:avLst/>
-          </a:prstGeom>
-          <a:noFill/>
-        </p:spPr>
-        <p:txBody>
-          <a:bodyPr wrap="square" rtlCol="0">
-            <a:spAutoFit/>
-          </a:bodyPr>
-          <a:lstStyle/>
-          <a:p>
-            <a:pPr algn="ctr"/>
-            <a:r>
-              <a:rPr lang="en-AU" dirty="0">
-                <a:latin typeface="Consolas" panose="020B0609020204030204" pitchFamily="49" charset="0"/>
-              </a:rPr>
-              <a:t>Hello</a:t>
-            </a:r>
-          </a:p>
-          <a:p>
-            <a:pPr algn="ctr"/>
-            <a:r>
-              <a:rPr lang="en-AU" dirty="0">
-                <a:latin typeface="Consolas" panose="020B0609020204030204" pitchFamily="49" charset="0"/>
-              </a:rPr>
-              <a:t>-----</a:t>
-            </a:r>
           </a:p>
         </p:txBody>
       </p:sp>
@@ -9952,7 +10779,7 @@
               <a:rPr lang="en-US" sz="3200" dirty="0">
                 <a:latin typeface="Consolas" panose="020B0609020204030204" pitchFamily="49" charset="0"/>
               </a:rPr>
-              <a:t>    print(word)</a:t>
+              <a:t>    print(' ' + word)</a:t>
             </a:r>
           </a:p>
           <a:p>
@@ -10010,7 +10837,7 @@
               <a:rPr lang="en-AU" dirty="0">
                 <a:latin typeface="Consolas" panose="020B0609020204030204" pitchFamily="49" charset="0"/>
               </a:rPr>
-              <a:t>-----</a:t>
+              <a:t>-------</a:t>
             </a:r>
           </a:p>
         </p:txBody>
@@ -10390,7 +11217,7 @@
               <a:rPr lang="en-US" sz="3200" dirty="0">
                 <a:latin typeface="Consolas" panose="020B0609020204030204" pitchFamily="49" charset="0"/>
               </a:rPr>
-              <a:t>    print(word)</a:t>
+              <a:t>    print(' ' + word)</a:t>
             </a:r>
           </a:p>
           <a:p>
@@ -10448,7 +11275,7 @@
               <a:rPr lang="en-AU" dirty="0">
                 <a:latin typeface="Consolas" panose="020B0609020204030204" pitchFamily="49" charset="0"/>
               </a:rPr>
-              <a:t>-----</a:t>
+              <a:t>-------</a:t>
             </a:r>
           </a:p>
         </p:txBody>
@@ -10920,7 +11747,7 @@
               <a:rPr lang="en-US" sz="3200" dirty="0">
                 <a:latin typeface="Consolas" panose="020B0609020204030204" pitchFamily="49" charset="0"/>
               </a:rPr>
-              <a:t>    print(word)</a:t>
+              <a:t>    print(' ' + word)</a:t>
             </a:r>
           </a:p>
           <a:p>
@@ -10978,7 +11805,7 @@
               <a:rPr lang="en-AU" dirty="0">
                 <a:latin typeface="Consolas" panose="020B0609020204030204" pitchFamily="49" charset="0"/>
               </a:rPr>
-              <a:t>-----</a:t>
+              <a:t>-------</a:t>
             </a:r>
           </a:p>
         </p:txBody>
@@ -11408,6 +12235,57 @@
           </a:fontRef>
         </p:style>
       </p:cxnSp>
+      <mc:AlternateContent xmlns:mc="http://schemas.openxmlformats.org/markup-compatibility/2006">
+        <mc:Choice xmlns:p14="http://schemas.microsoft.com/office/powerpoint/2010/main" Requires="p14">
+          <p:contentPart p14:bwMode="auto" r:id="rId2">
+            <p14:nvContentPartPr>
+              <p14:cNvPr id="12" name="Ink 11">
+                <a:extLst>
+                  <a:ext uri="{FF2B5EF4-FFF2-40B4-BE49-F238E27FC236}">
+                    <a16:creationId xmlns:a16="http://schemas.microsoft.com/office/drawing/2014/main" id="{8CB4EF3D-790C-C835-087D-CC0B3DBFC0BE}"/>
+                  </a:ext>
+                </a:extLst>
+              </p14:cNvPr>
+              <p14:cNvContentPartPr/>
+              <p14:nvPr/>
+            </p14:nvContentPartPr>
+            <p14:xfrm>
+              <a:off x="4049280" y="4124160"/>
+              <a:ext cx="216000" cy="2160"/>
+            </p14:xfrm>
+          </p:contentPart>
+        </mc:Choice>
+        <mc:Fallback>
+          <p:pic>
+            <p:nvPicPr>
+              <p:cNvPr id="12" name="Ink 11">
+                <a:extLst>
+                  <a:ext uri="{FF2B5EF4-FFF2-40B4-BE49-F238E27FC236}">
+                    <a16:creationId xmlns:a16="http://schemas.microsoft.com/office/drawing/2014/main" id="{8CB4EF3D-790C-C835-087D-CC0B3DBFC0BE}"/>
+                  </a:ext>
+                </a:extLst>
+              </p:cNvPr>
+              <p:cNvPicPr/>
+              <p:nvPr/>
+            </p:nvPicPr>
+            <p:blipFill>
+              <a:blip r:embed="rId3"/>
+              <a:stretch>
+                <a:fillRect/>
+              </a:stretch>
+            </p:blipFill>
+            <p:spPr>
+              <a:xfrm>
+                <a:off x="4039920" y="4114800"/>
+                <a:ext cx="234720" cy="20880"/>
+              </a:xfrm>
+              <a:prstGeom prst="rect">
+                <a:avLst/>
+              </a:prstGeom>
+            </p:spPr>
+          </p:pic>
+        </mc:Fallback>
+      </mc:AlternateContent>
     </p:spTree>
     <p:extLst>
       <p:ext uri="{BB962C8B-B14F-4D97-AF65-F5344CB8AC3E}">
@@ -11891,7 +12769,7 @@
               <a:rPr lang="en-US" sz="3200" dirty="0">
                 <a:latin typeface="Consolas" panose="020B0609020204030204" pitchFamily="49" charset="0"/>
               </a:rPr>
-              <a:t>    print(word)</a:t>
+              <a:t>    print(' ' + word)</a:t>
             </a:r>
           </a:p>
           <a:p>
@@ -11949,7 +12827,7 @@
               <a:rPr lang="en-AU" dirty="0">
                 <a:latin typeface="Consolas" panose="020B0609020204030204" pitchFamily="49" charset="0"/>
               </a:rPr>
-              <a:t>-----</a:t>
+              <a:t>-------</a:t>
             </a:r>
           </a:p>
         </p:txBody>
@@ -12470,6 +13348,57 @@
           </a:fontRef>
         </p:style>
       </p:cxnSp>
+      <mc:AlternateContent xmlns:mc="http://schemas.openxmlformats.org/markup-compatibility/2006">
+        <mc:Choice xmlns:p14="http://schemas.microsoft.com/office/powerpoint/2010/main" Requires="p14">
+          <p:contentPart p14:bwMode="auto" r:id="rId2">
+            <p14:nvContentPartPr>
+              <p14:cNvPr id="16" name="Ink 15">
+                <a:extLst>
+                  <a:ext uri="{FF2B5EF4-FFF2-40B4-BE49-F238E27FC236}">
+                    <a16:creationId xmlns:a16="http://schemas.microsoft.com/office/drawing/2014/main" id="{9B2B3945-84E3-4E41-3541-D3F1BDA21295}"/>
+                  </a:ext>
+                </a:extLst>
+              </p14:cNvPr>
+              <p14:cNvContentPartPr/>
+              <p14:nvPr/>
+            </p14:nvContentPartPr>
+            <p14:xfrm>
+              <a:off x="1116360" y="2706480"/>
+              <a:ext cx="297720" cy="1449720"/>
+            </p14:xfrm>
+          </p:contentPart>
+        </mc:Choice>
+        <mc:Fallback>
+          <p:pic>
+            <p:nvPicPr>
+              <p:cNvPr id="16" name="Ink 15">
+                <a:extLst>
+                  <a:ext uri="{FF2B5EF4-FFF2-40B4-BE49-F238E27FC236}">
+                    <a16:creationId xmlns:a16="http://schemas.microsoft.com/office/drawing/2014/main" id="{9B2B3945-84E3-4E41-3541-D3F1BDA21295}"/>
+                  </a:ext>
+                </a:extLst>
+              </p:cNvPr>
+              <p:cNvPicPr/>
+              <p:nvPr/>
+            </p:nvPicPr>
+            <p:blipFill>
+              <a:blip r:embed="rId3"/>
+              <a:stretch>
+                <a:fillRect/>
+              </a:stretch>
+            </p:blipFill>
+            <p:spPr>
+              <a:xfrm>
+                <a:off x="1107000" y="2697120"/>
+                <a:ext cx="316440" cy="1468440"/>
+              </a:xfrm>
+              <a:prstGeom prst="rect">
+                <a:avLst/>
+              </a:prstGeom>
+            </p:spPr>
+          </p:pic>
+        </mc:Fallback>
+      </mc:AlternateContent>
     </p:spTree>
     <p:extLst>
       <p:ext uri="{BB962C8B-B14F-4D97-AF65-F5344CB8AC3E}">
@@ -12595,7 +13524,7 @@
               <a:rPr lang="en-US" sz="3200" dirty="0">
                 <a:latin typeface="Consolas" panose="020B0609020204030204" pitchFamily="49" charset="0"/>
               </a:rPr>
-              <a:t>    print(word)</a:t>
+              <a:t>    print(' ' + word)</a:t>
             </a:r>
           </a:p>
           <a:p>
@@ -13183,16 +14112,10 @@
           <a:lstStyle/>
           <a:p>
             <a:r>
-              <a:rPr lang="en-US" sz="2000" dirty="0" err="1">
-                <a:latin typeface="Consolas" panose="020B0609020204030204" pitchFamily="49" charset="0"/>
-              </a:rPr>
-              <a:t>print_in_box</a:t>
-            </a:r>
-            <a:r>
               <a:rPr lang="en-US" sz="2000" dirty="0">
                 <a:latin typeface="Consolas" panose="020B0609020204030204" pitchFamily="49" charset="0"/>
               </a:rPr>
-              <a:t>('Hello')</a:t>
+              <a:t>underline('Hello')</a:t>
             </a:r>
             <a:br>
               <a:rPr lang="en-US" sz="2000" dirty="0">
@@ -13224,6 +14147,57 @@
           </a:p>
         </p:txBody>
       </p:sp>
+      <mc:AlternateContent xmlns:mc="http://schemas.openxmlformats.org/markup-compatibility/2006">
+        <mc:Choice xmlns:p14="http://schemas.microsoft.com/office/powerpoint/2010/main" Requires="p14">
+          <p:contentPart p14:bwMode="auto" r:id="rId2">
+            <p14:nvContentPartPr>
+              <p14:cNvPr id="10" name="Ink 9">
+                <a:extLst>
+                  <a:ext uri="{FF2B5EF4-FFF2-40B4-BE49-F238E27FC236}">
+                    <a16:creationId xmlns:a16="http://schemas.microsoft.com/office/drawing/2014/main" id="{6C07CB9B-B47A-02A0-1D75-0A47F96213EE}"/>
+                  </a:ext>
+                </a:extLst>
+              </p14:cNvPr>
+              <p14:cNvContentPartPr/>
+              <p14:nvPr/>
+            </p14:nvContentPartPr>
+            <p14:xfrm>
+              <a:off x="1466280" y="1041480"/>
+              <a:ext cx="8185320" cy="2018160"/>
+            </p14:xfrm>
+          </p:contentPart>
+        </mc:Choice>
+        <mc:Fallback>
+          <p:pic>
+            <p:nvPicPr>
+              <p:cNvPr id="10" name="Ink 9">
+                <a:extLst>
+                  <a:ext uri="{FF2B5EF4-FFF2-40B4-BE49-F238E27FC236}">
+                    <a16:creationId xmlns:a16="http://schemas.microsoft.com/office/drawing/2014/main" id="{6C07CB9B-B47A-02A0-1D75-0A47F96213EE}"/>
+                  </a:ext>
+                </a:extLst>
+              </p:cNvPr>
+              <p:cNvPicPr/>
+              <p:nvPr/>
+            </p:nvPicPr>
+            <p:blipFill>
+              <a:blip r:embed="rId3"/>
+              <a:stretch>
+                <a:fillRect/>
+              </a:stretch>
+            </p:blipFill>
+            <p:spPr>
+              <a:xfrm>
+                <a:off x="1456920" y="1032120"/>
+                <a:ext cx="8204040" cy="2036880"/>
+              </a:xfrm>
+              <a:prstGeom prst="rect">
+                <a:avLst/>
+              </a:prstGeom>
+            </p:spPr>
+          </p:pic>
+        </mc:Fallback>
+      </mc:AlternateContent>
     </p:spTree>
     <p:extLst>
       <p:ext uri="{BB962C8B-B14F-4D97-AF65-F5344CB8AC3E}">
@@ -13379,7 +14353,7 @@
               <a:rPr lang="en-US" sz="3200" dirty="0">
                 <a:latin typeface="Consolas" panose="020B0609020204030204" pitchFamily="49" charset="0"/>
               </a:rPr>
-              <a:t>    print(</a:t>
+              <a:t>    print(' ' + </a:t>
             </a:r>
             <a:r>
               <a:rPr lang="en-US" sz="3200" dirty="0">
@@ -13523,16 +14497,10 @@
           <a:lstStyle/>
           <a:p>
             <a:r>
-              <a:rPr lang="en-US" sz="2000" dirty="0" err="1">
-                <a:latin typeface="Consolas" panose="020B0609020204030204" pitchFamily="49" charset="0"/>
-              </a:rPr>
-              <a:t>print_in_box</a:t>
-            </a:r>
-            <a:r>
               <a:rPr lang="en-US" sz="2000" dirty="0">
                 <a:latin typeface="Consolas" panose="020B0609020204030204" pitchFamily="49" charset="0"/>
               </a:rPr>
-              <a:t>('Hello')</a:t>
+              <a:t>underline('Hello')</a:t>
             </a:r>
             <a:endParaRPr lang="en-AU" sz="2000" dirty="0"/>
           </a:p>
@@ -13580,7 +14548,7 @@
               <a:rPr lang="en-AU" dirty="0">
                 <a:latin typeface="Consolas" panose="020B0609020204030204" pitchFamily="49" charset="0"/>
               </a:rPr>
-              <a:t>-----</a:t>
+              <a:t>-------</a:t>
             </a:r>
           </a:p>
         </p:txBody>
@@ -13631,6 +14599,57 @@
           </a:p>
         </p:txBody>
       </p:sp>
+      <mc:AlternateContent xmlns:mc="http://schemas.openxmlformats.org/markup-compatibility/2006">
+        <mc:Choice xmlns:p14="http://schemas.microsoft.com/office/powerpoint/2010/main" Requires="p14">
+          <p:contentPart p14:bwMode="auto" r:id="rId2">
+            <p14:nvContentPartPr>
+              <p14:cNvPr id="3" name="Ink 2">
+                <a:extLst>
+                  <a:ext uri="{FF2B5EF4-FFF2-40B4-BE49-F238E27FC236}">
+                    <a16:creationId xmlns:a16="http://schemas.microsoft.com/office/drawing/2014/main" id="{36179C37-6CCD-D4C6-08D1-D9CEFCF03F5E}"/>
+                  </a:ext>
+                </a:extLst>
+              </p14:cNvPr>
+              <p14:cNvContentPartPr/>
+              <p14:nvPr/>
+            </p14:nvContentPartPr>
+            <p14:xfrm>
+              <a:off x="854280" y="2588760"/>
+              <a:ext cx="3506400" cy="159120"/>
+            </p14:xfrm>
+          </p:contentPart>
+        </mc:Choice>
+        <mc:Fallback>
+          <p:pic>
+            <p:nvPicPr>
+              <p:cNvPr id="3" name="Ink 2">
+                <a:extLst>
+                  <a:ext uri="{FF2B5EF4-FFF2-40B4-BE49-F238E27FC236}">
+                    <a16:creationId xmlns:a16="http://schemas.microsoft.com/office/drawing/2014/main" id="{36179C37-6CCD-D4C6-08D1-D9CEFCF03F5E}"/>
+                  </a:ext>
+                </a:extLst>
+              </p:cNvPr>
+              <p:cNvPicPr/>
+              <p:nvPr/>
+            </p:nvPicPr>
+            <p:blipFill>
+              <a:blip r:embed="rId3"/>
+              <a:stretch>
+                <a:fillRect/>
+              </a:stretch>
+            </p:blipFill>
+            <p:spPr>
+              <a:xfrm>
+                <a:off x="844920" y="2579400"/>
+                <a:ext cx="3525120" cy="177840"/>
+              </a:xfrm>
+              <a:prstGeom prst="rect">
+                <a:avLst/>
+              </a:prstGeom>
+            </p:spPr>
+          </p:pic>
+        </mc:Fallback>
+      </mc:AlternateContent>
     </p:spTree>
     <p:extLst>
       <p:ext uri="{BB962C8B-B14F-4D97-AF65-F5344CB8AC3E}">
@@ -13786,7 +14805,7 @@
               <a:rPr lang="en-US" sz="3200" dirty="0">
                 <a:latin typeface="Consolas" panose="020B0609020204030204" pitchFamily="49" charset="0"/>
               </a:rPr>
-              <a:t>    print(</a:t>
+              <a:t>    print(' ' + </a:t>
             </a:r>
             <a:r>
               <a:rPr lang="en-US" sz="3200" dirty="0">
@@ -13930,16 +14949,10 @@
           <a:lstStyle/>
           <a:p>
             <a:r>
-              <a:rPr lang="en-US" sz="2000" dirty="0" err="1">
-                <a:latin typeface="Consolas" panose="020B0609020204030204" pitchFamily="49" charset="0"/>
-              </a:rPr>
-              <a:t>print_in_box</a:t>
-            </a:r>
-            <a:r>
               <a:rPr lang="en-US" sz="2000" dirty="0">
                 <a:latin typeface="Consolas" panose="020B0609020204030204" pitchFamily="49" charset="0"/>
               </a:rPr>
-              <a:t>('Hello')</a:t>
+              <a:t>underline('Hello')</a:t>
             </a:r>
             <a:endParaRPr lang="en-AU" sz="2000" dirty="0"/>
           </a:p>
@@ -14189,7 +15202,7 @@
               <a:rPr lang="en-US" sz="3200" dirty="0">
                 <a:latin typeface="Consolas" panose="020B0609020204030204" pitchFamily="49" charset="0"/>
               </a:rPr>
-              <a:t>print(</a:t>
+              <a:t>print(' ' + </a:t>
             </a:r>
             <a:r>
               <a:rPr lang="en-US" sz="3200" dirty="0">
@@ -14397,11 +15410,7 @@
             </a:pPr>
             <a:r>
               <a:rPr lang="en-US" dirty="0"/>
-              <a:t>To understand functions it helps to look at </a:t>
-            </a:r>
-            <a:r>
-              <a:rPr lang="en-US"/>
-              <a:t>more examples … (see notes)</a:t>
+              <a:t>To understand functions it helps to look at more examples … (see notes)</a:t>
             </a:r>
           </a:p>
         </p:txBody>

</xml_diff>

<commit_message>
updated chapter 4 notes
</commit_message>
<xml_diff>
--- a/lecture_notes/chapter3/chapter3.pptx
+++ b/lecture_notes/chapter3/chapter3.pptx
@@ -234,6 +234,7 @@
 <p1510:revInfo xmlns:a="http://schemas.openxmlformats.org/drawingml/2006/main" xmlns:r="http://schemas.openxmlformats.org/officeDocument/2006/relationships" xmlns:p1510="http://schemas.microsoft.com/office/powerpoint/2015/10/main">
   <p1510:revLst>
     <p1510:client id="{2BF3FD1A-385D-DB41-A50E-ACE98A5EE503}" v="24" dt="2026-01-27T23:54:06.782"/>
+    <p1510:client id="{B551FABF-F8DF-464C-9646-57D3EE45E185}" v="4" dt="2026-01-28T18:14:21.327"/>
   </p1510:revLst>
 </p1510:revInfo>
 </file>
@@ -243,7 +244,7 @@
   <pc:docChgLst>
     <pc:chgData name="Toby Donaldson" userId="2e6e5431-bb17-4c41-9985-d39c50d83c73" providerId="ADAL" clId="{F31BC264-820E-54C4-A6D1-F92AF9CC222E}"/>
     <pc:docChg chg="undo custSel modSld">
-      <pc:chgData name="Toby Donaldson" userId="2e6e5431-bb17-4c41-9985-d39c50d83c73" providerId="ADAL" clId="{F31BC264-820E-54C4-A6D1-F92AF9CC222E}" dt="2026-01-26T19:10:27.274" v="269"/>
+      <pc:chgData name="Toby Donaldson" userId="2e6e5431-bb17-4c41-9985-d39c50d83c73" providerId="ADAL" clId="{F31BC264-820E-54C4-A6D1-F92AF9CC222E}" dt="2026-01-28T18:14:21.326" v="273"/>
       <pc:docMkLst>
         <pc:docMk/>
       </pc:docMkLst>
@@ -308,6 +309,66 @@
         </pc:inkChg>
       </pc:sldChg>
       <pc:sldChg chg="addSp">
+        <pc:chgData name="Toby Donaldson" userId="2e6e5431-bb17-4c41-9985-d39c50d83c73" providerId="ADAL" clId="{F31BC264-820E-54C4-A6D1-F92AF9CC222E}" dt="2026-01-28T17:43:58.171" v="272"/>
+        <pc:sldMkLst>
+          <pc:docMk/>
+          <pc:sldMk cId="3248521206" sldId="317"/>
+        </pc:sldMkLst>
+        <pc:inkChg chg="add">
+          <ac:chgData name="Toby Donaldson" userId="2e6e5431-bb17-4c41-9985-d39c50d83c73" providerId="ADAL" clId="{F31BC264-820E-54C4-A6D1-F92AF9CC222E}" dt="2026-01-28T17:43:58.171" v="272"/>
+          <ac:inkMkLst>
+            <pc:docMk/>
+            <pc:sldMk cId="3248521206" sldId="317"/>
+            <ac:inkMk id="8" creationId="{247A5D44-A0D1-C696-4102-EB248C628E79}"/>
+          </ac:inkMkLst>
+        </pc:inkChg>
+      </pc:sldChg>
+      <pc:sldChg chg="addSp">
+        <pc:chgData name="Toby Donaldson" userId="2e6e5431-bb17-4c41-9985-d39c50d83c73" providerId="ADAL" clId="{F31BC264-820E-54C4-A6D1-F92AF9CC222E}" dt="2026-01-28T17:43:58.171" v="272"/>
+        <pc:sldMkLst>
+          <pc:docMk/>
+          <pc:sldMk cId="2358446259" sldId="323"/>
+        </pc:sldMkLst>
+        <pc:inkChg chg="add">
+          <ac:chgData name="Toby Donaldson" userId="2e6e5431-bb17-4c41-9985-d39c50d83c73" providerId="ADAL" clId="{F31BC264-820E-54C4-A6D1-F92AF9CC222E}" dt="2026-01-28T17:43:58.171" v="272"/>
+          <ac:inkMkLst>
+            <pc:docMk/>
+            <pc:sldMk cId="2358446259" sldId="323"/>
+            <ac:inkMk id="2" creationId="{81E3B2A9-1F0C-5D9A-AE88-B1747EA5458B}"/>
+          </ac:inkMkLst>
+        </pc:inkChg>
+      </pc:sldChg>
+      <pc:sldChg chg="addSp">
+        <pc:chgData name="Toby Donaldson" userId="2e6e5431-bb17-4c41-9985-d39c50d83c73" providerId="ADAL" clId="{F31BC264-820E-54C4-A6D1-F92AF9CC222E}" dt="2026-01-28T17:43:58.171" v="272"/>
+        <pc:sldMkLst>
+          <pc:docMk/>
+          <pc:sldMk cId="1092517109" sldId="324"/>
+        </pc:sldMkLst>
+        <pc:inkChg chg="add">
+          <ac:chgData name="Toby Donaldson" userId="2e6e5431-bb17-4c41-9985-d39c50d83c73" providerId="ADAL" clId="{F31BC264-820E-54C4-A6D1-F92AF9CC222E}" dt="2026-01-28T17:43:58.171" v="272"/>
+          <ac:inkMkLst>
+            <pc:docMk/>
+            <pc:sldMk cId="1092517109" sldId="324"/>
+            <ac:inkMk id="2" creationId="{40290BB4-3C92-DA12-321B-BDF25F2E5952}"/>
+          </ac:inkMkLst>
+        </pc:inkChg>
+      </pc:sldChg>
+      <pc:sldChg chg="addSp">
+        <pc:chgData name="Toby Donaldson" userId="2e6e5431-bb17-4c41-9985-d39c50d83c73" providerId="ADAL" clId="{F31BC264-820E-54C4-A6D1-F92AF9CC222E}" dt="2026-01-28T17:43:58.171" v="272"/>
+        <pc:sldMkLst>
+          <pc:docMk/>
+          <pc:sldMk cId="2215848448" sldId="325"/>
+        </pc:sldMkLst>
+        <pc:inkChg chg="add">
+          <ac:chgData name="Toby Donaldson" userId="2e6e5431-bb17-4c41-9985-d39c50d83c73" providerId="ADAL" clId="{F31BC264-820E-54C4-A6D1-F92AF9CC222E}" dt="2026-01-28T17:43:58.171" v="272"/>
+          <ac:inkMkLst>
+            <pc:docMk/>
+            <pc:sldMk cId="2215848448" sldId="325"/>
+            <ac:inkMk id="2" creationId="{158C6875-F21B-F6EE-BC00-69F69F73889C}"/>
+          </ac:inkMkLst>
+        </pc:inkChg>
+      </pc:sldChg>
+      <pc:sldChg chg="addSp">
         <pc:chgData name="Toby Donaldson" userId="2e6e5431-bb17-4c41-9985-d39c50d83c73" providerId="ADAL" clId="{F31BC264-820E-54C4-A6D1-F92AF9CC222E}" dt="2026-01-26T18:00:46.162" v="1"/>
         <pc:sldMkLst>
           <pc:docMk/>
@@ -322,36 +383,102 @@
           </ac:inkMkLst>
         </pc:inkChg>
       </pc:sldChg>
+      <pc:sldChg chg="addSp">
+        <pc:chgData name="Toby Donaldson" userId="2e6e5431-bb17-4c41-9985-d39c50d83c73" providerId="ADAL" clId="{F31BC264-820E-54C4-A6D1-F92AF9CC222E}" dt="2026-01-28T17:43:58.171" v="272"/>
+        <pc:sldMkLst>
+          <pc:docMk/>
+          <pc:sldMk cId="519914869" sldId="331"/>
+        </pc:sldMkLst>
+        <pc:inkChg chg="add">
+          <ac:chgData name="Toby Donaldson" userId="2e6e5431-bb17-4c41-9985-d39c50d83c73" providerId="ADAL" clId="{F31BC264-820E-54C4-A6D1-F92AF9CC222E}" dt="2026-01-28T17:43:58.171" v="272"/>
+          <ac:inkMkLst>
+            <pc:docMk/>
+            <pc:sldMk cId="519914869" sldId="331"/>
+            <ac:inkMk id="16" creationId="{52106321-4541-A97E-D2ED-96D07A4B415F}"/>
+          </ac:inkMkLst>
+        </pc:inkChg>
+      </pc:sldChg>
+      <pc:sldChg chg="addSp">
+        <pc:chgData name="Toby Donaldson" userId="2e6e5431-bb17-4c41-9985-d39c50d83c73" providerId="ADAL" clId="{F31BC264-820E-54C4-A6D1-F92AF9CC222E}" dt="2026-01-28T18:14:21.326" v="273"/>
+        <pc:sldMkLst>
+          <pc:docMk/>
+          <pc:sldMk cId="2203291535" sldId="340"/>
+        </pc:sldMkLst>
+        <pc:inkChg chg="add">
+          <ac:chgData name="Toby Donaldson" userId="2e6e5431-bb17-4c41-9985-d39c50d83c73" providerId="ADAL" clId="{F31BC264-820E-54C4-A6D1-F92AF9CC222E}" dt="2026-01-28T18:14:21.326" v="273"/>
+          <ac:inkMkLst>
+            <pc:docMk/>
+            <pc:sldMk cId="2203291535" sldId="340"/>
+            <ac:inkMk id="3" creationId="{9647195D-3C2B-D692-3305-B4714B1CCA13}"/>
+          </ac:inkMkLst>
+        </pc:inkChg>
+      </pc:sldChg>
+      <pc:sldChg chg="addSp">
+        <pc:chgData name="Toby Donaldson" userId="2e6e5431-bb17-4c41-9985-d39c50d83c73" providerId="ADAL" clId="{F31BC264-820E-54C4-A6D1-F92AF9CC222E}" dt="2026-01-28T18:14:21.326" v="273"/>
+        <pc:sldMkLst>
+          <pc:docMk/>
+          <pc:sldMk cId="1534370893" sldId="342"/>
+        </pc:sldMkLst>
+        <pc:inkChg chg="add">
+          <ac:chgData name="Toby Donaldson" userId="2e6e5431-bb17-4c41-9985-d39c50d83c73" providerId="ADAL" clId="{F31BC264-820E-54C4-A6D1-F92AF9CC222E}" dt="2026-01-28T18:14:21.326" v="273"/>
+          <ac:inkMkLst>
+            <pc:docMk/>
+            <pc:sldMk cId="1534370893" sldId="342"/>
+            <ac:inkMk id="2" creationId="{FD6FDE8A-869D-C113-8C06-8B6E28C9AE5A}"/>
+          </ac:inkMkLst>
+        </pc:inkChg>
+      </pc:sldChg>
+      <pc:sldChg chg="addSp">
+        <pc:chgData name="Toby Donaldson" userId="2e6e5431-bb17-4c41-9985-d39c50d83c73" providerId="ADAL" clId="{F31BC264-820E-54C4-A6D1-F92AF9CC222E}" dt="2026-01-28T18:14:21.326" v="273"/>
+        <pc:sldMkLst>
+          <pc:docMk/>
+          <pc:sldMk cId="1866605820" sldId="343"/>
+        </pc:sldMkLst>
+        <pc:inkChg chg="add">
+          <ac:chgData name="Toby Donaldson" userId="2e6e5431-bb17-4c41-9985-d39c50d83c73" providerId="ADAL" clId="{F31BC264-820E-54C4-A6D1-F92AF9CC222E}" dt="2026-01-28T18:14:21.326" v="273"/>
+          <ac:inkMkLst>
+            <pc:docMk/>
+            <pc:sldMk cId="1866605820" sldId="343"/>
+            <ac:inkMk id="3" creationId="{B79E35DA-0F52-F1C1-C037-0F49E15B327C}"/>
+          </ac:inkMkLst>
+        </pc:inkChg>
+      </pc:sldChg>
+      <pc:sldChg chg="addSp">
+        <pc:chgData name="Toby Donaldson" userId="2e6e5431-bb17-4c41-9985-d39c50d83c73" providerId="ADAL" clId="{F31BC264-820E-54C4-A6D1-F92AF9CC222E}" dt="2026-01-28T18:14:21.326" v="273"/>
+        <pc:sldMkLst>
+          <pc:docMk/>
+          <pc:sldMk cId="2420213860" sldId="347"/>
+        </pc:sldMkLst>
+        <pc:inkChg chg="add">
+          <ac:chgData name="Toby Donaldson" userId="2e6e5431-bb17-4c41-9985-d39c50d83c73" providerId="ADAL" clId="{F31BC264-820E-54C4-A6D1-F92AF9CC222E}" dt="2026-01-28T18:14:21.326" v="273"/>
+          <ac:inkMkLst>
+            <pc:docMk/>
+            <pc:sldMk cId="2420213860" sldId="347"/>
+            <ac:inkMk id="6" creationId="{743EA98C-A8FA-DB9F-8D63-D2E3432A5F4F}"/>
+          </ac:inkMkLst>
+        </pc:inkChg>
+      </pc:sldChg>
+      <pc:sldChg chg="addSp">
+        <pc:chgData name="Toby Donaldson" userId="2e6e5431-bb17-4c41-9985-d39c50d83c73" providerId="ADAL" clId="{F31BC264-820E-54C4-A6D1-F92AF9CC222E}" dt="2026-01-28T18:14:21.326" v="273"/>
+        <pc:sldMkLst>
+          <pc:docMk/>
+          <pc:sldMk cId="288871818" sldId="348"/>
+        </pc:sldMkLst>
+        <pc:inkChg chg="add">
+          <ac:chgData name="Toby Donaldson" userId="2e6e5431-bb17-4c41-9985-d39c50d83c73" providerId="ADAL" clId="{F31BC264-820E-54C4-A6D1-F92AF9CC222E}" dt="2026-01-28T18:14:21.326" v="273"/>
+          <ac:inkMkLst>
+            <pc:docMk/>
+            <pc:sldMk cId="288871818" sldId="348"/>
+            <ac:inkMk id="2" creationId="{20FB4869-66C2-BC1C-CF4B-044896FE3AEA}"/>
+          </ac:inkMkLst>
+        </pc:inkChg>
+      </pc:sldChg>
       <pc:sldChg chg="addSp delSp modSp mod">
         <pc:chgData name="Toby Donaldson" userId="2e6e5431-bb17-4c41-9985-d39c50d83c73" providerId="ADAL" clId="{F31BC264-820E-54C4-A6D1-F92AF9CC222E}" dt="2026-01-26T19:08:29.338" v="253" actId="313"/>
         <pc:sldMkLst>
           <pc:docMk/>
           <pc:sldMk cId="3424091404" sldId="349"/>
         </pc:sldMkLst>
-        <pc:spChg chg="add del mod">
-          <ac:chgData name="Toby Donaldson" userId="2e6e5431-bb17-4c41-9985-d39c50d83c73" providerId="ADAL" clId="{F31BC264-820E-54C4-A6D1-F92AF9CC222E}" dt="2026-01-26T19:08:02.617" v="226" actId="21"/>
-          <ac:spMkLst>
-            <pc:docMk/>
-            <pc:sldMk cId="3424091404" sldId="349"/>
-            <ac:spMk id="3" creationId="{ED4A5FC3-3592-AED5-3DA8-448BAAD37ECD}"/>
-          </ac:spMkLst>
-        </pc:spChg>
-        <pc:spChg chg="add del mod">
-          <ac:chgData name="Toby Donaldson" userId="2e6e5431-bb17-4c41-9985-d39c50d83c73" providerId="ADAL" clId="{F31BC264-820E-54C4-A6D1-F92AF9CC222E}" dt="2026-01-26T19:08:02.617" v="226" actId="21"/>
-          <ac:spMkLst>
-            <pc:docMk/>
-            <pc:sldMk cId="3424091404" sldId="349"/>
-            <ac:spMk id="5" creationId="{FD401CF1-9BC4-E33E-34DA-467919123E1F}"/>
-          </ac:spMkLst>
-        </pc:spChg>
-        <pc:spChg chg="add del mod">
-          <ac:chgData name="Toby Donaldson" userId="2e6e5431-bb17-4c41-9985-d39c50d83c73" providerId="ADAL" clId="{F31BC264-820E-54C4-A6D1-F92AF9CC222E}" dt="2026-01-26T19:08:02.617" v="226" actId="21"/>
-          <ac:spMkLst>
-            <pc:docMk/>
-            <pc:sldMk cId="3424091404" sldId="349"/>
-            <ac:spMk id="6" creationId="{DDC0CA87-906F-55EF-A75E-29FF5E38EAEE}"/>
-          </ac:spMkLst>
-        </pc:spChg>
         <pc:spChg chg="mod">
           <ac:chgData name="Toby Donaldson" userId="2e6e5431-bb17-4c41-9985-d39c50d83c73" providerId="ADAL" clId="{F31BC264-820E-54C4-A6D1-F92AF9CC222E}" dt="2026-01-26T19:08:29.338" v="253" actId="313"/>
           <ac:spMkLst>
@@ -368,14 +495,6 @@
             <ac:spMk id="10" creationId="{1E9732CF-CCC7-9A45-5C3F-AD20710202D3}"/>
           </ac:spMkLst>
         </pc:spChg>
-        <pc:inkChg chg="add del">
-          <ac:chgData name="Toby Donaldson" userId="2e6e5431-bb17-4c41-9985-d39c50d83c73" providerId="ADAL" clId="{F31BC264-820E-54C4-A6D1-F92AF9CC222E}" dt="2026-01-26T19:05:22.256" v="28" actId="21"/>
-          <ac:inkMkLst>
-            <pc:docMk/>
-            <pc:sldMk cId="3424091404" sldId="349"/>
-            <ac:inkMk id="2" creationId="{5AC1A167-78C3-B1EB-0C06-C5EB3DB9A9AB}"/>
-          </ac:inkMkLst>
-        </pc:inkChg>
       </pc:sldChg>
       <pc:sldChg chg="modSp mod">
         <pc:chgData name="Toby Donaldson" userId="2e6e5431-bb17-4c41-9985-d39c50d83c73" providerId="ADAL" clId="{F31BC264-820E-54C4-A6D1-F92AF9CC222E}" dt="2026-01-26T19:08:49.135" v="255" actId="122"/>
@@ -585,20 +704,34 @@
             <ac:spMk id="18" creationId="{AF83B70D-016B-FAC8-28B6-866D5EAD583E}"/>
           </ac:spMkLst>
         </pc:spChg>
-        <pc:inkChg chg="add del">
-          <ac:chgData name="Toby Donaldson" userId="2e6e5431-bb17-4c41-9985-d39c50d83c73" providerId="ADAL" clId="{F31BC264-820E-54C4-A6D1-F92AF9CC222E}" dt="2026-01-26T19:10:13.472" v="267" actId="21"/>
+      </pc:sldChg>
+      <pc:sldChg chg="modSp mod">
+        <pc:chgData name="Toby Donaldson" userId="2e6e5431-bb17-4c41-9985-d39c50d83c73" providerId="ADAL" clId="{F31BC264-820E-54C4-A6D1-F92AF9CC222E}" dt="2026-01-28T17:21:43.575" v="271" actId="113"/>
+        <pc:sldMkLst>
+          <pc:docMk/>
+          <pc:sldMk cId="4180737197" sldId="358"/>
+        </pc:sldMkLst>
+        <pc:spChg chg="mod">
+          <ac:chgData name="Toby Donaldson" userId="2e6e5431-bb17-4c41-9985-d39c50d83c73" providerId="ADAL" clId="{F31BC264-820E-54C4-A6D1-F92AF9CC222E}" dt="2026-01-28T17:21:43.575" v="271" actId="113"/>
+          <ac:spMkLst>
+            <pc:docMk/>
+            <pc:sldMk cId="4180737197" sldId="358"/>
+            <ac:spMk id="3" creationId="{4714037D-F5DF-1052-636E-EFB3458595AB}"/>
+          </ac:spMkLst>
+        </pc:spChg>
+      </pc:sldChg>
+      <pc:sldChg chg="addSp">
+        <pc:chgData name="Toby Donaldson" userId="2e6e5431-bb17-4c41-9985-d39c50d83c73" providerId="ADAL" clId="{F31BC264-820E-54C4-A6D1-F92AF9CC222E}" dt="2026-01-28T18:14:21.326" v="273"/>
+        <pc:sldMkLst>
+          <pc:docMk/>
+          <pc:sldMk cId="1710943946" sldId="360"/>
+        </pc:sldMkLst>
+        <pc:inkChg chg="add">
+          <ac:chgData name="Toby Donaldson" userId="2e6e5431-bb17-4c41-9985-d39c50d83c73" providerId="ADAL" clId="{F31BC264-820E-54C4-A6D1-F92AF9CC222E}" dt="2026-01-28T18:14:21.326" v="273"/>
           <ac:inkMkLst>
             <pc:docMk/>
-            <pc:sldMk cId="4284578572" sldId="356"/>
-            <ac:inkMk id="12" creationId="{3905B010-A453-B22B-ECDF-95791E688901}"/>
-          </ac:inkMkLst>
-        </pc:inkChg>
-        <pc:inkChg chg="add mod">
-          <ac:chgData name="Toby Donaldson" userId="2e6e5431-bb17-4c41-9985-d39c50d83c73" providerId="ADAL" clId="{F31BC264-820E-54C4-A6D1-F92AF9CC222E}" dt="2026-01-26T19:10:16.350" v="268"/>
-          <ac:inkMkLst>
-            <pc:docMk/>
-            <pc:sldMk cId="4284578572" sldId="356"/>
-            <ac:inkMk id="13" creationId="{DE74E998-0342-6B31-0A7A-7D280BBF7BC8}"/>
+            <pc:sldMk cId="1710943946" sldId="360"/>
+            <ac:inkMk id="9" creationId="{48E50C94-2E1E-9455-1F1C-5A502239909D}"/>
           </ac:inkMkLst>
         </pc:inkChg>
       </pc:sldChg>
@@ -716,14 +849,6 @@
           <pc:docMk/>
           <pc:sldMk cId="3573607454" sldId="306"/>
         </pc:sldMkLst>
-        <pc:spChg chg="add del mod">
-          <ac:chgData name="Toby Donaldson" userId="2e6e5431-bb17-4c41-9985-d39c50d83c73" providerId="ADAL" clId="{7F9681A8-EEE2-56F4-9B39-ECCBEE0471AC}" dt="2026-01-26T05:31:52.705" v="741"/>
-          <ac:spMkLst>
-            <pc:docMk/>
-            <pc:sldMk cId="3573607454" sldId="306"/>
-            <ac:spMk id="2" creationId="{9D406F8B-0336-FF1B-D1CE-8E6F88AA8610}"/>
-          </ac:spMkLst>
-        </pc:spChg>
         <pc:spChg chg="mod">
           <ac:chgData name="Toby Donaldson" userId="2e6e5431-bb17-4c41-9985-d39c50d83c73" providerId="ADAL" clId="{7F9681A8-EEE2-56F4-9B39-ECCBEE0471AC}" dt="2026-01-26T05:40:48.918" v="1070" actId="20577"/>
           <ac:spMkLst>
@@ -732,126 +857,6 @@
             <ac:spMk id="8" creationId="{40D284A6-37BC-F0E3-3E70-0F2FCEA02C14}"/>
           </ac:spMkLst>
         </pc:spChg>
-        <pc:spChg chg="del mod">
-          <ac:chgData name="Toby Donaldson" userId="2e6e5431-bb17-4c41-9985-d39c50d83c73" providerId="ADAL" clId="{7F9681A8-EEE2-56F4-9B39-ECCBEE0471AC}" dt="2026-01-26T05:31:50.238" v="739" actId="21"/>
-          <ac:spMkLst>
-            <pc:docMk/>
-            <pc:sldMk cId="3573607454" sldId="306"/>
-            <ac:spMk id="10" creationId="{00418111-740E-B339-2ED1-2BC013B15505}"/>
-          </ac:spMkLst>
-        </pc:spChg>
-        <pc:spChg chg="del">
-          <ac:chgData name="Toby Donaldson" userId="2e6e5431-bb17-4c41-9985-d39c50d83c73" providerId="ADAL" clId="{7F9681A8-EEE2-56F4-9B39-ECCBEE0471AC}" dt="2026-01-26T05:31:50.238" v="739" actId="21"/>
-          <ac:spMkLst>
-            <pc:docMk/>
-            <pc:sldMk cId="3573607454" sldId="306"/>
-            <ac:spMk id="13" creationId="{8D3351F3-A898-609E-5961-F04D85E787E1}"/>
-          </ac:spMkLst>
-        </pc:spChg>
-        <pc:spChg chg="del mod">
-          <ac:chgData name="Toby Donaldson" userId="2e6e5431-bb17-4c41-9985-d39c50d83c73" providerId="ADAL" clId="{7F9681A8-EEE2-56F4-9B39-ECCBEE0471AC}" dt="2026-01-26T05:31:50.238" v="739" actId="21"/>
-          <ac:spMkLst>
-            <pc:docMk/>
-            <pc:sldMk cId="3573607454" sldId="306"/>
-            <ac:spMk id="15" creationId="{5AE78048-1347-32E0-0A67-3C85D226F6B8}"/>
-          </ac:spMkLst>
-        </pc:spChg>
-      </pc:sldChg>
-      <pc:sldChg chg="del">
-        <pc:chgData name="Toby Donaldson" userId="2e6e5431-bb17-4c41-9985-d39c50d83c73" providerId="ADAL" clId="{7F9681A8-EEE2-56F4-9B39-ECCBEE0471AC}" dt="2026-01-26T05:29:39.797" v="680" actId="2696"/>
-        <pc:sldMkLst>
-          <pc:docMk/>
-          <pc:sldMk cId="2872453283" sldId="307"/>
-        </pc:sldMkLst>
-      </pc:sldChg>
-      <pc:sldChg chg="addSp modSp del mod">
-        <pc:chgData name="Toby Donaldson" userId="2e6e5431-bb17-4c41-9985-d39c50d83c73" providerId="ADAL" clId="{7F9681A8-EEE2-56F4-9B39-ECCBEE0471AC}" dt="2026-01-26T05:29:39.797" v="680" actId="2696"/>
-        <pc:sldMkLst>
-          <pc:docMk/>
-          <pc:sldMk cId="1882997732" sldId="310"/>
-        </pc:sldMkLst>
-        <pc:spChg chg="add mod">
-          <ac:chgData name="Toby Donaldson" userId="2e6e5431-bb17-4c41-9985-d39c50d83c73" providerId="ADAL" clId="{7F9681A8-EEE2-56F4-9B39-ECCBEE0471AC}" dt="2026-01-26T04:25:33.531" v="658" actId="207"/>
-          <ac:spMkLst>
-            <pc:docMk/>
-            <pc:sldMk cId="1882997732" sldId="310"/>
-            <ac:spMk id="2" creationId="{B108772A-05BC-7827-1F63-3C5C848A10F1}"/>
-          </ac:spMkLst>
-        </pc:spChg>
-        <pc:spChg chg="add mod">
-          <ac:chgData name="Toby Donaldson" userId="2e6e5431-bb17-4c41-9985-d39c50d83c73" providerId="ADAL" clId="{7F9681A8-EEE2-56F4-9B39-ECCBEE0471AC}" dt="2026-01-26T04:25:27.158" v="657" actId="1076"/>
-          <ac:spMkLst>
-            <pc:docMk/>
-            <pc:sldMk cId="1882997732" sldId="310"/>
-            <ac:spMk id="3" creationId="{32007A5D-1D2A-CE39-9D11-81E866B0FE10}"/>
-          </ac:spMkLst>
-        </pc:spChg>
-        <pc:spChg chg="add mod">
-          <ac:chgData name="Toby Donaldson" userId="2e6e5431-bb17-4c41-9985-d39c50d83c73" providerId="ADAL" clId="{7F9681A8-EEE2-56F4-9B39-ECCBEE0471AC}" dt="2026-01-26T04:25:27.158" v="657" actId="1076"/>
-          <ac:spMkLst>
-            <pc:docMk/>
-            <pc:sldMk cId="1882997732" sldId="310"/>
-            <ac:spMk id="5" creationId="{B10CCD46-ED86-5B67-9DDB-42E841192B83}"/>
-          </ac:spMkLst>
-        </pc:spChg>
-      </pc:sldChg>
-      <pc:sldChg chg="modSp del mod">
-        <pc:chgData name="Toby Donaldson" userId="2e6e5431-bb17-4c41-9985-d39c50d83c73" providerId="ADAL" clId="{7F9681A8-EEE2-56F4-9B39-ECCBEE0471AC}" dt="2026-01-26T05:32:47.068" v="748" actId="2696"/>
-        <pc:sldMkLst>
-          <pc:docMk/>
-          <pc:sldMk cId="3944662364" sldId="311"/>
-        </pc:sldMkLst>
-        <pc:spChg chg="mod">
-          <ac:chgData name="Toby Donaldson" userId="2e6e5431-bb17-4c41-9985-d39c50d83c73" providerId="ADAL" clId="{7F9681A8-EEE2-56F4-9B39-ECCBEE0471AC}" dt="2026-01-26T04:26:16.227" v="664" actId="14100"/>
-          <ac:spMkLst>
-            <pc:docMk/>
-            <pc:sldMk cId="3944662364" sldId="311"/>
-            <ac:spMk id="3" creationId="{045F883D-937C-5D1C-7E3B-1C7F97EBBEE3}"/>
-          </ac:spMkLst>
-        </pc:spChg>
-        <pc:cxnChg chg="mod">
-          <ac:chgData name="Toby Donaldson" userId="2e6e5431-bb17-4c41-9985-d39c50d83c73" providerId="ADAL" clId="{7F9681A8-EEE2-56F4-9B39-ECCBEE0471AC}" dt="2026-01-26T04:26:16.227" v="664" actId="14100"/>
-          <ac:cxnSpMkLst>
-            <pc:docMk/>
-            <pc:sldMk cId="3944662364" sldId="311"/>
-            <ac:cxnSpMk id="7" creationId="{4C610B4D-D8A4-A573-E862-D14B22A6F869}"/>
-          </ac:cxnSpMkLst>
-        </pc:cxnChg>
-      </pc:sldChg>
-      <pc:sldChg chg="modSp del mod">
-        <pc:chgData name="Toby Donaldson" userId="2e6e5431-bb17-4c41-9985-d39c50d83c73" providerId="ADAL" clId="{7F9681A8-EEE2-56F4-9B39-ECCBEE0471AC}" dt="2026-01-26T05:43:06.994" v="1116" actId="2696"/>
-        <pc:sldMkLst>
-          <pc:docMk/>
-          <pc:sldMk cId="2209025065" sldId="312"/>
-        </pc:sldMkLst>
-      </pc:sldChg>
-      <pc:sldChg chg="del">
-        <pc:chgData name="Toby Donaldson" userId="2e6e5431-bb17-4c41-9985-d39c50d83c73" providerId="ADAL" clId="{7F9681A8-EEE2-56F4-9B39-ECCBEE0471AC}" dt="2026-01-26T05:35:15.857" v="761" actId="2696"/>
-        <pc:sldMkLst>
-          <pc:docMk/>
-          <pc:sldMk cId="2701333559" sldId="313"/>
-        </pc:sldMkLst>
-      </pc:sldChg>
-      <pc:sldChg chg="del">
-        <pc:chgData name="Toby Donaldson" userId="2e6e5431-bb17-4c41-9985-d39c50d83c73" providerId="ADAL" clId="{7F9681A8-EEE2-56F4-9B39-ECCBEE0471AC}" dt="2026-01-26T05:43:14.793" v="1117" actId="2696"/>
-        <pc:sldMkLst>
-          <pc:docMk/>
-          <pc:sldMk cId="3461131009" sldId="314"/>
-        </pc:sldMkLst>
-      </pc:sldChg>
-      <pc:sldChg chg="del">
-        <pc:chgData name="Toby Donaldson" userId="2e6e5431-bb17-4c41-9985-d39c50d83c73" providerId="ADAL" clId="{7F9681A8-EEE2-56F4-9B39-ECCBEE0471AC}" dt="2026-01-26T05:43:52.286" v="1119" actId="2696"/>
-        <pc:sldMkLst>
-          <pc:docMk/>
-          <pc:sldMk cId="2266552019" sldId="315"/>
-        </pc:sldMkLst>
-      </pc:sldChg>
-      <pc:sldChg chg="del">
-        <pc:chgData name="Toby Donaldson" userId="2e6e5431-bb17-4c41-9985-d39c50d83c73" providerId="ADAL" clId="{7F9681A8-EEE2-56F4-9B39-ECCBEE0471AC}" dt="2026-01-26T05:43:47.583" v="1118" actId="2696"/>
-        <pc:sldMkLst>
-          <pc:docMk/>
-          <pc:sldMk cId="3858326061" sldId="316"/>
-        </pc:sldMkLst>
       </pc:sldChg>
       <pc:sldChg chg="addSp delSp modSp mod">
         <pc:chgData name="Toby Donaldson" userId="2e6e5431-bb17-4c41-9985-d39c50d83c73" providerId="ADAL" clId="{7F9681A8-EEE2-56F4-9B39-ECCBEE0471AC}" dt="2026-01-27T18:53:49.677" v="1391" actId="1076"/>
@@ -983,55 +988,6 @@
             <ac:spMk id="27" creationId="{9B04EE82-C785-BDA0-CB9E-42135606DB3D}"/>
           </ac:spMkLst>
         </pc:spChg>
-      </pc:sldChg>
-      <pc:sldChg chg="del">
-        <pc:chgData name="Toby Donaldson" userId="2e6e5431-bb17-4c41-9985-d39c50d83c73" providerId="ADAL" clId="{7F9681A8-EEE2-56F4-9B39-ECCBEE0471AC}" dt="2026-01-26T05:33:14.794" v="751" actId="2696"/>
-        <pc:sldMkLst>
-          <pc:docMk/>
-          <pc:sldMk cId="2849956798" sldId="332"/>
-        </pc:sldMkLst>
-      </pc:sldChg>
-      <pc:sldChg chg="del">
-        <pc:chgData name="Toby Donaldson" userId="2e6e5431-bb17-4c41-9985-d39c50d83c73" providerId="ADAL" clId="{7F9681A8-EEE2-56F4-9B39-ECCBEE0471AC}" dt="2026-01-26T05:33:48.075" v="754" actId="2696"/>
-        <pc:sldMkLst>
-          <pc:docMk/>
-          <pc:sldMk cId="3967795402" sldId="333"/>
-        </pc:sldMkLst>
-      </pc:sldChg>
-      <pc:sldChg chg="del">
-        <pc:chgData name="Toby Donaldson" userId="2e6e5431-bb17-4c41-9985-d39c50d83c73" providerId="ADAL" clId="{7F9681A8-EEE2-56F4-9B39-ECCBEE0471AC}" dt="2026-01-26T05:34:04.408" v="757" actId="2696"/>
-        <pc:sldMkLst>
-          <pc:docMk/>
-          <pc:sldMk cId="2618373808" sldId="334"/>
-        </pc:sldMkLst>
-      </pc:sldChg>
-      <pc:sldChg chg="del">
-        <pc:chgData name="Toby Donaldson" userId="2e6e5431-bb17-4c41-9985-d39c50d83c73" providerId="ADAL" clId="{7F9681A8-EEE2-56F4-9B39-ECCBEE0471AC}" dt="2026-01-26T05:43:47.583" v="1118" actId="2696"/>
-        <pc:sldMkLst>
-          <pc:docMk/>
-          <pc:sldMk cId="2716633986" sldId="335"/>
-        </pc:sldMkLst>
-      </pc:sldChg>
-      <pc:sldChg chg="del">
-        <pc:chgData name="Toby Donaldson" userId="2e6e5431-bb17-4c41-9985-d39c50d83c73" providerId="ADAL" clId="{7F9681A8-EEE2-56F4-9B39-ECCBEE0471AC}" dt="2026-01-26T05:43:47.583" v="1118" actId="2696"/>
-        <pc:sldMkLst>
-          <pc:docMk/>
-          <pc:sldMk cId="1424474129" sldId="336"/>
-        </pc:sldMkLst>
-      </pc:sldChg>
-      <pc:sldChg chg="del">
-        <pc:chgData name="Toby Donaldson" userId="2e6e5431-bb17-4c41-9985-d39c50d83c73" providerId="ADAL" clId="{7F9681A8-EEE2-56F4-9B39-ECCBEE0471AC}" dt="2026-01-26T05:43:47.583" v="1118" actId="2696"/>
-        <pc:sldMkLst>
-          <pc:docMk/>
-          <pc:sldMk cId="3046212211" sldId="337"/>
-        </pc:sldMkLst>
-      </pc:sldChg>
-      <pc:sldChg chg="del">
-        <pc:chgData name="Toby Donaldson" userId="2e6e5431-bb17-4c41-9985-d39c50d83c73" providerId="ADAL" clId="{7F9681A8-EEE2-56F4-9B39-ECCBEE0471AC}" dt="2026-01-26T05:43:47.583" v="1118" actId="2696"/>
-        <pc:sldMkLst>
-          <pc:docMk/>
-          <pc:sldMk cId="2280668604" sldId="338"/>
-        </pc:sldMkLst>
       </pc:sldChg>
       <pc:sldChg chg="delSp modSp del mod">
         <pc:chgData name="Toby Donaldson" userId="2e6e5431-bb17-4c41-9985-d39c50d83c73" providerId="ADAL" clId="{7F9681A8-EEE2-56F4-9B39-ECCBEE0471AC}" dt="2026-01-27T18:54:17.458" v="1393" actId="2696"/>
@@ -1302,14 +1258,6 @@
             <ac:spMk id="8" creationId="{7F1FC73A-BD70-4F9F-9DF1-3A2D449C19B9}"/>
           </ac:spMkLst>
         </pc:spChg>
-        <pc:spChg chg="del">
-          <ac:chgData name="Toby Donaldson" userId="2e6e5431-bb17-4c41-9985-d39c50d83c73" providerId="ADAL" clId="{7F9681A8-EEE2-56F4-9B39-ECCBEE0471AC}" dt="2026-01-26T05:32:37.056" v="747" actId="21"/>
-          <ac:spMkLst>
-            <pc:docMk/>
-            <pc:sldMk cId="4047988885" sldId="350"/>
-            <ac:spMk id="9" creationId="{40D76859-52AE-BC9B-8A6C-45E6B9E335FB}"/>
-          </ac:spMkLst>
-        </pc:spChg>
         <pc:cxnChg chg="add mod">
           <ac:chgData name="Toby Donaldson" userId="2e6e5431-bb17-4c41-9985-d39c50d83c73" providerId="ADAL" clId="{7F9681A8-EEE2-56F4-9B39-ECCBEE0471AC}" dt="2026-01-27T23:53:00.424" v="1628" actId="20577"/>
           <ac:cxnSpMkLst>
@@ -1474,30 +1422,6 @@
             <ac:spMk id="8" creationId="{78242C90-4079-CC54-4105-863C63F52FDC}"/>
           </ac:spMkLst>
         </pc:spChg>
-        <pc:spChg chg="del">
-          <ac:chgData name="Toby Donaldson" userId="2e6e5431-bb17-4c41-9985-d39c50d83c73" providerId="ADAL" clId="{7F9681A8-EEE2-56F4-9B39-ECCBEE0471AC}" dt="2026-01-26T05:34:53.138" v="759" actId="21"/>
-          <ac:spMkLst>
-            <pc:docMk/>
-            <pc:sldMk cId="2138968120" sldId="354"/>
-            <ac:spMk id="10" creationId="{968D84EB-9C22-6F7E-8F8E-0780695FA95C}"/>
-          </ac:spMkLst>
-        </pc:spChg>
-        <pc:spChg chg="del">
-          <ac:chgData name="Toby Donaldson" userId="2e6e5431-bb17-4c41-9985-d39c50d83c73" providerId="ADAL" clId="{7F9681A8-EEE2-56F4-9B39-ECCBEE0471AC}" dt="2026-01-26T05:34:53.138" v="759" actId="21"/>
-          <ac:spMkLst>
-            <pc:docMk/>
-            <pc:sldMk cId="2138968120" sldId="354"/>
-            <ac:spMk id="13" creationId="{458BBAB4-0DC1-FCE4-27C9-4283F71754CE}"/>
-          </ac:spMkLst>
-        </pc:spChg>
-        <pc:spChg chg="del">
-          <ac:chgData name="Toby Donaldson" userId="2e6e5431-bb17-4c41-9985-d39c50d83c73" providerId="ADAL" clId="{7F9681A8-EEE2-56F4-9B39-ECCBEE0471AC}" dt="2026-01-26T05:34:53.138" v="759" actId="21"/>
-          <ac:spMkLst>
-            <pc:docMk/>
-            <pc:sldMk cId="2138968120" sldId="354"/>
-            <ac:spMk id="15" creationId="{2055AEB8-1688-83A3-70A7-3A62EA928BCD}"/>
-          </ac:spMkLst>
-        </pc:spChg>
         <pc:spChg chg="add mod">
           <ac:chgData name="Toby Donaldson" userId="2e6e5431-bb17-4c41-9985-d39c50d83c73" providerId="ADAL" clId="{7F9681A8-EEE2-56F4-9B39-ECCBEE0471AC}" dt="2026-01-26T05:35:04.575" v="760"/>
           <ac:spMkLst>
@@ -1537,68 +1461,12 @@
             <ac:spMk id="2" creationId="{FCB63304-09AB-7EDF-7DFE-6FDD5A569A18}"/>
           </ac:spMkLst>
         </pc:spChg>
-        <pc:spChg chg="del mod">
-          <ac:chgData name="Toby Donaldson" userId="2e6e5431-bb17-4c41-9985-d39c50d83c73" providerId="ADAL" clId="{7F9681A8-EEE2-56F4-9B39-ECCBEE0471AC}" dt="2026-01-26T05:37:20.814" v="875" actId="21"/>
-          <ac:spMkLst>
-            <pc:docMk/>
-            <pc:sldMk cId="3628936488" sldId="355"/>
-            <ac:spMk id="3" creationId="{EE03776D-2CEF-15F2-2205-2B484D862ABD}"/>
-          </ac:spMkLst>
-        </pc:spChg>
-        <pc:spChg chg="del">
-          <ac:chgData name="Toby Donaldson" userId="2e6e5431-bb17-4c41-9985-d39c50d83c73" providerId="ADAL" clId="{7F9681A8-EEE2-56F4-9B39-ECCBEE0471AC}" dt="2026-01-26T05:36:17.402" v="768" actId="21"/>
-          <ac:spMkLst>
-            <pc:docMk/>
-            <pc:sldMk cId="3628936488" sldId="355"/>
-            <ac:spMk id="6" creationId="{B48C873E-DCA6-47EB-8C80-D8F01E4DABE3}"/>
-          </ac:spMkLst>
-        </pc:spChg>
         <pc:spChg chg="mod">
           <ac:chgData name="Toby Donaldson" userId="2e6e5431-bb17-4c41-9985-d39c50d83c73" providerId="ADAL" clId="{7F9681A8-EEE2-56F4-9B39-ECCBEE0471AC}" dt="2026-01-26T05:40:16.100" v="1063" actId="20577"/>
           <ac:spMkLst>
             <pc:docMk/>
             <pc:sldMk cId="3628936488" sldId="355"/>
             <ac:spMk id="8" creationId="{C77F9965-6A34-72C4-FE7B-49BA4630C2F1}"/>
-          </ac:spMkLst>
-        </pc:spChg>
-        <pc:spChg chg="del">
-          <ac:chgData name="Toby Donaldson" userId="2e6e5431-bb17-4c41-9985-d39c50d83c73" providerId="ADAL" clId="{7F9681A8-EEE2-56F4-9B39-ECCBEE0471AC}" dt="2026-01-26T05:36:17.402" v="768" actId="21"/>
-          <ac:spMkLst>
-            <pc:docMk/>
-            <pc:sldMk cId="3628936488" sldId="355"/>
-            <ac:spMk id="9" creationId="{DB78BEED-D3D9-FB66-5CEE-B4377246EB44}"/>
-          </ac:spMkLst>
-        </pc:spChg>
-        <pc:spChg chg="del">
-          <ac:chgData name="Toby Donaldson" userId="2e6e5431-bb17-4c41-9985-d39c50d83c73" providerId="ADAL" clId="{7F9681A8-EEE2-56F4-9B39-ECCBEE0471AC}" dt="2026-01-26T05:36:17.402" v="768" actId="21"/>
-          <ac:spMkLst>
-            <pc:docMk/>
-            <pc:sldMk cId="3628936488" sldId="355"/>
-            <ac:spMk id="12" creationId="{526093DE-4358-FC08-4494-BE3F28B9CE02}"/>
-          </ac:spMkLst>
-        </pc:spChg>
-        <pc:spChg chg="del">
-          <ac:chgData name="Toby Donaldson" userId="2e6e5431-bb17-4c41-9985-d39c50d83c73" providerId="ADAL" clId="{7F9681A8-EEE2-56F4-9B39-ECCBEE0471AC}" dt="2026-01-26T05:36:05.229" v="765" actId="21"/>
-          <ac:spMkLst>
-            <pc:docMk/>
-            <pc:sldMk cId="3628936488" sldId="355"/>
-            <ac:spMk id="16" creationId="{C1482488-AE79-6380-7086-1C8F37C56EFD}"/>
-          </ac:spMkLst>
-        </pc:spChg>
-        <pc:spChg chg="del">
-          <ac:chgData name="Toby Donaldson" userId="2e6e5431-bb17-4c41-9985-d39c50d83c73" providerId="ADAL" clId="{7F9681A8-EEE2-56F4-9B39-ECCBEE0471AC}" dt="2026-01-26T05:36:05.229" v="765" actId="21"/>
-          <ac:spMkLst>
-            <pc:docMk/>
-            <pc:sldMk cId="3628936488" sldId="355"/>
-            <ac:spMk id="17" creationId="{F8BD4E07-7491-A080-49D6-F91FB7A594E9}"/>
-          </ac:spMkLst>
-        </pc:spChg>
-        <pc:spChg chg="del mod">
-          <ac:chgData name="Toby Donaldson" userId="2e6e5431-bb17-4c41-9985-d39c50d83c73" providerId="ADAL" clId="{7F9681A8-EEE2-56F4-9B39-ECCBEE0471AC}" dt="2026-01-26T05:42:00.406" v="1084" actId="21"/>
-          <ac:spMkLst>
-            <pc:docMk/>
-            <pc:sldMk cId="3628936488" sldId="355"/>
-            <ac:spMk id="18" creationId="{871FA30F-4B41-F45D-00A1-AB38BB3F213C}"/>
           </ac:spMkLst>
         </pc:spChg>
         <pc:spChg chg="add mod">
@@ -1631,30 +1499,6 @@
             <pc:docMk/>
             <pc:sldMk cId="3628936488" sldId="355"/>
             <ac:cxnSpMk id="5" creationId="{5CFA78FB-2743-24F1-6227-E939BF29E756}"/>
-          </ac:cxnSpMkLst>
-        </pc:cxnChg>
-        <pc:cxnChg chg="del mod">
-          <ac:chgData name="Toby Donaldson" userId="2e6e5431-bb17-4c41-9985-d39c50d83c73" providerId="ADAL" clId="{7F9681A8-EEE2-56F4-9B39-ECCBEE0471AC}" dt="2026-01-26T05:36:19.364" v="769" actId="21"/>
-          <ac:cxnSpMkLst>
-            <pc:docMk/>
-            <pc:sldMk cId="3628936488" sldId="355"/>
-            <ac:cxnSpMk id="7" creationId="{B3283C1A-611A-2AE4-36C1-596C546A1544}"/>
-          </ac:cxnSpMkLst>
-        </pc:cxnChg>
-        <pc:cxnChg chg="del mod">
-          <ac:chgData name="Toby Donaldson" userId="2e6e5431-bb17-4c41-9985-d39c50d83c73" providerId="ADAL" clId="{7F9681A8-EEE2-56F4-9B39-ECCBEE0471AC}" dt="2026-01-26T05:36:17.402" v="768" actId="21"/>
-          <ac:cxnSpMkLst>
-            <pc:docMk/>
-            <pc:sldMk cId="3628936488" sldId="355"/>
-            <ac:cxnSpMk id="11" creationId="{26C8E626-567A-E57F-19CA-33295B4C885F}"/>
-          </ac:cxnSpMkLst>
-        </pc:cxnChg>
-        <pc:cxnChg chg="del mod">
-          <ac:chgData name="Toby Donaldson" userId="2e6e5431-bb17-4c41-9985-d39c50d83c73" providerId="ADAL" clId="{7F9681A8-EEE2-56F4-9B39-ECCBEE0471AC}" dt="2026-01-26T05:36:17.402" v="768" actId="21"/>
-          <ac:cxnSpMkLst>
-            <pc:docMk/>
-            <pc:sldMk cId="3628936488" sldId="355"/>
-            <ac:cxnSpMk id="14" creationId="{83BDB3B2-DD0E-0261-619E-95D0196AF3AA}"/>
           </ac:cxnSpMkLst>
         </pc:cxnChg>
       </pc:sldChg>
@@ -1904,6 +1748,321 @@
 </inkml:ink>
 </file>
 
+<file path=ppt/ink/ink10.xml><?xml version="1.0" encoding="utf-8"?>
+<inkml:ink xmlns:inkml="http://www.w3.org/2003/InkML">
+  <inkml:definitions>
+    <inkml:context xml:id="ctx0">
+      <inkml:inkSource xml:id="inkSrc0">
+        <inkml:traceFormat>
+          <inkml:channel name="X" type="integer" min="-2.14748E9" max="2.14748E9" units="cm"/>
+          <inkml:channel name="Y" type="integer" min="-2.14748E9" max="2.14748E9" units="cm"/>
+          <inkml:channel name="F" type="integer" max="32767" units="dev"/>
+        </inkml:traceFormat>
+        <inkml:channelProperties>
+          <inkml:channelProperty channel="X" name="resolution" value="1000" units="1/cm"/>
+          <inkml:channelProperty channel="Y" name="resolution" value="1000" units="1/cm"/>
+          <inkml:channelProperty channel="F" name="resolution" value="0" units="1/dev"/>
+        </inkml:channelProperties>
+      </inkml:inkSource>
+      <inkml:timestamp xml:id="ts0" timeString="2026-01-28T17:36:25.917"/>
+    </inkml:context>
+    <inkml:brush xml:id="br0">
+      <inkml:brushProperty name="width" value="0.05292" units="cm"/>
+      <inkml:brushProperty name="height" value="0.05292" units="cm"/>
+      <inkml:brushProperty name="color" value="#FF0000"/>
+    </inkml:brush>
+  </inkml:definitions>
+  <inkml:trace contextRef="#ctx0" brushRef="#br0">17180 8273 24575,'20'0'0,"11"0"0,5 15 0,3-11 0,-13 4 0,-1 0 0,2-8 0,-9 0 0,5 0 0,-19 0 0,12 0 0,0 0 0,-13 0 0,13 0 0,-16 0 0,16 0 0,3 0 0,1 0 0,27 0 0,-23 0 0,1 0 0,1 0 0,-7 0 0,12 0 0,-27 0 0,12-16 0,0 12 0,-12-11 0,11 15 0,-15-16 0,0 12 0,0-12 0,16 16 0,19 0 0,5-15 0,-14 13 0,-2 0 0,-4-14 0,-4 16 0,-16 0 0,0 0 0,-16 0 0,12 0 0,-12 16 0,1-12 0,11 11 0,-27-15 0,27 0 0,-28 0 0,28 0 0,-11 0 0,15 0 0,0 0 0,-16 0 0,12 16 0,-12-12 0,16 12 0,0-16 0,0 0 0,-15 0 0,11 0 0,-12 0 0</inkml:trace>
+  <inkml:trace contextRef="#ctx0" brushRef="#br0" timeOffset="13767">17515 9631 8191,'0'19'0,"0"-3"1638,26-13 0,11-6-745,0 3 1,5 0-894,1 0 0,6 0 0,0 0 381,-11 0 1,1 0-1,1 0 1,-1 0-382,2 0 0,-1 0 0,0 0 0,0 0 0,-1 0 0,-1 0 0,0 0 0,0 0 484,9 0 1,0 0 0,-2 0-485,-6 0 0,-1-1 0,-1 2 0,-2 4 0,1 1 0,-1-1 0,0-3 0,0-2 0,1 2 0,3 3 0,2 1 0,0-2 0,5-2 0,1-3 0,1 0 819,-10 1 0,0 0 0,0 0 0,1 0-508,4 0 0,1 0 0,0 0 0,-1 0-311,0 0 0,-1 0 0,0 0 0,0 0 0,2 0 0,0 0 0,0 0 0,0 0 0,0 0 0,1 0 0,-1 0 0,0 0 0,0 0 0,0 0 0,0 0 0,0 0 0,-1 0 0,-1 0 0,0 0 0,0 0 0,-2 0 0,0 0 0,0 0 0,-2 0-177,8 0 1,-1 0-1,-2 0 177,-6 0 0,-2 0 0,-1 0 721,2 0 0,-2 0-721,-7 0 0,-3 0 626,11 0-626,-15 0 1631,-4 0-1631,-1 0 652,-11 0-652,43 0 0,-23 0 0,1-7 0,1-1 0,9 4 0,0-12 0,-15 16 0,-4 0 0,-16 0 0</inkml:trace>
+  <inkml:trace contextRef="#ctx0" brushRef="#br0" timeOffset="35451">25030 16633 24575,'25'0'0,"1"0"0,7 0 0,4 0 0,-3 0 0,2 0 0,0 0-360,0 0 0,1 0 0,0 0 360,3 1 0,1 0 0,-1-3 0,-4-2 0,0-2 0,-2 1 0,12 3 0,-2 0 176,1-6 1,-4 0-177,-12 8 0,-3 0 89,4-7 1,-1-1-90,-3 6 0,1 0 0,3-6 0,3 0 0,-1 6 0,2 3 0,2 0-219,0-1 1,0 0 0,1 0 218,4 0 0,1 0 0,1 0 0,2 1 0,2-1 0,-2-1 0,-3-4 0,0-1 0,-1 1 0,-1 4 0,0 0 0,-2-1 0,-3-3 0,0-1 0,-1 2 249,14 3 0,-2 2-249,-9-1 0,0 0 0,7 0 0,-1 0 0,-8 1 0,0-2 0,1-7 0,-1 0 0,0 7 0,0-2 0,7-13 0,3 1 0,-11 12 0,2 4 0,-1-3-20,2-7 1,-1-3-1,1 1 20,6 4 0,1 1 0,-1 0 0,-7-1 0,0 0 0,-1 1 0,3 0 0,1 0 0,-2 3 16,9 2 0,-2 2-16,0-1 0,-2 0 0,-5 0 0,-3 0 0,-6 0 0,-1 0 0,-1 0 0,-1 0 0,10 0 732,0 0-732,1 0 0,-17 0 0,13 0 0,-29 0 0,29 0 0,-28 0 0,27 0 0,4 0 0,5 0 0,-12 0 0,2 0 0,-3 0 0,-1 0 0,21 0 0,-21 0 0,-1 0 0,11 0 0,-11 0 0,1 0 0,13 0 0,-14 0 0,1 0 0,9 0 0,0 0 0,-15 0 0,11 0 0,-11 0 0,15 0 0,-15 0 0,11 0 0,-27 0 0,27 15 0,-27-11 0,12 12 0,-16-16 0,0 0 0,0 0 0</inkml:trace>
+</inkml:ink>
+</file>
+
+<file path=ppt/ink/ink11.xml><?xml version="1.0" encoding="utf-8"?>
+<inkml:ink xmlns:inkml="http://www.w3.org/2003/InkML">
+  <inkml:definitions>
+    <inkml:context xml:id="ctx0">
+      <inkml:inkSource xml:id="inkSrc0">
+        <inkml:traceFormat>
+          <inkml:channel name="X" type="integer" min="-2.14748E9" max="2.14748E9" units="cm"/>
+          <inkml:channel name="Y" type="integer" min="-2.14748E9" max="2.14748E9" units="cm"/>
+          <inkml:channel name="F" type="integer" max="32767" units="dev"/>
+        </inkml:traceFormat>
+        <inkml:channelProperties>
+          <inkml:channelProperty channel="X" name="resolution" value="1000" units="1/cm"/>
+          <inkml:channelProperty channel="Y" name="resolution" value="1000" units="1/cm"/>
+          <inkml:channelProperty channel="F" name="resolution" value="0" units="1/dev"/>
+        </inkml:channelProperties>
+      </inkml:inkSource>
+      <inkml:timestamp xml:id="ts0" timeString="2026-01-28T17:38:27.834"/>
+    </inkml:context>
+    <inkml:brush xml:id="br0">
+      <inkml:brushProperty name="width" value="0.05292" units="cm"/>
+      <inkml:brushProperty name="height" value="0.05292" units="cm"/>
+      <inkml:brushProperty name="color" value="#FF0000"/>
+    </inkml:brush>
+  </inkml:definitions>
+  <inkml:trace contextRef="#ctx0" brushRef="#br0">24342 8449 24575,'35'0'0,"0"0"0,8 0 0,0 0 0,2 0 0,1 0 0,-1 0 0,0 0 0,-9 0 0,-2 0 0,-7 0 0,-3 0 0,12 0 0,-17 0 0,13 0 0,-21 0 0,23 0 0,9 0 0,-17-7 0,3-2 0,6 8 0,0-2 0,-7-12 0,-1-1 0,0 14 0,-3 0 0,-4-14 0,-5 16 0,-30 0 0,-5 0 0,0 0 0,-11 0 0,11 0 0,-15 0 0,10 0 0,-1 0 0,-13 0 0,10 0 0,-1 0 0,4 0 0,-1 0 0,-4 0 0,0 0 0,3 0 0,1 0 0,-8 0 0,3 0 0,9 0 0,-25 0 0,29 0 0,-1 0 0,-11 0 0,27 0 0,-27 0 0,27 0 0,-12 0 0,16 0 0,0 0 0,0 16 0,0-12 0,16 12 0,-12-16 0,11 15 0,-15-11 0,-15 12 0,11 0 0,-12-12 0,0 27 0,12-27 0,-27 12 0,27-16 0,-27 0 0,27 0 0,-12 0 0</inkml:trace>
+</inkml:ink>
+</file>
+
+<file path=ppt/ink/ink12.xml><?xml version="1.0" encoding="utf-8"?>
+<inkml:ink xmlns:inkml="http://www.w3.org/2003/InkML">
+  <inkml:definitions>
+    <inkml:context xml:id="ctx0">
+      <inkml:inkSource xml:id="inkSrc0">
+        <inkml:traceFormat>
+          <inkml:channel name="X" type="integer" min="-2.14748E9" max="2.14748E9" units="cm"/>
+          <inkml:channel name="Y" type="integer" min="-2.14748E9" max="2.14748E9" units="cm"/>
+          <inkml:channel name="F" type="integer" max="32767" units="dev"/>
+        </inkml:traceFormat>
+        <inkml:channelProperties>
+          <inkml:channelProperty channel="X" name="resolution" value="1000" units="1/cm"/>
+          <inkml:channelProperty channel="Y" name="resolution" value="1000" units="1/cm"/>
+          <inkml:channelProperty channel="F" name="resolution" value="0" units="1/dev"/>
+        </inkml:channelProperties>
+      </inkml:inkSource>
+      <inkml:timestamp xml:id="ts0" timeString="2026-01-28T17:39:27.318"/>
+    </inkml:context>
+    <inkml:brush xml:id="br0">
+      <inkml:brushProperty name="width" value="0.05292" units="cm"/>
+      <inkml:brushProperty name="height" value="0.05292" units="cm"/>
+      <inkml:brushProperty name="color" value="#FF0000"/>
+    </inkml:brush>
+  </inkml:definitions>
+  <inkml:trace contextRef="#ctx0" brushRef="#br0">15099 9878 24575,'43'0'0,"0"0"0,-5 0 0,-1 0 0,-2 0 0,0 0 0,0 0 0,-3 0 0,7 0 0,-13 0 0,-1 0 0,2 0 0,7 0 0,-7 0 0,-2 0 0,1 0 0,13 0 0,-5 0 0,-1 0 0,6 0 0,-6 0 0,1 0 0,-6 0 0,-1 0 0,0 0 0,1 0 0,6 0 0,-2 0 0,7 0 0,-13 0 0,-1 0 0,11 0 0,-1 0 0,-10 0 0,1 0 0,13 0 0,-4 0 0,-3 0 0,-28 0 0,11 0 0,1 0 0,4 0 0,15 0 0,8 0 0,-6 0 0,6 0 0,-7 0 0,-1 0 0,0 0 0,-15 0 0,11 0 0,-11 0 0,15 0 0,-10 0 0,1 0 0,1 0 0,1 0 0,7 0 0,0 0 0,1 0 0,-1 0 0,-6 0 0,-3 0 0,9 0 0,-4 0 0,-27 0 0,12 0 0,0 0 0,-12 15 0,11-11 0,-15 12 0</inkml:trace>
+</inkml:ink>
+</file>
+
+<file path=ppt/ink/ink13.xml><?xml version="1.0" encoding="utf-8"?>
+<inkml:ink xmlns:inkml="http://www.w3.org/2003/InkML">
+  <inkml:definitions>
+    <inkml:context xml:id="ctx0">
+      <inkml:inkSource xml:id="inkSrc0">
+        <inkml:traceFormat>
+          <inkml:channel name="X" type="integer" min="-2.14748E9" max="2.14748E9" units="cm"/>
+          <inkml:channel name="Y" type="integer" min="-2.14748E9" max="2.14748E9" units="cm"/>
+          <inkml:channel name="F" type="integer" max="32767" units="dev"/>
+        </inkml:traceFormat>
+        <inkml:channelProperties>
+          <inkml:channelProperty channel="X" name="resolution" value="1000" units="1/cm"/>
+          <inkml:channelProperty channel="Y" name="resolution" value="1000" units="1/cm"/>
+          <inkml:channelProperty channel="F" name="resolution" value="0" units="1/dev"/>
+        </inkml:channelProperties>
+      </inkml:inkSource>
+      <inkml:timestamp xml:id="ts0" timeString="2026-01-28T17:40:08.084"/>
+    </inkml:context>
+    <inkml:brush xml:id="br0">
+      <inkml:brushProperty name="width" value="0.05292" units="cm"/>
+      <inkml:brushProperty name="height" value="0.05292" units="cm"/>
+      <inkml:brushProperty name="color" value="#FF0000"/>
+    </inkml:brush>
+  </inkml:definitions>
+  <inkml:trace contextRef="#ctx0" brushRef="#br0">9102 5997 24575,'35'0'0,"-11"0"0,3 0 0,7 0 0,2 0 0,1 0 0,1 0 0,-5 0 0,2 0 0,-1 0 0,3 0 0,0 0 0,-4 0 0,2 0 0,-1 0-290,1 0 0,0 0 0,1 0 290,2 0 0,1 0 0,2 0-323,-4 0 1,2 0-1,0 0 1,0 0 322,0 0 0,-2 0 0,1 0 0,1 0 0,5 0 0,0 0 0,1 0 0,-1 0 0,-3 0 0,-1 0 0,0 0 0,-1 0 0,1 0 0,0 0 0,-1 0 0,-1 0-235,8 0 1,-2 0 0,0 0 234,-3 0 0,-1 0 0,2 0 0,5 1 0,2-1 0,0-1-531,-1-3 0,-1-2 1,3 1 530,-4 3 0,3 1 0,0 1 0,-1-1 0,-2-3 0,-1 0 0,-1-1 0,1 2 0,2 2 0,-1 1 0,1 1 0,-2-1 0,-4 0 0,-1 1 0,0-1 0,-3-1 174,5-4 0,-3-1 0,-2 1-174,8 4 0,-4-2 679,-13-5 1,-5 1-680,-3 7-820,-5 0 1,-15 0 0,0 0 0</inkml:trace>
+  <inkml:trace contextRef="#ctx0" brushRef="#br0" timeOffset="2233">9278 5715 24575,'-16'20'0,"1"2"0,-5 3 0,-6-6 0,-3 1 0,1 1 0,-2 4 0,2-1 0,-6 13 0,1-3 0,-3-14 0,4-1 0,17 5 0,2-1 0,-18-3 0,27-1 0,-12-3 0,16 0 0,16-12 0,-12 11 0,12-15 0,-1 16 0,-3-4 0,11 3 0,3 3 0,-3 2 0,1 3 0,3 3 0,3 4 0,-1 0-317,1 1 0,1 0 0,-1 2 317,0 2 0,0 1 0,0-2 0,-1-3 0,1-2 0,-3-2 0,1 1 0,-1-2 0,0 2 0,-3-5 0,-5-3 0,-3-4 0,-16-16 0</inkml:trace>
+  <inkml:trace contextRef="#ctx0" brushRef="#br0" timeOffset="14866">3422 8696 24575,'20'0'0,"-5"0"0,1 0 0,-12 0 0,27-16 0,-11 12 0,4-4 0,3 1 0,0 6 0,1 2 0,7-1 0,0 0 0,-7 0 0,-1 0 0,-1 0 0,-1 0 0,10 0 0,-15 0 0,11 0 0,-11 0 0,15 0 0,0 0 0,-15 0 0,-4 0 0,-16 0 0</inkml:trace>
+  <inkml:trace contextRef="#ctx0" brushRef="#br0" timeOffset="16867">6756 9807 24575,'15'20'0,"-11"-4"0,28-16 0,-13 0 0,17 0 0,-1 0 0,-9-2 0,-1 4 0,-2 13 0,24-11 0,-35 12 0,6-16 0,-10 0 0,-8 0 0,0 0 0</inkml:trace>
+  <inkml:trace contextRef="#ctx0" brushRef="#br0" timeOffset="27433">3598 12294 24575,'36'0'0,"2"0"0,6 0 0,1 0 0,4 0-820,-10 0 1,5 0 0,1 0 0,-1 0 683,-1 0 0,0 0 0,0 0 0,1 0 136,4 0 0,1 0 0,0 0 0,-1 0 0,-5 0 0,-1 0 0,0 0 0,0 0-66,-3 0 0,1 0 1,-1 0-1,-1 0 66,10 0 0,-1 0 0,-1 0 0,-3 0 0,-1-1 0,-1 2 312,-5 4 1,0 1-1,-2-1-312,6-3 0,-2 0 0,-3 6 0,-1 0 0,-3-8 0,0 0 943,4 0 0,1 0-943,-1 0 0,1 0 630,-1 0 1,0 0-631,-7 0 0,-1 0 0,6 0 0,1 0 0,-7 0 0,0 0 0,1 0 0,-1 0 0,-1 0 0,-1 0 0,1 0 0,-1 0 0,14 0 0,-14 0 0,1 0 0,-1 0 0,1 0 0,9 0 0,1 0 0,-4 0 0,3 0 0,1 0 0,5 0 0,-3 0-441,5 0 0,0 0 441,-7 0 0,3 0 0,1 0 0,-2 0 0,6 0 0,-2 0 0,2 0-359,-3 0 0,3 0 1,0 0-1,-1 0 359,6 0 0,-1 0 0,0 0 0,2 0 0,0 0 0,-1 0-269,-7 0 0,-1 0 1,0 0 268,2 0 0,0 0 0,0 0 0,-6 0 0,0 0 0,-1 0-7,-1 0 1,1 0-1,-2 0 7,11 0 0,-3 0 390,-7 0 0,0 0-390,0 0 0,1 0 715,7 0 1,0 0-716,-6 0 0,1 0 0,8 0 0,2 0 0,-15 0 0,2 0 0,0 0-251,8 0 1,1 0 0,3 0 250,-5 0 0,1 0 0,2 1 0,1-2-540,-5-1 1,1-1-1,1 0 1,0-1 0,0 0 539,1-2 0,1-1 0,-1 0 0,1-1 0,0 1 0,1-1 0,0 1 0,0-1 0,0 0 0,0-1 0,-2 0 0,0-3 0,0 1 0,0 1 0,-1 1-333,7 3 1,0 2-1,-1 0 1,-2-1 332,-5-3 0,-1-1 0,-2 1 0,0 2 0,4 3 0,-2 3 0,-4-1 0,1-8 0,-5 2 325,10 7 1,-25 0 0,-11 0 0</inkml:trace>
+  <inkml:trace contextRef="#ctx0" brushRef="#br0" timeOffset="31034">6685 13511 24575,'33'0'0,"1"0"0,2 0 0,2 0 0,-3 0 0,1 0 0,-1 0 0,7 0 0,-2 0 0,-5 0 0,-1 0 0,-4 0 0,-1 0 0,10 0 0,-14 0 0,1 0 0,-1 0 0,1 0 0,1 0 0,1 0 0,6 0 0,2 0 0,7 0 0,1 0 0,0 0 0,2 0-243,-7 0 1,3 0 0,-2 0 242,-3 1 0,-1-1 0,1-1 0,5-3 0,2-2 0,-1 1 0,-1 3 0,-2 1 0,2 0 0,2-4 0,0-1 0,1 1 0,2 4 0,1 2 0,-2-1 0,-4 0 0,0 0 0,0 0 0,3 0 0,2 0 0,-2 0 0,-8 0 0,-1 0 0,1 0 0,5 0 0,2 0 0,-1 0 0,-7 0 0,-1 0 0,2 0 0,5 1 0,2-1 0,-1-1 0,-6-3 0,-1-3 0,1 2 0,3 4 0,1 0 0,-1 0 0,-4-4 0,0-2 0,-2 3-75,11 3 1,0 2 74,-11-1 0,1 0 0,-2 0 0,5 0 0,-1 0 0,6 0 0,0 0 0,-11 0 0,-1 0 0,-5 0 0,1 0 0,3 0 0,-2 0 721,12 0-721,-7 0 0,0 0 155,6 0-155,-5 0 0,-1 0 0,6 0 0,-5 0 0,-1 0 0,6 0 0,-4 0 0,-3 0 0,-13 0 0,17 0 0,-11 0 0,1 0 0,13 0 0,-13 0 0,-1 0 0,-6 0 0,13 0 0,-28 0 0,27 0 0,-11 0 0,4 0 0,2 0 0,22 0 0,-8 0 0,4 0 0,-4 0 0,2 0 0,-7 0 0,1 0 0,-1 0 0,11 0 0,-2 0 0,0 0 0,-2 0 0,-5 0 0,-3 0 0,-5 0 0,-3 0 0,9 0 0,-4 0 0,-11 0 0,0 0 0,11 0 0,4 0 0,4 0 0,2 0 0,1 0 0,-17 0 0,1 0 0,15 0 0,2 0 0,-11 0 0,-1 0 0,4 0 0,0 0 0,-7 0 0,-1 0 0,-1 0 0,-1 0 0,10 0 0,-15 0 0,11 0 0,-27 0 0,28 0 0,3 0 0,-9 0 0,3 0 0,13 0 0,2 0 0,0 0 0,2 0 0,-11 0 0,2 0 0,-3 0 0,4 0 0,-2 0 0,0 0 0,-5 0 0,-11 0 0,-5 0 0,-15 0 0</inkml:trace>
+  <inkml:trace contextRef="#ctx0" brushRef="#br0" timeOffset="42966">3634 15998 24575,'19'0'0,"-3"0"0,0 0 0,19 0 0,-9 0 0,3 0 0,5 0 0,2 0 0,0 0 0,-1 0 0,0 0 0,0 0 0,1 0 0,-1 0 0,-7 0 0,-1 0 0,-1 0 0,-1 0 0,10 0 0,-8 0 0,22 0 0,-17 0 0,0 0 0,2 0 0,-6 0 0,-1 0 0,8 0 0,1 0 0,-1 0 0,0 0 0,0 0 0,1 0 0,7 0 0,0 0 0,-5 0 0,-1 0 0,7 0 0,-2 0 0,-14 0 0,-1 0 0,0 0 0,-3 0 0,-5 0 0,-3 0 0</inkml:trace>
+  <inkml:trace contextRef="#ctx0" brushRef="#br0" timeOffset="45633">7038 17216 24575,'38'0'0,"0"0"0,10 0 0,2 0 0,-9 0 0,1 1 0,1-2-315,-1-4 0,0-1 0,-1 1 315,-4 3 0,-1 2 0,-3-2 155,4-6 0,-3 0-155,-8 8 0,-1 0 157,10 0-157,-16 0 0,-3 0 0,0 0 478,3 0-478,5 0 0,3 0 0,0 0 0,1 0 0,11 0 0,1 0 0,-11 0 0,-2 0 0,4 0 0,-3 0 0,8 0 0,-17 0 0,12 0 0,-27-15 0,12 11 0,-32-12 0,12 16 0,-11 0 0</inkml:trace>
+  <inkml:trace contextRef="#ctx0" brushRef="#br0" timeOffset="104383">27905 4886 24575,'43'0'0,"0"0"0,-5 0 0,3 0 0,1 0 0,-3 0 0,1 0 0,1 0 0,0 0-820,3 0 1,2 0 0,-1 0 0,0 0 748,2 0 1,0 0 0,-1 0 0,-1 0 70,5 0 0,-2 0 0,-3 0 555,6 0 1,-4 0-556,-12 0 0,-4 0 583,5 0-583,-1 0 0,-15 0 0,11 0 1864,-27 0-1864,12 0 0,-1 0 0,-11 0 0,12 0 0,-1 0 0,-11 0 0,12 0 0,-16 0 0,16 0 0,-12 0 0,11 0 0,-15 0 0,16 0 0,-12 0 0,27 0 0,-27 0 0,12 0 0,0 0 0,-12 0 0,11 0 0,1 0 0,-12 0 0,27 0 0,-27 0 0,27 0 0,-27 0 0,12 0 0,0 0 0,-12 0 0,11 0 0,-15 0 0,0 0 0,16 0 0,-12 0 0,12 16 0,-16-12 0,0 11 0,0-15 0,0 0 0,0 16 0,0-12 0,0 12 0,0-1 0,0-11 0,0 12 0,0-16 0,0 15 0,0-11 0,0 12 0</inkml:trace>
+  <inkml:trace contextRef="#ctx0" brushRef="#br0" timeOffset="128701">28081 8731 24575,'26'0'0,"-1"0"0,9 0 0,3 0 0,-4 0 0,3 0 0,0 0-361,1 0 0,-1 0 1,1 0 360,3 0 0,1 0 0,0 0 0,-3 0 0,0 0 0,-1 0 0,-1 0 0,0 0 0,0 0 0,7 0 0,0 0 0,1 0 0,-3 0 0,1 0 0,0 0 0,0 0 0,0 0 0,-1 0 0,1 0 0,0 0 0,-4 0 0,0 0 0,-2 0 177,8 0 0,-5 0-177,-16 0 179,24 0-179,-11 0 0,3 0 0,-10 0 0,1 0 549,7 0-549,-8 0 0,1 0 0,9 0 0,-4 0 0,-4 0 0,-11 0 0,0 0 0,11 0 0,-27 0 0,27 0 0,-27 0 0,12 16 0,-16-12 0,16 12 0,3-16 0,16 0 0,1 0 0,-11 0 0,1 0 0,13 0 0,-6 0 0,0 0 0,7 0 0,-14 0 0,-1 0 0,-6 0 0,13 0 0,-29 0 0,13 0 0,-16 0 0,0 0 0</inkml:trace>
+  <inkml:trace contextRef="#ctx0" brushRef="#br0" timeOffset="146866">28293 8520 24575,'25'0'0,"1"0"0,13 0 0,-6 0 0,1 0 0,5 0 0,-13 0 0,-1 0 0,-6 0 0,-3 0 0,-47 0 0,23 0 0,-39 0 0,43 0 0,-12 0 0,0 0 0,13 0 0,-13 15 0,0-11 0,12 12 0,-27-16 0,11 0 0,1 0 0,-13 0 0,28 0 0,-27 0 0,27 0 0,-11 0 0,15 0 0,0 0 0,15 0 0,-11 0 0,27 0 0,-27 0 0,28 0 0,-28 0 0,11 0 0,1 0 0,-12 0 0,12 0 0,-32 0 0,12 0 0,-12 0 0,16 0 0,0 0 0</inkml:trace>
+  <inkml:trace contextRef="#ctx0" brushRef="#br0" timeOffset="151101">6262 5133 24575,'43'0'0,"0"0"0,-9 0 0,1 0 0,2 0 0,0 0 0,2 0 0,1 0 0,1 0-300,2 0 1,1 0 0,1 0 0,3 0 299,-6 0 0,3 0 0,1 0 0,1 0 0,-2 0 0,-3 0-331,4 0 0,-1 0 0,-2 0 0,1 0 331,5 0 0,2 0 0,-2 0 0,-6 0 0,2 0 0,-4 0 299,1 1 1,2-2-300,0-3 0,4-3 0,-2 2 0,-9 4 0,-2 0 0,2-1 0,9-3 0,1-1 0,-4 2 0,-2 3 0,-4 2 0,-9-1 0,-1 0 0,6 0 0,0 0 283,-5 0 1,-1 0-284,8 0 0,1 0 677,-1 0 1,0 0-678,1 0 0,-1 0 0,-7 0 0,-1 0 0,7 0 0,-1 0 0,6 0 0,0-8 0,4 0 0,-6 6 0,1 0 0,9-6 0,4 0 0,-17 7 0,0 2 0,1-1-197,3 0 0,0 0 1,0 0 196,-1 0 0,-1 0 0,1 0 0,4 0 0,0 0 0,-2 0 0,9 0 0,-6 0 0,-13 0 0,-3 0 0,21 0 0,-43 0 0,28 0 0,-28 0 0,27 16 590,4-12-590,4 12 0,-5-16 0,-1 0 0,6 15 0,-3-11 0,-21 12 0,-15-16 0</inkml:trace>
+  <inkml:trace contextRef="#ctx0" brushRef="#br0" timeOffset="153632">11571 12188 24575,'43'0'0,"0"0"0,0 0 0,0 0 0,-1 0 0,1 0 0,5 0 0,2 0 0,1 0-820,-9 0 1,2 0 0,-1 0 0,0 0 727,-2 0 0,0 0 0,0 0 0,1 0 92,7 0 0,1 0 0,1 0 0,-1 0 0,-5 0 0,-1 0 0,1 0 0,-1 0 0,3 0 0,-1 0 0,1 0 0,-3 0 0,6 0 0,-2 0 0,-1 0 293,1 0 0,-1 0 1,-4 0-294,-5 0 0,-2 0 327,6 0 0,-2 0-327,-12 0 0,-1 0 0,8 0 0,1 0 0,0 0 0,-2 0 945,-5 0 1,-3 0-946,17 0 220,-9 0-220,-23 0 0,5 0 0,0 0 0,19-15 0,-1 12 0,3 2 0,-1-7 0,2 0 0,5 7 0,0 2 0,-6-1 0,-3 0 0,-5 0 0,-3 0 0,9 0 0,-19 0 0,-1 0 0,5 16 0,10-14 0,7 0 0,-4 7 0,3 3 0,0-2-384,4-2 1,0-2 0,2 0 383,-4-2 0,2 1 0,-1-1 0,-1 2 0,3 5 0,-2 1 0,-2-3 0,10-7 0,-3 0 0,-9 6 0,-4-1 0,5-7 0,-17 16 0,-3-12 0,-1 12 1150,-11-16-1150,28 0 0,-13 0 0,1 0-820,11 0 1,-27 0 0,12 0 0</inkml:trace>
+  <inkml:trace contextRef="#ctx0" brushRef="#br0" timeOffset="155784">6332 8661 24575,'38'0'0,"0"0"0,0 0 0,0 0 0,3 0 0,1 0 0,2 0 0,-1 0 0,1 0 0,2 0 0,1 0 0,0 0-547,-4 0 1,0 0 0,1 0 0,0 0 0,0 0 0,-1 0 16,5 0 1,0 0-1,-1 0 1,1 0-1,0 0 530,1 0 0,1 0 0,0 0 0,-1 0 0,0 0 0,-4 0 0,-1 0 0,1 0 0,-1 0 0,1 0 0,3 0 0,0 0 0,1 0 0,-1 0 0,0 0 0,-3 0 0,0 0 0,-1 0 0,1 0 0,0 0-176,1 0 1,0 0 0,1 0-1,-1 0 1,0 0 175,-3-1 0,0 1 0,-1-1 0,0 2 0,0 0 305,4 2 1,-1 0 0,1 2 0,1-1-306,-3 0 0,2 0 0,0 0 0,-2 0 0,-3 0 0,6 2 0,-5 0 0,3 2 0,-4-1 0,3 3 0,-2-2 0,-5-2 0,1-5 0,-5 2 0,-6 13 0,1-1 0,5-12 0,0-2 1387,-6 6 1,1 2-1388,14-1 0,2-1 0,4 3 0,2 0 557,-9-3 0,0 0 0,1-1-557,-3 0 0,0-1 0,0-1 0,7-2 0,1-3 0,-2 0 0,-8 1 0,-1 0 0,0 0 99,1 0 0,-1 0 0,-3 0-99,4 0 0,-3 0 0,-8 0 0,-1 0 0,10 0 0,-15 0 0,-5 0 0</inkml:trace>
+  <inkml:trace contextRef="#ctx0" brushRef="#br0" timeOffset="161784">28046 8590 24575,'35'0'0,"-10"0"0,1 0 0,13 0 0,-3 0 0,-5 0 0,-27 0 0,12 0 0,-1 0 0,-11 0 0,27 0 0,-27 0 0,28 0 0,-28 0 0,11 0 0,1 0 0,-12 0 0,27 0 0,-27 0 0,28 0 0,-29 0 0,13 0 0,-16 0 0</inkml:trace>
+  <inkml:trace contextRef="#ctx0" brushRef="#br0" timeOffset="171632">28081 12823 24575,'35'0'0,"-11"0"0,3 0 0,14 0 0,5 0 0,-11 0 0,2 0 0,0 0-360,5 0 1,0 0 0,0 0 359,-4 0 0,0 0 0,-1 0 0,-1 0 0,-1 0 0,-2 0 176,9 0 0,-1 0-176,-5 0 0,-2 0 89,-7 0 1,-3 0-90,11 0 0,1 0 0,-17 0 547,-3 0-547,0 0 0,19 0 0,-9 0 0,3 0 0,13 0 0,2 0 0,1 1 0,0-2 0,-10-3 0,1-2 0,-1 1 0,10 3 0,0 0 0,4-5 0,-4-2 0,-16 1 0,-1 1 0,2 5 0,-1 0 0,-4-6 0,1 0 0,1 7 0,1 2 0,6-1 0,2 0 0,-3 0 0,2 0 0,-1 0-334,12 0 0,2 0 334,-3 0 0,3 0 0,-4 0 0,4 0 0,-1 0 0,-12 0 0,1 0 0,-6 0 0,10 0 0,7 0 0,-28 0 0,1 0 0,3 0 668,-5 0-668,-6 0 0,3 0 0,-15 0 0,0 0 0</inkml:trace>
+  <inkml:trace contextRef="#ctx0" brushRef="#br0" timeOffset="191966">26070 13688 24575,'36'0'0,"-1"0"0,-10 0 0,1 0 0,13 0 0,-13 0 0,-1 0 0,10 0 0,1 0 0,-11 0 0,0 0 0,15 0 0,-15 0 0,1 0 0,0 0 0,-1 0 0,14 0 0,-14 0 0,1 0 0,9 0 0,0 0 0,-15 0 0,11 0 0,-27 0 0,12 0 0,-16 0 0,16 0 0,-13 15 0,21-11 0,-6 12 0,-7-16 0,5 0 0,0 0 0,-12 0 0,11 0 0,1 0 0,-12 0 0,12 0 0,-16 0 0</inkml:trace>
+  <inkml:trace contextRef="#ctx0" brushRef="#br0" timeOffset="211667">19456 10883 24575,'0'20'0,"0"-5"0,0 1 0,0 12 0,0 4 0,0 4 0,0 4 0,0 3 0,0-10 0,0 3 0,0 0-378,0 9 1,0 1 0,0 1 377,0-5 0,0 1 0,0 1 0,0-3 0,0 3 0,0 0 0,0-1-496,0-1 1,0 0 0,0 0 0,0 1 495,0 5 0,1 0 0,-1 1 0,-1 0 0,-2-2 0,-2 0 0,0 0 0,2 0 0,2 2 0,0 0 0,1-1 0,-2-2-272,-3 4 1,-1-2-1,1-1 272,4 0 0,2 0 0,-1-4 0,0 4 0,0-3 0,0-4 0,0-2 484,0-11 0,0-1-484,0 4 0,0-1 1999,0 10-1999,0-6 0,0 0 961,0 7-961,0-8 0,0 2 0,0-6 0,0-1 0,0 7 0,0 3 0,0 6 0,0 0 0,0-6 0,0 0 0,5-3 0,1 1 0,-1-2 0,-3 5 0,0-1 0,6-1 0,0-2 0,-8-7 0,0-3 0,0 4 0,0-11 0,0 7 0,0-20 0,0 12 0,0-16 0,0 0 0</inkml:trace>
+</inkml:ink>
+</file>
+
+<file path=ppt/ink/ink14.xml><?xml version="1.0" encoding="utf-8"?>
+<inkml:ink xmlns:inkml="http://www.w3.org/2003/InkML">
+  <inkml:definitions>
+    <inkml:context xml:id="ctx0">
+      <inkml:inkSource xml:id="inkSrc0">
+        <inkml:traceFormat>
+          <inkml:channel name="X" type="integer" min="-2.14748E9" max="2.14748E9" units="cm"/>
+          <inkml:channel name="Y" type="integer" min="-2.14748E9" max="2.14748E9" units="cm"/>
+          <inkml:channel name="F" type="integer" max="32767" units="dev"/>
+        </inkml:traceFormat>
+        <inkml:channelProperties>
+          <inkml:channelProperty channel="X" name="resolution" value="1000" units="1/cm"/>
+          <inkml:channelProperty channel="Y" name="resolution" value="1000" units="1/cm"/>
+          <inkml:channelProperty channel="F" name="resolution" value="0" units="1/dev"/>
+        </inkml:channelProperties>
+      </inkml:inkSource>
+      <inkml:timestamp xml:id="ts0" timeString="2026-01-28T18:09:28.263"/>
+    </inkml:context>
+    <inkml:brush xml:id="br0">
+      <inkml:brushProperty name="width" value="0.05292" units="cm"/>
+      <inkml:brushProperty name="height" value="0.05292" units="cm"/>
+      <inkml:brushProperty name="color" value="#FF0000"/>
+    </inkml:brush>
+  </inkml:definitions>
+  <inkml:trace contextRef="#ctx0" brushRef="#br0">3387 7867 24575,'35'0'0,"0"0"0,8 0 0,0 0 0,2 0 0,1 0 0,-2 0 0,2 0 0,-13 0 0,1 0 0,1 0 0,0 0 0,1 0 0,-1 0 0,11 0 0,2 0 0,-9 0 0,2 0 0,-4 0 0,-2 0 0,-3 0 0,3 0 0,-2 0 0,11 0 0,-9 0 0,-16 0 0,13 0 0,-28 0 0,27 0 0,-27 0 0,27 0 0,-11 0 0,3 0 0,5 0 0,6 0 0,2 0 0,9 0 0,1 0 0,-2 0 0,2 0 0,-13 0 0,2 0 0,-1 0 0,11 0 0,0 0 0,0 0 0,0 0 0,3-1 0,-2 2 0,-9 7 0,-1 0 0,2-6 0,2 0 0,3 6 0,0-1 0,-6-6 0,1-2 0,5 1 0,0 0 0,-7 0 0,-2 0 0,2 0 0,-1 0 0,-7 0 0,-1 0 0,7 0 0,-1 0 0,6 0 0,-14 0 0,1 0 0,9 0 0,-10 8 0,1 0 0,13-4 0,4 12 0,-25-16 0,5 0 0,-3 0 0,15 0 0,1 0 0,-17 0 0,12 0 0,-27 0 0,12 0 0,-16 0 0,16 0 0,19 0 0,4 0 0,-5-1 0,-1 2 0,6-1 0,-4 0 0,-19 0 0,-16 0 0</inkml:trace>
+  <inkml:trace contextRef="#ctx0" brushRef="#br0" timeOffset="4332">6156 9278 24575,'43'0'0,"0"0"0,0 0 0,0 0 0,2 0 0,-1 0 0,1 0 0,2 0 0,-1 0 0,3 0 0,1 0 0,0 0 0,-2 0-656,-5 0 1,-1 1-1,0-1 1,-1 0 0,2-1 305,5-1 1,2-2 0,-1 1 0,0-1 0,-3 1 349,-1 2 0,-2 2 0,-1-2 0,0-2 254,-1-3 0,0-3 1,-2-1-1,-3 4-254,12 4 0,-6 0 460,-15-6 1,-3 1-461,7 7 0,-27 0 0,28 0 2628,3 0-2628,-9 0 0,3 0 228,6 0 1,0 0-229,-3 0 0,-1 0 0,3 0 0,1 0 0,-4 0 0,0 0 0,5-2 0,-1 4 0,-7 5 0,-1 1 0,0-7 0,-3 2 0,-5 13 0,13-16 0,-28 0 0,27 0 0,4 0 0,-9 0 0,3 0 0,14 0 0,0 0 0,-13 0 0,-1 0 0,14 0 0,-4 0 0,-15 0 0,23 0 0,-43 0 0,12 0 0</inkml:trace>
+  <inkml:trace contextRef="#ctx0" brushRef="#br0" timeOffset="12201">5927 8008 24575,'-36'0'0,"17"0"0,3 0 0,16 16 0,0-12 0,0 27 0,0-19 0,0 21 0,0 10 0,2-9 0,-4 3 0,-13 0 0,-1 0 0,13 7 0,-2-2 0,-19-13 0,1-3 0,20 0 0,2-1 0,-15 11 0,16-17 0,0 13 0,0 3 0,0-3 0,0 6 0,0 0 0,0 4 0,0 0-438,0-2 1,0-1 0,0 3 437,0-1 0,0 3 0,0 0 0,0-2 0,0 4 0,0-1 0,0 1 0,0-7 0,0 2 0,0-2 0,0-1-132,0 0 1,0-2 0,0 0 131,0 4 0,0 1 0,0-5 0,0-6 0,0-1 0,0 13 0,0-2 0,0 0 0,0-15 0,0 1 643,0-1 0,0 0-643,0 15 420,0-5-420,0 4 0,0-17 0,0 6 0,0 2 0,0 10 0,0-7 0,0 0 0,0 7 0,0-7 0,0 0 0,0 6 0,0-12 0,0-3 0,0-4 0,0 11 0,0-27 0,0 12 0,0-16 0,0 16 0,0 3 0,0 5 0,0 3 0,0 7 0,0 3 0,0 7 0,0 2 0,0-11 0,0 0 0,0 1 0,0 13 0,0 0 0,0-4 0,0-2 0,0-11 0,0-1 0,0 3 0,0-2 0,0 7 0,0-3 0,0-5 0,0-27 0,0 12 0,0-16 0,0 15 0,0-11 0,0 43 0,0-8 0,0-12 0,0 1 0,0 6 0,0-1 0,0 6 0,0-4 0,0-19 0,0-16 0,0 0 0</inkml:trace>
+  <inkml:trace contextRef="#ctx0" brushRef="#br0" timeOffset="22550">8026 9313 24575,'0'36'0,"0"-1"0,0 0 0,0 0 0,0 8 0,0 1 0,0-7 0,0 0 0,1-3 0,-1 2 0,-1-4 0,-7-2 0,0-1 0,6 13 0,0-2 0,-14-1 0,16-3 0,0-21 0,0 1 0,0-12 0,0 12 0,0-16 0,0 7 0,0-5 0,0 38 0,0-17 0,0 2 0,0 1 0,0 9 0,0 1 0,-7-17 0,12-3 0,-10-16 0,12 0 0,9 0 0,4 0 0,4 0 0,3 0 0,-1 0 0,3 0 0,12 0 0,4 0 0,-11 0 0,2 0 0,0 0-181,0 0 1,0 0 0,1 0 180,4 0 0,1 0 0,-3 0 0,-1 0 0,-2 0 0,0 0 0,-5 0 0,-11 0 0,11 0 0,-27 0 0,27 0 0,0 0 0,5 0 0,-1 0 0,5 0 0,2 0-541,3 0 1,4 0 0,1 0 0,0 0 540,-6 0 0,1 0 0,1 0 0,-1 0 0,-1 0 0,7 0 0,0 0 0,-1 0 0,-2 0-72,-7 0 0,0 0 0,-2 0 1,-3 0 71,11 0 0,-8 0 0,-4 0 0,-19 0 0,-16 0 0,8 0 2658,9 0-2658,11 0 165,-3 0 1,1 0-166,13 0 0,-14 0 0,1 0 0,9 0 0,-15 0 0,11 0 0,-27 0 0,27 0 0,5 0 0,-11 0 0,4 0 0,3 0 0,3 0 0,0 0-309,1-1 1,0 1 0,2 1 308,8 3 0,2 3 0,-1-2 0,-6-4 0,-2-1 0,-1 3 0,8 5 0,-4-1 0,-10-6 0,-5-2 0,-8 1 0,-3 0 0</inkml:trace>
+</inkml:ink>
+</file>
+
+<file path=ppt/ink/ink15.xml><?xml version="1.0" encoding="utf-8"?>
+<inkml:ink xmlns:inkml="http://www.w3.org/2003/InkML">
+  <inkml:definitions>
+    <inkml:context xml:id="ctx0">
+      <inkml:inkSource xml:id="inkSrc0">
+        <inkml:traceFormat>
+          <inkml:channel name="X" type="integer" min="-2.14748E9" max="2.14748E9" units="cm"/>
+          <inkml:channel name="Y" type="integer" min="-2.14748E9" max="2.14748E9" units="cm"/>
+          <inkml:channel name="F" type="integer" max="32767" units="dev"/>
+        </inkml:traceFormat>
+        <inkml:channelProperties>
+          <inkml:channelProperty channel="X" name="resolution" value="1000" units="1/cm"/>
+          <inkml:channelProperty channel="Y" name="resolution" value="1000" units="1/cm"/>
+          <inkml:channelProperty channel="F" name="resolution" value="0" units="1/dev"/>
+        </inkml:channelProperties>
+      </inkml:inkSource>
+      <inkml:timestamp xml:id="ts0" timeString="2026-01-28T18:10:26.080"/>
+    </inkml:context>
+    <inkml:brush xml:id="br0">
+      <inkml:brushProperty name="width" value="0.05292" units="cm"/>
+      <inkml:brushProperty name="height" value="0.05292" units="cm"/>
+      <inkml:brushProperty name="color" value="#FF0000"/>
+    </inkml:brush>
+  </inkml:definitions>
+  <inkml:trace contextRef="#ctx0" brushRef="#br0">6473 9560 24575,'36'0'0,"-1"0"0,0 0 0,-10 0 0,1 0 0,1 0 0,1 0 0,7 0 0,1 0 0,-1 0 0,0 0 0,1 0 0,-1 0 0,0 0 0,0 0 0,4 0 0,1 0 0,-4 0 0,0 0 0,11 0 0,0 0 0,-10 0 0,1 0 0,-5 4 0,2 2 0,-1 0 0,3 3 0,0 2 0,6-1 0,0-1 0,1-1 0,-1 0 0,-6-1 0,0 2 0,-1 0 0,-1 1 0,-9 0 0,-1 0 0,10 5 0,0 1 0,-15-12 0,11 12 0,-27-16 0,12 0 0,-8 0 0,-6 0 0,5 0 0,-7 0 0,0 0 0,-7-16 0,-11 12 0,-9-27 0,-9 11 0,17-15 0,-13 0 0,28 15 0,-27-11 0,11 27 0,1-28 0,-13 28 0,13-11 0,-1-1 0,-11-4 0,11 1 0,1-13 0,-13 29 0,28-13 0,-11 16 0,15 16 0,0-13 0,15 29 0,-11-28 0,28 27 0,-13-11 0,1 15 0,3-10 0,1 1 0,-1 13 0,2-5 0,1-1 0,-8-13 0,0-1 0,-1 7 0,1-1 0,17 10 0,-15 1 0,-4-17 0,-16-3 0,0-1 0,-16-11 0,-4 12 0,-4-8 0,-3 0 0,0 1 0,-1 1 0,-6 3 0,-2 2 0,0 2 0,1-1 0,7-9 0,1-2 0,0 4 0,3-2 0,5-7 0,-13 0 0,29 0 0,-29 0 0,13 0 0,-1 15 0,-11-11 0,27 12 0,-28-16 0,13 0 0,-16 0 0,15 0 0,4 0 0</inkml:trace>
+</inkml:ink>
+</file>
+
+<file path=ppt/ink/ink16.xml><?xml version="1.0" encoding="utf-8"?>
+<inkml:ink xmlns:inkml="http://www.w3.org/2003/InkML">
+  <inkml:definitions>
+    <inkml:context xml:id="ctx0">
+      <inkml:inkSource xml:id="inkSrc0">
+        <inkml:traceFormat>
+          <inkml:channel name="X" type="integer" min="-2.14748E9" max="2.14748E9" units="cm"/>
+          <inkml:channel name="Y" type="integer" min="-2.14748E9" max="2.14748E9" units="cm"/>
+          <inkml:channel name="F" type="integer" max="32767" units="dev"/>
+        </inkml:traceFormat>
+        <inkml:channelProperties>
+          <inkml:channelProperty channel="X" name="resolution" value="1000" units="1/cm"/>
+          <inkml:channelProperty channel="Y" name="resolution" value="1000" units="1/cm"/>
+          <inkml:channelProperty channel="F" name="resolution" value="0" units="1/dev"/>
+        </inkml:channelProperties>
+      </inkml:inkSource>
+      <inkml:timestamp xml:id="ts0" timeString="2026-01-28T18:10:48.796"/>
+    </inkml:context>
+    <inkml:brush xml:id="br0">
+      <inkml:brushProperty name="width" value="0.05292" units="cm"/>
+      <inkml:brushProperty name="height" value="0.05292" units="cm"/>
+      <inkml:brushProperty name="color" value="#FF0000"/>
+    </inkml:brush>
+  </inkml:definitions>
+  <inkml:trace contextRef="#ctx0" brushRef="#br0">5539 8237 24575,'0'36'0,"0"-1"0,0-10 0,0 1 0,0 0 0,0 3 0,0 13 0,0 2 0,0-7 0,0 0 0,-1 6 0,2 1 0,6-1 0,1 0 0,-6 1 0,0 2 0,2-11 0,2 1 0,0-1 0,2 7 0,0-2 0,-7 3 0,1-1 0,6-11 0,0 0 0,1 5 0,-2-1 0,-6-8 0,2 1 0,13 6 0,-1-2 0,-11 7 0,4-13 0,0-1 0,-8 11 0,15-1 0,-11 0 0,12 1 0,-16-1 0,0 0 0,0-15 0,0 11 0,0-11 0,0-1 0,0 13 0,0-13 0,0 1 0,0 11 0,0-27 0,16 12 0,-12-16 0,11 15 0,-15-11 0,0 12 0,0-16 0,0 0 0,16 16 0,-12-12 0,12 27 0,-1-27 0,-11 19 0,12-21 0,-16 22 0,16-20 0,-13 12 0,13-16 0,0 0 0,3 0 0,5 7 0,3 1 0,8-6 0,1 0 0,4 14 0,2-1 0,-8-11 0,1-5 0,0 2-364,2 4 1,1 1 0,1-1 363,6 1 0,3-1 0,0 0-372,-9-4 1,2 0 0,-1-1 0,1 2 371,-1 1 0,0 2 0,1-1 0,-2-1 0,12-2 0,-2-1 0,0-1-269,-2 1 1,0 0 0,-2 0 268,-5 0 0,-2 0 0,2 0 0,-3 0 0,1 0 0,1 0 0,0 0-456,9 0 0,0 0 0,1 0 456,-6 1 0,1-1 0,1 0 0,-1-1 0,-1-2 0,-1-1 0,0-1 0,0 2 0,1 1 0,2 2 0,-2-1 0,0 0 0,-4-3 0,-1 0 0,0-1 0,0 2 0,1 2 0,1 2 0,-1 0 0,0-2 0,8-3 0,0-3 0,0 2 0,-8 4 0,0 1 0,0 0 0,1-3 0,0-3 0,0-3 0,1 0 0,-1 2 0,-2 5 0,0 2 0,0 0 0,0-2 0,2-4 0,0-4 0,-1 1 0,-3 3 190,-1 4 1,-2 2 0,1-2-191,5-5 0,1-3 0,-1 3 0,5 6 0,2 0 0,-3-5 0,4-3 0,0 1-15,1 2 0,0 0 1,1-2 14,-8 0 0,1-1 0,0-1 0,2 2-283,2 2 1,2 2 0,0 0 0,0-2 282,-2-1 0,1-2 0,0 0 0,1 3 0,-4 4 0,1 2 0,1 0 0,0 0 0,0-2-321,1-3 1,1-1 0,-1-1 0,1 0 0,1 1 320,-3 2 0,0 1 0,1 0 0,0 0 0,1 0 0,-1-1 0,-1-1 0,0 0 0,0-2 0,0 1 0,1 0 0,0 0-370,-4 1 0,0 0 0,1 0 0,0 0 0,0 0 0,0 0 0,0 0 370,-1 0 0,-1-1 0,1 1 0,0-1 0,0 1 0,-1 1 0,2-1 0,0 2 0,0 0 0,1 1 0,-1-1 0,1 1 0,-1-1 0,-1 0 0,4-2 0,0-1 0,-1 0 0,0 0 0,0 1 0,0 1-164,1 2 0,-1 2 0,1 0 0,-1 0 0,0 0 0,-1-1 164,4-2 0,-1 0 0,0 0 0,-1-1 0,0 1-30,-3 0 1,-1-1-1,0 1 1,-1 0-1,2 0 30,0 2 0,2 0 0,-1 1 0,0 0 0,-2-2 253,1-1 0,-1-2 1,-1 1-1,1 1-253,5 1 0,0 3 0,0-1 0,-1 1 0,-5-1 0,0 0 0,-1 0 0,2 0 0,5 0 0,0 0 0,1 0 0,-2 0 0,-5 0 0,-2 0 0,1 0 0,1 0 0,6 0 0,1 0 0,1 0 0,-1 0 0,-4 0 0,-1 0 0,0 0 0,1 0 0,2-1 0,-1 1 0,1 0 0,1 1 0,-7 1 0,1 1 0,0 1 0,0 0 0,-1-2 0,5-1 0,0-1 0,-2 0 0,0 3 0,-2 4 0,-2 2 0,0 0 0,-1-2 816,6-6 0,-2-1 1,-2 2-817,-5 8 0,-2 2 0,0-2 0,15-8 0,0 0 0,-14 7 0,1 4 0,-1-4 0,0-7 0,0-2 0,1 2 0,4 7 0,0 4 0,1-4 542,6-6 1,0-4 0,1 3-543,-3 7 0,0 3 0,2-1 0,-9-6 0,2 0 0,-1-1 0,-1 1 0,2 1 0,-1 0 0,-1 2 706,-1 2 0,-2 2 0,-1-3-706,4-7 0,-5 0 1732,2 14-1732,-4-16 521,-11 0-521,17-1 0,8 2 0,0 6 0,4 1-151,-13-6 1,4-2 0,1 0 0,-1 2 150,2 5 0,1 1 0,-1 1 0,0-1 0,8-1 0,-1-1 0,-2 0 0,-1 0 0,-1 0 0,-6 2 0,-10 5 0,-3-3 0,21-8 0,-43 6 0,11-16 0,-15 6 1812,0-37-1812,14 7 0,4-6 0,-8 1 0,0-5 0,-1-4 0,1-2-547,-1 8 1,1-3 0,-1-1 0,1-2 0,-1 0 0,-1-1 360,-2 1 0,0 0 1,0-2-1,-1 0 0,-1 0 1,0-1-1,0 1 186,-1 4 0,0-1 0,0 1 0,-1-1 0,0 0 0,0 1 0,-1-1 0,-1 2 0,-1-5 0,0 0 0,-1 1 0,-1 0 0,0 0 0,0 2 0,0 1-331,0-7 0,0 1 0,-1 2 0,0 0 0,-2 2 331,-1-4 0,-1 0 0,-2 3 0,0 4 0,-2 8 0,0 3 0,1 1 0,1-11 0,0 2 0,-5 5 0,-1-1 0,7-8 0,-2-2-108,-4 11 0,-3-1 0,0 1 108,-1-10 0,-1 0 0,3 11 0,-2 0 0,4 0 0,5-3 0,1 0 1638,-6-3 0,-2 2-1273,1 2 1,-3 3 675,0 9 1,-1 1-1042,2-4 0,1 3 0,-15 4 0,20 5 466,-5 15-466,-8 5 0,-5 5 0,-5 7 0,-5 2 0,3-9 0,-6-1 0,-3 0 0,0 2-629,7 0 1,0 1-1,0 0 1,-2 0 0,-1 0 628,1-3 0,-1 0 0,0 0 0,-2 0 0,1-1 0,0 1 0,2-1 0,-1-1 0,0 1 0,1 0 0,0-1 0,-1 2 0,-6 1 0,1 0 0,-1 1 0,1-1 0,-2 0 0,7-4 0,-1 0 0,0-1 0,-1 1 0,1-1 0,0 2-547,0 1 1,0 0 0,0 1 0,1 0 0,-2 0 0,0-1 534,2-2 0,0 0 0,-1-1 1,-1 0-1,1 0 0,0 1 1,0 0 11,-6 2 0,0 0 0,1 1 0,-1 0 0,0-1 0,-1 1-469,5-2 1,-1 1 0,1-1 0,-1 0 0,-1 0 0,1 0 0,0 1 461,-2 0 1,0-1 0,0 1 0,0 0-1,0 0 1,0 0 0,0 0 6,1 0 0,-1-1 0,0 1 0,1 0 0,-1 0 0,1 0 0,-1 0-293,1-1 1,0 1 0,0-1 0,1 1-1,-1-1 1,1 0 0,1 0 292,-3-1 0,1 0 0,0 0 0,0-1 0,1 1 0,1 0 7,1 0 0,1 0 0,1 0 0,-1 0 1,2 0-1,-1-1-7,-5 0 0,0-2 0,1 1 0,0-1 0,1 2 0,0 1 0,2 1 0,-1 0 0,1-1 0,-2-1 0,-2-3 0,-1-1 0,0-2 0,-1 1 0,0 2 0,7 2 0,-1 1 0,1 2 0,-1-1 0,-1-1 0,-1-1-35,3-2 1,-2-1 0,0-2 0,-1 0 0,0 1 0,0 1 0,1 1 34,-2 3 0,1 1 0,-1 2 0,1 0 0,-1-1 0,0 0 0,0-1 0,0-1 0,-1-2 0,0 0 0,0 0 0,1 0 0,0 0 0,0 1 0,-4 1 0,0 1 0,1 0 0,1 0 0,-1 0 0,1 0 169,0 0 1,1 0-1,-1 0 1,2-1 0,-1 0-1,3-2-169,-3-1 0,2-1 0,1-1 0,0 0 0,0 1 236,2 2 1,-1 1-1,1-1 1,1 1 0,1-2-237,-1-1 0,0 0 0,2-1 0,0-2 387,-12-2 0,2-3 0,0 2-387,2 4 0,1 0 0,0-1 0,1-2 0,1-2 0,-1 1 0,-1-1 0,-2 0 0,1 2 0,0 3 0,-1 1 0,2-3 0,9-6 0,1-3 0,-1 2 0,-7 2 0,-2 2 0,3 0 1465,-4-3 0,0-1-1465,10 0 0,-2-2 0,1 2 0,4 3 0,-1 2 0,1-2 0,-4-5 0,0 0 0,0 0 520,-3 5 1,-1 1-1,-1 0-520,-3-5 0,-2-1 0,1 3 0,5 7 0,0 3 0,1-3 0,-1-8 0,2-3 0,0 4 774,-5 7 1,0 0-775,-3-6 0,2 1 529,17 6 1,1 2-530,-9 0 0,0-2 202,10-7 0,-1 0-202,-14 6 0,-2 0 0,0-6 0,-2 0 51,7 7 1,-3 2 0,1-1-52,0 0 0,-1 0 0,0 0 0,-5 0 0,-1 0 0,2 0 0,3 0 0,1 0 0,1 0 0,2 0 0,1 0 0,1 0 40,-8-1 1,2 2-41,11 7 0,1 0 0,5-6 0,2 0 0,-12 14 0,1-1 0,9-14 0,1 2 482,6 13 0,-1 0-482,-20-14 0,-2-1 0,5 14 0,-1 2 0,4-10 0,-3-2 0,2 2 0,-11 10 0,2 2 0,0-1 0,2-1 0,5-8 0,3 2 0,14 5 0,1-1 0,-20-11 0,37 12 0,-6-16 0,8 0 0,0 0 0,0 0 0</inkml:trace>
+  <inkml:trace contextRef="#ctx0" brushRef="#br0" timeOffset="4367">5680 11889 24575,'34'0'0,"0"0"0,0 0 0,6 0 0,1 0 0,3 0 0,-4 0 0,2 0 0,2 0 0,-1 0-820,1 0 1,0 0 0,1 0 0,0 0 622,4 0 0,2 0 0,-1 0 1,0 0 196,-5 0 0,0 0 0,0 0 0,0 0 0,3 0 0,1 0 0,-1 0 0,-1 0 0,-4 0 0,-1 0 0,-1 0 0,2 0 0,4 0 0,0 0 0,1 0 0,0 0 0,-1 0 0,-1 0 0,1 0 0,1 0-350,-4 0 1,2 0 0,0 0-1,0 0 1,-1 0 349,-3 0 0,-1 0 0,0 0 0,1 0 0,0 0 0,6 0 0,0 0 0,1 0 0,0 0 0,-2 0 0,-4 0 0,-2 0 0,0 0 0,0 0 0,1 0 0,3 0 0,1 0 0,-1 0 0,1 0 0,-1 0 0,-2 0 0,0 0 0,-1 0 0,0 0 0,0 0 0,-1 0 0,0 0 0,0 0 0,0 0 0,-1 0 17,5 0 0,0 0 0,-1 0 0,0 0-17,-1 0 0,-1 0 0,-1 0 0,-2 0 0,-1 0 0,-1 0 0,-2 0 0,11 0 0,-6 0 1723,-5 0-1723,-19 0 0,-16 0 0,0 0 0</inkml:trace>
+</inkml:ink>
+</file>
+
+<file path=ppt/ink/ink17.xml><?xml version="1.0" encoding="utf-8"?>
+<inkml:ink xmlns:inkml="http://www.w3.org/2003/InkML">
+  <inkml:definitions>
+    <inkml:context xml:id="ctx0">
+      <inkml:inkSource xml:id="inkSrc0">
+        <inkml:traceFormat>
+          <inkml:channel name="X" type="integer" min="-2.14748E9" max="2.14748E9" units="cm"/>
+          <inkml:channel name="Y" type="integer" min="-2.14748E9" max="2.14748E9" units="cm"/>
+          <inkml:channel name="F" type="integer" max="32767" units="dev"/>
+        </inkml:traceFormat>
+        <inkml:channelProperties>
+          <inkml:channelProperty channel="X" name="resolution" value="1000" units="1/cm"/>
+          <inkml:channelProperty channel="Y" name="resolution" value="1000" units="1/cm"/>
+          <inkml:channelProperty channel="F" name="resolution" value="0" units="1/dev"/>
+        </inkml:channelProperties>
+      </inkml:inkSource>
+      <inkml:timestamp xml:id="ts0" timeString="2026-01-28T18:11:36.346"/>
+    </inkml:context>
+    <inkml:brush xml:id="br0">
+      <inkml:brushProperty name="width" value="0.05292" units="cm"/>
+      <inkml:brushProperty name="height" value="0.05292" units="cm"/>
+      <inkml:brushProperty name="color" value="#FF0000"/>
+    </inkml:brush>
+  </inkml:definitions>
+  <inkml:trace contextRef="#ctx0" brushRef="#br0">3739 8837 24575,'36'0'0,"-12"0"0,3 0 0,7 0 0,2 0 0,1 0 0,1 0 0,-5 0 0,2 0 0,-1 0 0,7 0 0,0 0 0,-7 0 0,2 0 0,-2 0 0,8 0 0,-2 0 0,-4 0 0,-1 0 0,-8 0 0,-3 0 0,-5 0 0,13 0 0,-13 0 0,5 0 0,3 0 0,0 0 0,1 0 0,14 0 0,2 0 0,-6 0 0,-1 0 0,6 0 0,0 0 0,-7 0 0,-1 0 0,0 0 0,0 0 0,-7 0 0,-1 0 0,0 0 0,-3 0 0,3 0 0,-9-16 0,6 12 0,-21-11 0,13 15 0,15 0 0,9 0 0,1-8 0,4 0 0,0 6 0,0 0 0,0-6 0,0 1 0,1 6 0,-6 2 0,0-1 0,7-16 0,-43 12 0,11-12 0,1 16 0,-12 0 0,12 16 0,-1-12 0,-11 12 0,12-16 0,-32 0 0,12 0 0,-11 0 0,15 0 0</inkml:trace>
+  <inkml:trace contextRef="#ctx0" brushRef="#br0" timeOffset="2683">3775 11395 24575,'35'0'0,"-4"0"0,5 0 0,7 0 0,4 0-483,-7 0 1,3 0 0,-1 0 482,-3 0 0,0 0 0,1 0 0,-3 0 0,3 0 0,-2 0 0,-2 0 0,9 0 0,0 0 142,-6 0 1,2 0 0,-4 0-143,0 0 0,-3 0 125,1 0 0,1 0-125,-1 0 0,0 0 0,0 0 0,1 0 0,-1 0 0,0 0 367,1 0 1,-1 0-368,1 0 0,-2 0 17,-5 0 0,-3 0-17,17 0 0,-25 0 0,-10 0 0,8 0 0,-13 0 0,29 0 0,-13 0 0,17 0 0,-1 0 0,0 0 0,1 0 0,-17 0 0,-3 0 0,-1 0 0,-11 0 0,28 0 0,3 0 0,-2 0 0,5 0 0,6-1 0,2 2 0,-1 6 0,0 1 0,-1-6 0,-2 0 0,-13 7 0,-3-2 0,9-7 0,-19 0 0,-16 0 0,0 0 0,0 0 0</inkml:trace>
+  <inkml:trace contextRef="#ctx0" brushRef="#br0" timeOffset="9517">6068 8237 24575,'0'34'0,"0"-1"0,0 10 0,0 4 0,0-7 0,0 2 0,0 2-630,0 2 0,0 2 0,0-1 630,0-5 0,0 0 0,0-1 0,0 0 0,0 0 0,0-1 265,0 10 1,0-2-266,0-4 0,0 0 0,0-5 0,0 0 0,-1 5 0,2-2 165,6-4 1,1-1-166,-6 6 0,0 0 0,6-7 0,0-1 0,-7 0 0,-2 0 0,1 8 0,0 1 0,0 0 0,0 2 0,0-6 0,0 2 0,0-3 0,0 4 0,0 0 0,0-4 0,0 2 0,0-5 482,0-10 1,0-1-483,0 9 0,0-1 63,0 2-63,8-15 0,-6-5 0,6-15 0</inkml:trace>
+  <inkml:trace contextRef="#ctx0" brushRef="#br0" timeOffset="12599">6579 10142 24575,'26'0'0,"-1"0"0,2 0 0,1 0 0,7 0 0,1 0 0,-1 0 0,0 0 0,1 0 0,-1 0 0,-7 0 0,-1 0 0,0 0 0,-3 0 0,-5 0 0,5 0 0,-22 0 0,6 0 0,7 0 0,21 0 0,-10 0 0,2 0 0,-1 0 0,1 0 0,6 0 0,-1 0 0,6 0 0,-4 0 0,-3 0 0,-28 0 0,11 0 0,-15 0 0,16 16 0,4-12 0,3 4 0,5 0 0,6-7 0,2-2 0,9 1 0,0 0 0,0 0 0,0 0 0,0 0 0,-3 0 0,-14 0 0,-1 0 0,-1 0 0,-1 0 0,2 0 0,-9 0 0,-11 0 0,9 0 0,4 0 0,15 0 0,0 0 0,1 0 0,-17 0 0,-19 0 0,-19 0 0,-1 0 0,-11 0 0,27 0 0,-28 0 0,28 0 0,-27 0 0,19 0 0,-37 0 0,2 0 0,6 0 0,-4 0 0,0 0 0,0 0 0,10-1 0,0 1 0,-1 1 0,-4 3 0,-2 2 0,2-1 0,-7-3 0,0 0 0,8 3 0,-1 2 0,2-3 0,-1-3 0,3-2 0,0 1 0,2 0 0,7 0 0,3 0 0,-4 0 0,11 0 0,9 0 0,8 0 0,-16 0 0,12 16 0,-27-12 0,27 11 0,-43-15 0,8 16 0,5-14 0,-3 0 0,-6 5 0,0 1 0,5 1 0,2-2 0,-1-5 0,3 0 0,7 6 0,3 0 0,-11-8 0,15 0 0,-11 0 0,11 0 0,-11 0 0,-4 0 0,6 0 0,-1 0 0,-3 0 0,-2 0 0,1 0 0,-8 0 0,2 0 0,2 0 0,3 0 0,-8 0 0,27 0 0,16 0 0,0 0 0,0 0 0</inkml:trace>
+  <inkml:trace contextRef="#ctx0" brushRef="#br0" timeOffset="14033">5786 9066 8191,'0'20'0,"15"-4"1638,23-14 0,7-4-745,-13 2 1,2 0 45,2 0 0,3 0 1,-4 0-940,-6 0 0,-5 0 1719,3 0-1719,5 0 3276,-28 0 0,11 0-3044,1 15-232,-12-11 0,12 12 0,-16-16 0</inkml:trace>
+  <inkml:trace contextRef="#ctx0" brushRef="#br0" timeOffset="16249">5927 9384 24575,'19'0'0,"-3"0"0,-16 0 0,16 0 0,-12 16 0,11-13 0,1 13 0,-12-16 0,12 0 0,-16 0 0,0 0 0,0 16 0,15-12 0,-11 11 0,12-15 0,-1 0 0,-11 0 0,12 0 0,-16 0 0,8 0 0,-6 16 0,6-12 0,-8 12 0</inkml:trace>
+</inkml:ink>
+</file>
+
+<file path=ppt/ink/ink18.xml><?xml version="1.0" encoding="utf-8"?>
+<inkml:ink xmlns:inkml="http://www.w3.org/2003/InkML">
+  <inkml:definitions>
+    <inkml:context xml:id="ctx0">
+      <inkml:inkSource xml:id="inkSrc0">
+        <inkml:traceFormat>
+          <inkml:channel name="X" type="integer" min="-2.14748E9" max="2.14748E9" units="cm"/>
+          <inkml:channel name="Y" type="integer" min="-2.14748E9" max="2.14748E9" units="cm"/>
+          <inkml:channel name="F" type="integer" max="32767" units="dev"/>
+        </inkml:traceFormat>
+        <inkml:channelProperties>
+          <inkml:channelProperty channel="X" name="resolution" value="1000" units="1/cm"/>
+          <inkml:channelProperty channel="Y" name="resolution" value="1000" units="1/cm"/>
+          <inkml:channelProperty channel="F" name="resolution" value="0" units="1/dev"/>
+        </inkml:channelProperties>
+      </inkml:inkSource>
+      <inkml:timestamp xml:id="ts0" timeString="2026-01-28T18:12:51.096"/>
+    </inkml:context>
+    <inkml:brush xml:id="br0">
+      <inkml:brushProperty name="width" value="0.05292" units="cm"/>
+      <inkml:brushProperty name="height" value="0.05292" units="cm"/>
+      <inkml:brushProperty name="color" value="#FF0000"/>
+    </inkml:brush>
+  </inkml:definitions>
+  <inkml:trace contextRef="#ctx0" brushRef="#br0">13547 9049 24575,'35'0'0,"8"0"0,-17 0 0,1 0 0,11 0 0,2 0 0,5 0 0,1 0 0,-12 0 0,2 0 0,-1 0 0,11 0 0,-1 0 0,-11 0 0,0 0 0,-1 0 0,5 0 0,-1 0 0,6 0 0,0 0 0,-7 0 0,-1 0 0,-7 0 0,-1 0 0,-1 0 0,-1 0 0,10 0 0,0 0 0,8 0 0,-16-8 0,-1 0 0,21 4 0,-22-4 0,1 0 0,1 8 0,-3 0 0,0 0 0,23 0 0,-43 0 0,11 0 0,-15 0 0,0 0 0,-15 0 0,-5 0 0,0 0 0,-11 0 0,27 0 0,-27 0 0,27 0 0,-28 0 0,13 0 0,-6 0 0,-1 0 0,-5 0 0,-3 0 0,11 0 0,3 0 0,-15 0 0,0 0 0,-1 0 0,1 0 0,15 0 0,-11 0 0,11 0 0,-15 0 0,10-1 0,-1 2 0,-13 15 0,6-14 0,-1 0 0,7 6 0,-1 0 0,1-7 0,0-2 0,0 1 0,3 0 0,-12 0 0,1 0 0,15 8 0,-11-6 0,27 5 0,-27-7 0,11 0 0,1 0 0,-13 0 0,13 0 0,-1 0 0,-11 0 0,27 0 0,-12 0 0,16 0 0,16 0 0,3 0 0,17 0 0,-1 0 0,-10 0 0,1 0 0,13 0 0,-6 0 0,1 0 0,5 0 0,-6 0 0,1 0 0,5 0 0,0 0 0,4 0 0,-7 0 0,3 0-419,-2 0 0,5 0 1,0 0 418,5 0 0,3 0 0,2 0-650,-10 0 0,2 0 0,2 0 0,1 0 0,-1 0 650,3 0 0,0 0 0,1 0 0,0 0 0,-1 0 0,-7 0 0,1 0 0,-1 0 0,0 0 0,0 0 0,-2 0-211,5 0 0,0 0 1,-1 0-1,-1 0 1,-4 0 210,6 0 0,-3 0 0,-2 0 0,-1 0 0,0 0 0,-7 0 0,7 0 975,-7 0-975,-32 16 3233,0-12-3233,-32 12 1351,-7-1-1351,-6-13 0,-4 0 0,4 14 0,-2 0-352,5-14 0,-2-3 0,0 4 352,2 6 0,1 3 0,-1-2 0,1-7 0,-1-3 0,0 1 0,-4 4 0,0 1 0,0-1 0,5-4 0,0-2 0,-2 1 0,4 0 0,-3 0 0,0 0 0,0 0-538,-1 0 0,-2 0 1,1 0-1,-2 0 538,6 0 0,-1 0 0,-1 0 0,1 0 0,1 0 0,-6 0 0,1 0 0,0 0 0,1 0-198,0 0 0,-1 0 0,2 0 0,2 0 198,3 0 0,2 0 0,1 0 0,-1 0 0,1 0 0,4 0 0,2 0 0,3 0 897,-17 0-897,9 0 2163,23 0-2163,-21 0 939,28 0-939,-11 0 0,-1 0 0,12 0 0,-27 0 0,11 0 0,1-16 0,3 12 0,16-12 0,16 16 0,-13 0 0,13 0 0</inkml:trace>
+  <inkml:trace contextRef="#ctx0" brushRef="#br0" timeOffset="22167">5750 9278 24575,'26'0'0,"-1"0"0,9 0 0,3 0 0,-4 0 0,3 0 0,1 0-741,1 0 0,1 0 0,1 0 741,-3 0 0,1 0 0,2 0 0,0 0-663,4 0 0,2 0 0,0 0 0,2 0 663,-3 0 0,1 0 0,0 0 0,2 0 0,-1 0 0,1 0 0,0 1 0,0-1 0,1 0 0,1-1 0,-7-1 0,1 0 0,0 0 0,0-1 0,-1 0 0,-1-1 0,4 1 0,-1-1 0,0 0 0,-1 0 0,0 0 0,-1 0 0,0 1 0,-1-1 0,0 0 0,-1-1 37,5-2 0,-1-2 0,-1 0 0,-2 3-37,4 4 0,-1 3 0,-3-4-12,-6-7 1,-1-2 0,-2 3 11,8 6 0,-4 2 464,-9-7 1,-1 0-465,7 7 0,-1 2 2625,6-1-2625,1 0 0,2 0 581,-13 0 1,1 0-582,2 0 0,3 0 0,0 0 0,10 0 0,0 0-351,-6 0 1,2 1-1,1-2 351,1-4 0,1-1 0,2 1 0,-8 4 0,2 0 0,0 1 0,1-2-593,3-1 1,2-1 0,1 0-1,0 0 593,-6 0 0,1 1 0,0-1 0,1 1 0,1 1 0,1 1 0,2 0 0,-1 1 0,1-1 0,-1 0 0,-1-1 0,-1-2 0,0 1 0,1-1 0,0 1 0,3 1 0,1 0 0,0 1 0,-1 0 0,-1 0 0,-4 0 0,-2 1 0,0 0 0,0-1 0,1 1 0,3-2 0,1 0 0,0 1 0,0-1 0,-2 1 0,-2 0 0,-1 1 0,0 0 0,-1 1 0,0-1 0,9 0 0,-1 0 0,1 0 0,-1 0 0,2 0 0,1 0 0,-1 0 0,-1 0 0,-3 0 0,-1 0 0,-1 0 0,1 0-370,3 0 1,1-1 0,-1 1 0,0 1 369,-6 0 0,0 2 0,0-1 0,0 0 0,1-2 0,0 0 0,1 0 0,1 2-377,-6 1 0,1 2 0,0 1 0,0-1 0,0-1 377,10-2 0,-1-2 0,1 0 0,1 2 0,-5 3 0,1 2 0,0 0 0,1 0 0,0-2-267,0-2 1,2-3 0,-1 0 0,0 0 0,0 1 266,-3 2 0,-1 0 0,1 1 0,-1 0 0,0-2 0,-2-1 0,0-1 0,-1 0 0,0-1 0,0 1 134,6 0 0,0 0 0,-2 0 0,0 0-134,-7 0 0,-2 0 0,1 0 0,1 0 0,4 0 0,1 0 0,1 0 0,-3 0 152,5 0 1,-2 0-1,0 0-152,-7 0 0,2 0 0,-2 0 0,-1 0 0,1 0 0,-3 0 0,2 0 542,4 0 0,0 0 0,-2 0-542,8 0 0,-4 0 1274,-6 0 1,-3 0-1275,-7 0 0,-3 0 1605,11 0-1605,-15 0 1098,11 0-1098,-27 0 288,43 0-288,-15 16 0,8-14 0,4 0 0,-11 6 0,0-1 0,3-7 0,-1 0 0,-8 8 0,-3 0 0,11-4 0,-15 12 0,11-16 0,-27 0 0,27 0 0,5 0 0,3 15 0,-12-13 0,-3 0 0,-5 14 0,13-16 0,-13 0 0,17 0 0,-17 0 0,13 0 0,-28 0 0,11 0 0,-15 0 0</inkml:trace>
+  <inkml:trace contextRef="#ctx0" brushRef="#br0" timeOffset="29367">6033 7902 24575,'43'0'0,"-6"0"0,6 0 0,-8 0 0,-15 0 0,-4-15 0,-16 11 0,0-12 0,0 16 0,0 0 0,0 0 0</inkml:trace>
+  <inkml:trace contextRef="#ctx0" brushRef="#br0" timeOffset="32382">5750 9419 24575,'41'0'0,"1"0"0,-6 0 0,3 0 0,3 0 0,3 0 0,4 0 0,1 0 0,0 0-656,-9 0 1,0 0-1,1 0 1,0 0 0,0 0 323,3 0 0,1 0 0,0 0 0,0 0 0,-2 0 332,7 0 0,-2 0 0,0 0 0,-2 0-78,-4 0 1,-1 0-1,0 0 1,0 0 77,1 0 0,0 0 0,0 0 0,-2 0 0,6 0 0,-3 0 0,3 0 0,-6 0 0,3 0 0,0 0 0,-1 0 0,-2 0 0,-1 0 0,0 0 0,0 0 0,9 0 0,-1 0 0,0 0 169,-2 0 1,0 0-1,-1 0-169,-6 0 0,-2 0 0,1 0 0,-3 0 0,1 0 0,0 0 0,7 0 0,1 0 0,-1 0 0,-6 0 0,-1 0 0,1 0 0,3 0 0,2 0 0,-3 0-74,7 0 0,-2 0 74,-10 0 0,0 0 0,0 0 0,11 0 0,0 0 0,-8 0 0,0 0 0,3 0 163,-3 0 1,1 0 0,2 0 0,0 0-164,2 0 0,0 0 0,1 0 0,2 0-226,-1 0 0,1 0 1,1 0-1,0 0 0,1 0 226,-1 0 0,0 0 0,1 0 0,-1 0 0,0 0 0,-1 0 0,-1 0 0,1 0 0,0 0 0,-1 0 0,2 0 0,-1 0 0,1 0 0,-1 0 0,-1 0-317,3 0 0,0 0 0,-1 0 0,2 0 317,-5 0 0,2 1 0,0-1 0,0 0 0,0-1 0,0-1 0,-1-2 0,0 1 0,1-1 0,1 1-499,2 2 1,1 0 0,1 1-1,0 0 1,2-1 498,-11-1 0,2-1 0,0 1 0,1-1 0,-1 1 0,1-1 0,-1 2-255,7 0 1,-1 1 0,0 0 0,1 0 0,0 1-1,0-1 255,-3 0 0,1 0 0,0 0 0,0 0 0,0 0 0,1 0 0,-2 0 0,0 0 0,0 0 0,0 0 0,0 0 0,-1 0 0,0 0 0,0 0 0,4 0 0,-1 0 0,0 0 0,0 0 0,-1 0 0,1 0-43,-2 0 1,0 0 0,0 0 0,0 0 0,-1 0 0,0 0 42,-3 0 0,0 0 0,0 0 0,-1 0 0,0 0 0,0 0-16,5 0 0,-1 0 0,1 0 0,-2 0 1,1 0 15,-1 0 0,-1 0 0,0 0 0,0 0 0,-1 0 0,6 0 0,1 0 0,-2 0 0,-1 0 448,-8 0 0,0 0 0,-1 0 0,-2 0-448,7 0 0,-2 0 0,-3 0 1538,7 0 1,-4 0-1539,-5 0 0,-1 0 1436,0 1 0,0-2-1436,1-7 0,-1 0 1266,1 6 0,-2 0-1266,-6-6 0,-1 1 353,-1 6 0,-1 2-353,11-1 0,-17 0 0,-3 0 0,-16 0 0</inkml:trace>
+  <inkml:trace contextRef="#ctx0" brushRef="#br0" timeOffset="37283">20249 10530 24575,'44'0'0,"-1"0"0,0 0 0,0 0 0,-2 0 0,0 0 0,1 0 0,2 0 0,0 0 0,-3 0 0,1 0 0,1 0 0,0 0 0,1 0 0,1 0-469,-1 0 1,0 0 0,1 0 0,1 0 0,0 0 0,0 0 0,-1 0-1,0 0 1,0 0 0,0 0 0,-1 0 0,1 0 0,0 0 0,-1 0 275,0 0 0,0 0 1,-1 0-1,0 0 0,0 0 1,0 0-1,-1 0 89,4 0 0,0 0 1,0 0-1,-1 0 1,-1 0-1,0 0 104,2 0 0,-1 0 0,0 0 0,1 0 0,1 0 0,1 0 0,2 0 0,1 0 0,0 0 0,-1 0 0,-2 0 0,1 1 0,-2-1 0,-1 0 0,1 0 0,3-1-131,-6 0 1,2-1-1,1 0 1,1 0 0,-1-1-1,0 0 1,-3 1 130,1-1 0,-1 0 0,-2 0 0,0 0 0,1-1 0,0 0 0,2-1 0,1-1 0,0-1 0,-1 1 0,1 0 0,0 1 0,1 1 0,0 1 0,0 0 0,0 0 0,0 0 0,-1-1-303,-3-1 1,1 0 0,-1-1 0,-1 0 0,1 1 0,0 1 302,1 2 0,1 1 0,-1 1 0,0 0 0,-1 0 0,0-1 182,3-2 1,-2 0 0,0-1 0,1 1 0,-1 0-183,4 2 0,1 1 0,0 1 0,-1-1 0,0 0 0,-6 0 0,-1 0 0,0-1 0,0 1 0,1 1 0,6 2 0,1 0 0,0 1 0,0-1 0,-1 0 0,-4-2 0,-1-1 0,0 0 0,-1 1 0,2 1 0,2 3 0,1 2 0,1 0 0,-1 0 0,0-2 0,-1-2 0,0-3 0,-1 0 0,1 0 0,0 1 0,2 2 0,0 0 0,0 1 0,0 0 0,0-2 0,-1-1 0,1-1 0,0 0 0,0-1 0,0 1 0,-2 0 0,0-1 0,-1 1 0,1 0 0,0 1 0,1 1 0,1 1 0,-1 0 0,0 1 0,-1 0 0,-5-1 0,-1 0 0,-1 1 0,1 0 0,0 1 0,4 1 0,1 1 0,1 0 0,-1 1 0,-2-1 0,5 2 0,-1 0 0,-1 0 0,2 0 0,-7-2 0,0 0 0,1 0 0,1 0 0,-1 0 0,2 0 0,-1 0 0,1 0 0,0 0 0,1 0 0,0 0 0,1 1 0,0-1 0,1 0 0,0 0-47,-5-1 0,0 0 0,0 0 0,1 0 0,0 0 1,0-1 46,1-1 0,-1 0 0,1-1 0,1 0 0,-1 0 0,0-1 0,2 1 0,0 1 0,0-1 0,0-1 0,-1 0 0,1 0 0,-3-1 0,1-1 0,-1 0 0,0 0 0,0-1 0,0 1 195,6 0 1,2 0-1,-2 0 1,0 0-1,-3 0-195,4 0 0,-3 0 0,-1 0 0,0 0 384,-6 0 1,0 0 0,-1 0-1,-2 0-384,6 0 0,-3 0 0,-1 0 996,8 0 1,-4 0-997,-7 0 0,-1 0 0,5 0 0,2 0 0,2 0 0,2 0 517,-4 0 0,3 0 1,1 0-518,-4 0 0,2 1 0,0-1 0,1-1-17,1-2 1,1-1-1,0-1 1,1 1 16,-6 3 0,1 1 0,0 1 0,-1-2 0,0-2 0,4-3 0,0-3 0,-2 0 0,0 2 96,8 5 0,-2 2 0,-3-2-96,-10-3 0,-1-1 0,-5 2 0,16 4 0,-16-16 1442,-31 12-1442,0-27 0,1 7 0,-2-3 0,-5-15 0,-4-7-57,3 11 0,-3-5 0,1-2 0,0-1 57,3 6 0,0 0 0,0-1 0,0-2 0,-1-1-489,-1 0 0,0-2 0,0-1 0,-1-1 0,1 0 0,0 1 489,0 1 0,1-1 0,0 1 0,0-1 0,0 1 0,0 0 0,0 0 0,1 0 0,0 0 0,-1 1 0,1-1 0,-1 0 0,-1 0 0,-1 0 0,0-1 0,0 1 0,0 0 0,2 1-436,-1-5 1,1 2 0,0 0 0,0-1 0,0 1 435,0-1 0,0-1 0,0 0 0,0 1 0,0 0 0,0 1 0,0 1 0,0 0 0,0 0 0,0 1 0,0 3 0,0 0 0,0 1 0,-1-1 0,1 0 0,0-3 0,0-2 0,-1 1 0,1 0 0,1 0 0,2 3 0,0 1 0,1 0 0,-1 0 0,0 0-222,-2 1 0,-1-2 0,-1 2 1,2 0-1,1 1 222,3-3 0,2 2 0,0 0 0,-2 1 251,-1 1 1,-1 1 0,0 0 0,0 2-252,-2-3 0,0 2 0,2-1 0,2-2 0,2-1 0,-2 3 1448,-6-7 0,0 2-1448,7-1 0,2 4 2673,-1 2-2673,-15 7 1764,-5 32-1764,-15 0 0,4 0 0,-5 0 0,0 1 0,-5-1 0,-3-1-493,7 0 0,-3-2 1,-1 0-1,-2-1 0,0 0 493,1-1 0,-2 0 0,0 0 0,-1-1 0,-1-1 0,-2-1-410,6 1 0,-1-1 1,-2 0-1,0-1 1,0 0-1,-1-1 0,1 1 1,0-1 242,-1-1 0,1 0 0,-1 0 0,1-1 0,-1 1 0,0-1 0,-1 1 0,-1 0-198,1 0 1,0 1 0,-2 0 0,0 0 0,0 0 0,0 1 0,0-1 0,0 0 0,0-1 298,2 1 1,-1-1 0,1 1 0,0-1 0,0 0 0,-1 0 0,1 1 0,-1 0 0,0 0 65,3 2 0,-1 0 0,0 1 0,0 0 0,0 0 0,0 0 0,0 1 0,0-1 0,1-1 0,0 1 0,-2-2 0,1 1 0,0-1 0,0-1 0,1 1 0,-1 0 0,1 1 0,0-1 0,0 2-257,-4-1 0,0 0 0,0 1 0,0 1 0,1-1 0,0 1 0,1-1 0,0 1 257,-4-2 0,2 1 0,-1-1 0,1 1 0,1-1 0,0 1 0,2 1-5,-2-1 0,1 1 1,1 0-1,0 1 1,0-1-1,0 0 5,0 0 0,-1 0 0,0 0 0,1 0 0,0 0 0,2 1 226,-2 1 1,1 0-1,1 1 1,0-1 0,-1 0-227,-2-2 0,-2-1 0,1 0 0,-1 1 0,-1 0 0,9 2 0,-1 1 0,-1 0 0,1 0 0,-1 0 0,0 0 181,-4-1 1,1 1 0,-1-1 0,-1 1 0,0 0 0,-1 0-182,4 0 0,-1 1 0,0-1 0,-1 1 0,0-1 0,0 2 0,0-1-33,-1 1 0,-1 1 0,0 0 1,0 0-1,-1 1 0,1-1 1,-2 0 32,4 0 0,0 0 0,-1 0 0,0 0 0,-1 0 0,0 0 0,0 0 0,0 0-149,3 0 0,-1 0 1,1 0-1,-2 0 0,1 0 1,0 0-1,-1 0 1,1 0-1,0 0 149,-1 0 0,1 0 0,-1 0 0,0 0 0,0 0 0,1 0 0,-1 0 0,0 0 0,1 0 0,-1 0 0,1 0 0,-1 0 0,0-1 0,1 1 0,-1 0 0,2 0 0,0 0 0,0 1-41,0 0 0,0 1 0,1 0 0,0 0 0,1 0 0,0 0 0,1 1 0,1-1 41,-6 1 0,1 0 0,0 0 0,2 1 0,1-1 0,1 1 346,-8 0 0,1 0 1,3 1-1,3 1-346,0 5 0,4 1 0,3-3 1441,0-7 0,3-1-1441,0 8 0,1-2 0,3-7 0,-2 0 0,0 4 0,-3 2 0,-2 0 744,-1-2 0,-3 1 1,-2 0-1,0 0-744,4 1 0,0 1 0,-1 0 0,-1 1 0,0 0 0,-2 1 0,0 2 0,0-1 0,-1 1 0,2-1 0,1-2 0,-1-1 0,2 0 0,0 1 0,3 1 691,-2 3 1,3 2 0,1 0 0,2-3-692,-19 0 0,6-3 457,17 1 1,7-2-458,6-7 0,0 0 0,-3 0 0,-11-1 0,-7 2 0,4 3 0,-2 2 0,-3 0 235,-8 0 0,-3 0 1,-1 1-236,7 0 0,-2 0 0,0 0 0,2 0 0,-5-1 0,3-1 0,1 1 135,1 3 0,2-1 0,5-1-135,-11-3 0,16 12 0,15-1 0,12-11 0,-12 12 1659,16-16-1659,-15 0 0,11 0 0,-12 15 0,0-11 0,-3 12 0,-1 0 0,5-12 0,15 11 0,0 1 0,0-12 0,0 12 0,0-16 0,0 15 0,0-11 0,0 28 0,0-28 0,0 27 0,0-27 0,0 43 0,0-8 0,0-5 0,0 3 0,0-3 0,0 2 0,1 7 0,-2 0 0,-7-6 0,0 1 0,7-5 0,1 3 0,-3-3 0,-13 4 0,1 0 0,11 10 0,4 0 0,-7-3 0,-2 1 0,0 3 0,2 2 0,5-6 0,0 2 0,-3-12 0,-1 1 0,2-2 0,3 4 0,2 0 0,-1 6 0,0 0 0,0-7 0,0-1 0,0 1 0,0-2 0,0-6 0,0-1 0,0 14 0,0 1 0,0-14 0,0 2 0,-5 5 0,-1 3 0,1-1 0,3 9 0,0 0 0,-3-9 0,-1 1 0,1 1-383,4 6 0,2 1 0,-1 0 383,0-3 0,0 0 0,0 0 0,0-4 0,0 1 0,0 0 0,0-2 0,0 5 0,0-2 0,0 1 0,0 1 0,0 1 0,0-2-165,0-5 0,0-2 1,0 1 164,0 2 0,0 0 0,0 0 0,0 7 0,0 0 0,0-12 0,0 2 0,0-1 0,0 11 0,0 0 0,0 0 0,0 0 0,0-1 0,0-2 0,1-6 0,-2-1 0,-6 0 0,-1 0 559,6 1 1,0-1-560,-6-4 0,0 0 262,7 11 0,2 1-262,-1-10 0,0 0 0,0 10 0,0 1 0,0-1 0,0 0 0,0-6 0,0 0 0,0 7 0,0-1 0,0-8 0,0 0 0,0 1 0,0-1 0,0-8 0,0 1 0,0 6 0,0-2 0,0 7 0,0-3 0,0-5 0,0-27 0,0 12 0,0-16 0,0-16 0,0 12 0,0-27 0,0 27 0,0-28 0,0 28 0,0-11 0</inkml:trace>
+  <inkml:trace contextRef="#ctx0" brushRef="#br0" timeOffset="40966">29704 2946 24575,'0'19'0,"0"-3"0,0-16 0,16 0 0,-13 0 0,29 0 0,-13 0 0,17 0 0,-1 0 0,0 0 0,-15 0 0,11 0 0,-27 0 0,43 0 0,-21-7 0,3-2 0,3 2 0,6-2 0,3 0 0,1-1-656,-3 0 1,2-1-1,0 0 1,2 0 0,1-1 624,-1 1 0,1-1 1,1 0-1,1 1 1,-1-1-1,0 0 31,-1 0 0,-1 0 0,1 1 0,-1-1 0,0 0 0,-1 0 0,5-2 0,1 0 0,-2 0 0,-2-1 0,-2 1-68,-2 1 0,-2 0 0,-3-1 0,-3 0 68,0-4 0,-3 0 0,-3 3 0,1 5 0,-7 0 0,-17-6 0,-3 1 0,-3 11 3276,-13-12-3147,-15 0 199,7-3-328,0 1 0,-3 1 0,2 3 0,-1 0 0,-1-4 0,-1 3 0,1 8 0,-1 2 0,3-3 0,-1 0 0,1 0 0,-1 1 0,0 5 0,-2 0 0,-4-7 0,-2-3 0,-2 1-433,-5 4 0,-1 1 0,-1 0 433,6 1 0,-1 1 0,-1-1 0,0-1 0,-1-2 0,0-1 0,0 1 0,2 2 0,-3 3 0,2 3 0,1-1 0,2-4 0,1-1 0,4 1 0,2 5 0,3 0 0,1 0 0,-1 0 0,0 0 0,1 0 0,2 0 0,-9 16 1299,32-12-1299,-15 27 0,11-27 0,-12 27 0,16-11 0,0 15 0,0 8 0,0-17 0,0 1 0,0 5 0,0-1 0,0-2 0,0-3 0,0 9 0,16-19 0,-12 0 0,27-12 0,-11 27 0,15-12 0,0 17 0,1-1 0,-27-9 0,1-1 0,21-1 0,-27 23 0,28-44 0,-28 13 0,11-16 0,1 0 0,-12 0 0,12 16 0,-1-12 0,-11 11 0,12-15 0</inkml:trace>
+  <inkml:trace contextRef="#ctx0" brushRef="#br0" timeOffset="50067">20249 12400 24575,'0'33'0,"0"1"0,0 9 0,0 4 0,0 0 0,0 3 0,0 2-792,0-12 1,0 1 0,0 0-1,0 0 792,0 1 0,0 0 0,0 0 0,0 0 0,0-3 0,0 0 0,0 0 0,0 1 0,0 6 0,0 2 0,0 0 0,0-2 0,0-7 0,0-1 0,0-1 0,0 2 0,0 5 0,0 3 0,0-2 0,0-1 0,0 4 0,-1-3 0,2 1 0,4 4 0,1 0 0,-1-1 0,-4 0 0,-1-1 0,3 0 11,7 0 1,2-1 0,-3-1-12,-6-4 0,-3-2 0,1 0 0,4-4 0,0-1 0,1 0 0,0 1 0,-1-1 0,0 0 367,-4 7 1,2-2-368,5-4 0,-1-3 0,-7 10 0,0-8 1584,0-15-1584,0-5 812,0-15-812,16 0 0,-12 16 0,12-12 0,-16 12 0,15-1 0,-11 5 0,12 3 0,0 5 0,-14 6 0,-1 2 0,15 9 0,0 0 0,-14 1 0,0-1 0,6-9 0,-1-2 0,-6-6 0,-2-5 0,1-3 0,0-5 0,16-15 0,-12 0 0,12 0 0,-1 0 0,5-15 0,3 5 0,5 0 0,12-7 0,6-1 0,-2 5 0,3 2 0,3 0-820,-6 1 1,2 1 0,2 1 0,2-1 802,-7 3 1,2 0-1,2 0 1,0 0-1,0 1 1,1-1-531,0 0 1,1 0 0,0 0 0,1 0 0,0 0 0,2 1 453,-9 0 1,1 1 0,1-1 0,1 1 0,0 0 0,-1-1 0,1 1 0,-1-1 92,0 1 0,-1-1 0,0 1 0,1-1 0,-1 0 0,0 1 0,1 0 0,-1 0 0,1 1 0,0 0 0,0 1 0,1 0 0,-1 0 0,0 0 0,0 0 0,0-1 0,4-1 0,1-1 0,-1 0 0,0 0 0,0 1 0,0-1 0,1 1 0,-7 1 0,2 0 0,-1 1 0,0 0 0,0 0 0,0-1 0,0 1 0,-2 0 0,3-1 0,-1 0 0,0 0 0,-1 0 0,0 0 0,0 1 0,1-1-321,1 1 1,0-1-1,0 1 1,1 0-1,-2 0 1,0 0-1,-1-1 321,7 0 0,-1 0 0,0-1 0,-2 1 0,1 1-223,-2 0 1,1 2-1,-1 0 1,-1-1-1,-2 0 223,3-3 0,-1 0 0,-2-1 0,-1 2 465,10 2 0,-3 2 0,-1-1-465,-5 0 0,-2 0 0,-1 0 0,-2 0 0,0 0 0,0 0 0,2 1 0,0-1 0,1-1 0,0-3 0,1-3 0,1 2 0,-6 4 0,3 0 0,0 1 0,-1-2 566,1-1 0,0-2 0,1 1 0,-1 1-566,2 2 0,0 1 0,0 0 0,1 1 0,0-1 0,1 0 0,0 0 0,-1 0 0,-1 0 0,0 0 0,0 0 0,1 0 195,3 0 0,2 0 0,1 0 1,0 0-196,-8 0 0,1-1 0,1 1 0,-1 0 0,1 1 0,2 1 0,-1 1 0,1 0 0,0 1 0,0-1 0,0 1 0,2-1 0,-1 1 0,0 0 0,-1 1 0,-1 1 0,0 1 0,0 0 0,0 1 0,0-1 0,-2 0 0,1 0 0,0 0 0,-1 0 0,-1 1 0,7 0 0,-1 1 0,0 0 0,-1 0 60,2 0 1,1-1 0,-2 1 0,-1 0-61,-6 0 0,-2 0 0,-1 0 0,1-1 0,2 2 0,0-1 0,-1 0 0,-1-1 50,5-1 1,-2-2 0,1 2-51,-2 4 0,1 1 0,-1-3 0,0-6 0,1-4 0,0 3 0,2 3 0,1 1 0,2-2-20,-8-2 0,2-3 1,0 1-1,1-1 20,0 1 0,2 0 0,-1 0 0,0 0 0,-1 0 0,-1 0 0,0 0 0,0 0 0,0 0 0,-1 0 0,1 0 0,-2 0 438,4 0 0,-1 0 1,1 0-439,5-1 0,0 1 0,-4 1 649,1 7 1,-2 0-650,-4-6 0,2-2 0,-2 2 0,11 6 0,0 0-164,-9-7 1,2-2 0,2 1 163,-7-1 0,3 1 0,0-1 0,-1 3 0,1 1 0,1 1 0,-1 1 0,0-2 0,0-1 0,0-2 0,0 1 0,1 0 0,0 3 0,1 0 0,0 1 0,-3-2 0,5-2 0,-3-2 0,2 1 0,6 0 0,0 0 0,-2 0 700,1 0 0,-2 0-700,-11 0 0,0 0 0,-3 0 410,-4 0 1,-1 0-411,7 0 0,-2 0 232,8 0-232,-15 0 0,0 0 638,1 0 1,-1 0-639,2 0 0,1 0 68,8 0 1,-1 0-69,-7 0 0,-1 0 0,16 0 0,-26-16 0,-9 12 0,-8-11 0,0-1 0,0-6 0,0-7 0,0-10 0,0-8 0,0-4-656,2 8 1,1-2-1,0-3 1,1-3 0,0-1 421,0 8 0,0-1 0,0-3 0,1 0 0,-1-2 0,1 0 0,0-1 0,-1 1-94,0 4 0,0-1 0,0 0 1,0-1-1,0 0 0,0-1 1,0 0-1,0 0 0,0-1 1,-1 0 176,1 6 1,-1-2 0,0 1 0,0-2 0,1 1 0,-1-1 0,0 1 0,0-1 0,-1 1 0,1 0 0,0 0-1,-1 2-149,0-6 1,0 0-1,0 1 1,0 0-1,0 0 1,-1 1-1,0-1 1,1 2 0,-1-1-1,-1 1 300,1-3 0,-1 0 0,1 0 0,-2 1 0,1 0 0,0 1 0,0 1 0,0 1 0,-1 1-178,2-7 1,-1 1-1,1 2 1,-1 1 0,0 1-1,-2 1 178,0-4 0,-1 1 0,-1 2 0,0 1 0,2 2 441,1 2 1,1 1-1,0 3 1,-3 1-442,-7-3 0,-2 3 0,2 0 0,8 3 0,3 0 0,-3 0 0,-8-1 0,-2 0 0,2-1 0,8 0 0,3-1 0,-4 0 1092,-6 1 0,-4 0 0,4 3-759,7-4 0,0 3 1305,-6 6 0,0 5-2,8 3 1255,0 5-2891,-8 15 777,7 0-777,-7 0 0,-8 15 0,12-11 0,-27 12 0,11-16 0,-15 0 0,11 8 0,-3 0 0,-6-6 0,-5 0 0,1 7 0,-3 3 0,-4-2-656,6-7 1,-2-3-1,-2-1 1,-2 1 0,0 2 576,0 3 1,0 3 0,-2 1 0,-1 0 0,-1 0 0,-1-2-332,7-3 0,-2-1 1,0-1-1,-1 0 1,0 0-1,0 0 0,0 2 1,0 0 291,0 3 1,1 1-1,-1 1 1,1 0 0,0 0-1,-1 0 1,0 0 0,0-2 117,0-1 0,-2-1 0,1 0 0,-1-1 0,1 1 0,0-1 0,1 1 0,1 0-291,-1 2 1,2 0 0,0 1-1,1 0 1,0-1 0,0 1-1,1-2 291,-4 1 0,-1-1 0,1 0 0,1 0 0,2 0 0,1-1-131,-6 0 1,2 0-1,2 0 1,2-1 130,-5 2 0,3 0 0,3-2 1115,-6-3 0,3-2-1115,4 1 0,0 0 1638,3 0 0,1 0-1223,0 0 1,0 0 1163,0 0 1,-1 0-1580,-6 0 0,-2 0 0,0 0 0,-2 0 0,11 0 0,0 0 0,-1 0 204,1 0 1,0 0-1,-1 0-204,1 0 0,-1 0 0,1 0 0,-6 0 0,0 0 0,-2 0 0,2 0 0,-6 0 0,14 0 0,-1 0 0,7 0 0,-1 0 0,-3 0 0,-4 0 0,-1 0-298,1 0 1,-2 0 0,0 0 297,-9 0 0,-2 0 0,1 0 0,4 0 0,1 0 0,1 0 129,5 0 1,0 0 0,2 0-130,-7 0 0,4 0 0,0 0 0,-3 0 0,21 16 0,-1-13 911,-11 13-911,11-16 0,-15 0 0,0 0 0,10 0 0,-1 0 0,-1 0 0,-1 0 0,-13 0 0,-4 0 0,11 0 0,-1 0 0,-2 0-420,-9 0 0,-1 0 0,-1 0 420,-1 0 0,1 0 0,0 0 0,3 0 0,1 0 0,-1 0 0,0 0 0,0 0 0,0 0 0,6 0 0,1 0 0,-2 0 0,2 0 0,-1 0 0,-1 0 0,0 0 0,-3 0 0,-1 0 0,-1 0 0,0 0-547,-3 0 1,-1 0-1,0 0 1,-1 0 546,10 0 0,-1 0 0,-1 0 0,2 0 0,0 0 0,-6 0 0,1-1 0,1 1 0,0 1-279,2 2 0,1 2 0,0-1 0,1 0 279,-8-3 0,2 0 0,-1 1 0,8 1 0,-1 2 0,1-1 0,0-1 0,-10-2 0,1-1 0,0-1 0,-2 1 0,1 0 0,-1 0 0,11 0 0,0-1 0,0 1 0,1 1 0,-8 4 0,2 1 0,-3-1 0,2-3 0,-3-2 0,0 1 0,1 0-436,1 2 1,2 2 0,-1 0 0,-1-2 435,6-2 0,0-1 0,-1-1 0,0 1 0,-1 0 0,0 0 0,0 0 0,-1 0 0,1 0 0,2 0 0,-5 0 0,2 0 0,1 0 0,-1 0 21,-1 0 1,0 0-1,1 0 1,2 0-22,-3 0 0,3 0 0,0 0 526,5 0 1,1 0-1,1 0-526,-1 0 0,1 0 0,1 0 0,-16 0 0,0 0 0,9 0 0,-1 0 0,-2 0-2,-6 0 1,-1 0 0,0 0 1,2-1 0,-1 0 0,1 3 0,1 2 0,-1 2 0,2-1 536,4-4 1,1-1-1,3 3-536,-9 13 0,3 0 515,0-14 1,2 0-516,10 6 0,1-1 147,-3-6 0,0-2-147,-13 1 660,14 0 1,-1 0-661,6 0 0,1 0 193,0 0 1,-1 0-194,-6 0 0,2 0 0,-7 0 0,12 0 0,3 0 0,4 0 0,-11 0 0,27 0 0,-28 0 0,13 0 0,-16 16 0,-1-12 0,1 12 0,10-15 0,-1-2 0,-13 1 0,13 7 0,1 1 0,-10-4 0,-1 12 0,17-1 0,-13-11 0,28 12 0,-11-16 0,15 0 0</inkml:trace>
+</inkml:ink>
+</file>
+
+<file path=ppt/ink/ink19.xml><?xml version="1.0" encoding="utf-8"?>
+<inkml:ink xmlns:inkml="http://www.w3.org/2003/InkML">
+  <inkml:definitions>
+    <inkml:context xml:id="ctx0">
+      <inkml:inkSource xml:id="inkSrc0">
+        <inkml:traceFormat>
+          <inkml:channel name="X" type="integer" min="-2.14748E9" max="2.14748E9" units="cm"/>
+          <inkml:channel name="Y" type="integer" min="-2.14748E9" max="2.14748E9" units="cm"/>
+          <inkml:channel name="F" type="integer" max="32767" units="dev"/>
+        </inkml:traceFormat>
+        <inkml:channelProperties>
+          <inkml:channelProperty channel="X" name="resolution" value="1000" units="1/cm"/>
+          <inkml:channelProperty channel="Y" name="resolution" value="1000" units="1/cm"/>
+          <inkml:channelProperty channel="F" name="resolution" value="0" units="1/dev"/>
+        </inkml:channelProperties>
+      </inkml:inkSource>
+      <inkml:timestamp xml:id="ts0" timeString="2026-01-28T18:14:02.562"/>
+    </inkml:context>
+    <inkml:brush xml:id="br0">
+      <inkml:brushProperty name="width" value="0.05292" units="cm"/>
+      <inkml:brushProperty name="height" value="0.05292" units="cm"/>
+      <inkml:brushProperty name="color" value="#FF0000"/>
+    </inkml:brush>
+  </inkml:definitions>
+  <inkml:trace contextRef="#ctx0" brushRef="#br0">3704 7973 24575,'35'0'0,"-4"0"0,5 0 0,2 0 0,3 0 0,2 0 0,0 0 0,1 0 0,2 0-729,-2 0 1,2 0 0,0 0 0,-2 0 728,5 0 0,-2 0 0,0 0 0,3 0 0,0 0 0,-1 0 20,-6 0 0,-2 1 1,1-2-21,-1-4 0,0-1 0,-2 1 219,7 3 1,-2 0-220,-10-3 0,0-1 0,0 2 0,15 3 0,0 2 0,-13-1 0,0 0 0,0 0 0,1 0 0,0 0 0,3 0 0,-3 0 0,3-1 0,-1 2 0,-2-1 0,-3 0 0,-1 0 0,1 0 0,15 0 0,3 0 0,-4 0 0,-1 0 0,-3 0 0,0-1 0,2 2 0,-12-1 0,1 0 0,-2 0 0,0 0 0,0 0 0,10-1 0,-1 2 720,-11-1 0,0 0-720,4-1 0,1 2 0,6-1 0,2 0 0,1 0 0,0 0 0,-10 0 0,0-1 0,1 2 22,-1-2 1,0 1 0,1 1-23,4-2 0,0 1 0,1 1 0,1-1 0,0 0 0,0 0 0,-3 0 0,0 0 0,0 0 0,2 0 0,-1 0 0,-1 0 0,10 0 0,0 0 0,-14 0 0,1 0 0,-1 0 0,10 0 0,0 0 126,-1-1 1,-2 2-127,-14-1 0,-1 0 0,5 0 0,3 0 0,6 0 0,4 0 0,-10 0 0,1 0 0,3 0-402,9 0 1,2-1 0,1 2 401,-4-1 0,1 0 0,0 0 0,1-1 0,1 2 0,0-1 0,-2-1 0,-1 0 0,-1 3 0,-9 2 0,-1 2 0,1-1 5,2-3 1,0-2 0,0 2-6,-4 3 0,0 1 0,1-1 0,7-4 0,1-2 0,2 1-641,-4 0 1,0 0 0,3 0 0,1 0 640,-2 0 0,2 0 0,2 0 0,0 0 0,1 0-528,-4 0 0,0 0 1,2 0-1,0 0 1,0 0-1,0 0 528,-4 0 0,0 0 0,1 0 0,0 0 0,-1 0 0,1 0 0,-1 0 0,6 0 0,-1 0 0,1 0 0,-1 0 0,0 0 0,0 0 0,-1 0 0,0 0 0,0 0 0,0 0 0,-1 0 0,-2 0-200,3 0 0,-1 0 1,-2 0-1,1 0 0,1 0 200,2 0 0,1 0 0,0 0 0,-1 0 0,-1 0 0,1 0 0,0 0 0,-2 0 0,0 0-100,-1 0 1,0 0 0,-1 0 0,-2 0 99,7 0 0,-2 0 0,-2 0 593,-2 0 0,-2 0 0,-3 0-593,0 0 0,-2 0 1630,6 0 0,-1 0-1630,-10 0 0,0 0 1274,6 0 0,-1 0-1274,-5 0 0,1 0 645,2 0 0,-2 0-645,7 0 42,-4 0 1,-3 0-43,-8 0 0,23 0 0,-43 0 0,11 0 0,-15 0 0,0 0 0,0-16 0,0 12 0,0-11 0</inkml:trace>
+  <inkml:trace contextRef="#ctx0" brushRef="#br0" timeOffset="4900">13776 9172 24575,'33'0'0,"1"0"0,-2 0 0,4 0 0,1 0 0,1 0 0,3 0 0,0 0 0,0 0-512,0 0 0,1 0 1,-1 0-1,0 0 512,7 0 0,0 0 0,-3 0 0,-8 0 0,-2 0 0,-5 0 659,9 0-659,0 0 338,-37 0-338,6 0 0,-8 0 0,0 0 1050,-8 0-1050,-9 0 0,-11 0 0,4 0 0,-3 0 0,0 0 0,-1 0 0,1 0 0,-1 0 0,2 0 0,1 0 0,-10 0 0,0 0 0,0 0 0,-1 0 0,1 0 0,10 0 0,-1 0 0,-13 0 0,13 0 0,1 0 0,-10 0 0,15 0 0,20 0 0,20 0 0,15 0 0,0 0 0,0 0 0,1 0 0,-1 0 0,-15 0 0,-5 0 0,1 0 0,-28 0 0,8 0 0,-18-1 0,-7 2 0,2 7 0,-1 0 0,1-6 0,0 0 0,-1 6 0,5 0 0,3-8 0,4 0 0,16 0 0,32 0 0,-9 0 0,9 0 0,3 0 0,-8 0 0,1 0 0,6 0 0,2 0 0,0 0 0,-1 0 0,-7-2 0,-1 4 0,-1 5 0,-1 1 0,10-4 0,0 12 0,1-1 0,-1-11 0,-16 12 0,-19-16 0,-19 0 0,-16 0 0,9 0 0,1 0 0,-15 0 0,15 0 0,-1 0 0,-9 0 0,16 0 0,3 0 0,16 0 0,16 0 0,-13 0 0,29 0 0,-13 0 0,1 16 0,-4-12 0,-1 11 0,-11-15 0,-4 0 0,-19 0 0,-17 0 0,1 0 0,0 0 0,0 0 0,-1 0 0,1 0 0,10 0 0,-1 0 0,-13 0 0,12 0 0,3 0 0,4 0 0,5 0 0,15 0 0,0 0 0</inkml:trace>
+</inkml:ink>
+</file>
+
 <file path=ppt/ink/ink2.xml><?xml version="1.0" encoding="utf-8"?>
 <inkml:ink xmlns:inkml="http://www.w3.org/2003/InkML">
   <inkml:definitions>
@@ -2128,6 +2287,34 @@
   <inkml:trace contextRef="#ctx0" brushRef="#br0">2373 7399 24575,'18'0'0,"8"0"0,15 0 0,-16 0 0,1 0 0,1 0 0,0 0 0,2 0 0,0 0 0,4 0 0,1 0 0,1 0 0,4 0 0,2 0 0,5 0 0,-3 0 0,2-1 0,0 0 0,-6 1 0,2-1 0,-5 0 0,-10 0 0,-2-1 0,17 1 0,-6 1 0,-1 0 0,2 0 0,-3 0 0,-4 0 0,-4 0 0,-5 0 0,-1 0 0,-1 0 0,3 0 0,2 0 0,2 0 0,3 0 0,18 0 0,-20 0 0,1 0 0,0 0 0,-1 0 0,19 0 0,-18 0 0,-5 0 0,-1 0 0,-2 0 0,-2 1 0,1 1 0,-3-1 0,-1 1 0,-2-2 0,-1 0 0,-3 0 0,-1 0 0,-3 0 0,-2 0 0</inkml:trace>
   <inkml:trace contextRef="#ctx0" brushRef="#br0" timeOffset="2051">3929 7397 24575,'-21'-7'0,"0"0"0,-5-1 0,3 0 0,1 2 0,4-1 0,0-2 0,1-1 0,1-1 0,1-2 0,-1-1 0,-2-2 0,-1-2 0,-1 0 0,2-1 0,4 4 0,3 3 0,5 6 0,5 4 0,8 7 0,2 2 0,3 5 0,-3-3 0,0 0 0,0 0 0,2 0 0,4 2 0,4 0 0,4 2 0,2-1 0,0 1 0,0-1 0,1 1 0,-2 0 0,-2-3 0,-5-1 0,-3-3 0,-5-2 0,-4 1 0,-4-1 0,-4 0 0,-2 3 0,-3 0 0,-1 1 0,0 0 0,0-1 0,0 0 0,-2 0 0,-3 1 0,-2 2 0,-2 0 0,3 0 0,4-2 0,3-2 0,3-2 0,2-1 0,1-2 0,0 2 0,-2 0 0,-2 2 0,-4 4 0,-3 5 0,-3 4 0,1 2 0,2 0 0,2-3 0,4-5 0,3-5 0,3-5 0,2-2 0</inkml:trace>
   <inkml:trace contextRef="#ctx0" brushRef="#br0" timeOffset="19166">10363 7224 24575,'32'0'0,"1"0"0,6 0 0,-1 0 0,4 0 0,1 0-820,-4 0 1,1 0 0,1 0 0,1 0 670,6 0 0,1 0 0,0 0 1,0 0 148,0 0 0,0 0 0,0 0 0,-1 0 0,-1 0 0,0 0 0,-1 0 0,0 0 0,-2 0 0,0 0 0,0 0 0,-2 0 400,7 0 1,-2 0-1,2 0-400,-8 0 0,1 0 0,-1 0 0,-3 0 0,-3 0 0,-3 0 0,1 0 316,19 0 1,-7 0-317,-14 0 0,-13 0 0,-8 0 2038,-1 0-2038,-1 0 0,-1 0 0,1 0 0,-1 0 0,-1 0 0,-4 0 0,-2 1 0,-4 1 0,2 0 0,-2 1 0,3 0 0,-1 0 0,0 0 0,-1-1 0,1-1 0,0-1 0</inkml:trace>
+</inkml:ink>
+</file>
+
+<file path=ppt/ink/ink9.xml><?xml version="1.0" encoding="utf-8"?>
+<inkml:ink xmlns:inkml="http://www.w3.org/2003/InkML">
+  <inkml:definitions>
+    <inkml:context xml:id="ctx0">
+      <inkml:inkSource xml:id="inkSrc0">
+        <inkml:traceFormat>
+          <inkml:channel name="X" type="integer" min="-2.14748E9" max="2.14748E9" units="cm"/>
+          <inkml:channel name="Y" type="integer" min="-2.14748E9" max="2.14748E9" units="cm"/>
+          <inkml:channel name="F" type="integer" max="32767" units="dev"/>
+        </inkml:traceFormat>
+        <inkml:channelProperties>
+          <inkml:channelProperty channel="X" name="resolution" value="1000" units="1/cm"/>
+          <inkml:channelProperty channel="Y" name="resolution" value="1000" units="1/cm"/>
+          <inkml:channelProperty channel="F" name="resolution" value="0" units="1/dev"/>
+        </inkml:channelProperties>
+      </inkml:inkSource>
+      <inkml:timestamp xml:id="ts0" timeString="2026-01-28T17:32:55.068"/>
+    </inkml:context>
+    <inkml:brush xml:id="br0">
+      <inkml:brushProperty name="width" value="0.05292" units="cm"/>
+      <inkml:brushProperty name="height" value="0.05292" units="cm"/>
+      <inkml:brushProperty name="color" value="#FF0000"/>
+    </inkml:brush>
+  </inkml:definitions>
+  <inkml:trace contextRef="#ctx0" brushRef="#br0">11042 6262 24575,'0'25'0,"0"1"0,0 4 0,0 4 0,0 4 0,0 2 0,0 3 0,0 2 0,0 3-547,0-8 1,0 2 0,0 1 0,0 1 0,0 1 0,0 0 77,0-3 1,0 1 0,0 1 0,0-1 0,0 1 0,0 0 0,0 0 347,0 5 0,0 1 0,0-1 0,0 0 0,0 0 0,0-1 4,0-4 1,0 1 0,0-1 0,0 0 0,0-1 0,0-1 116,0 3 0,0 0 0,0-2 0,0 0 0,0 1 18,0-2 1,0 0-1,0 1 1,0-2-1,0 0-18,0 7 0,-1-1 0,1 0 0,1 0 0,2 1 0,2 0 0,-1 1 0,0-2-5,-3-7 1,-1 0-1,0-1 1,3 2 4,3 8 0,3 2 0,0-1 0,-2-4 0,-5-4 0,-3-3 0,4 0 0,6 5 0,4-1 0,-4-5 1544,-7-9 0,0-7-1544,14-2 2545,-16-4-2545,0-16 2240,15 0-2240,-11 0 30,12 0-30,0 0 0,3 0 0,11 0 0,7 0 0,0 0 0,4 0 0,2 0-589,-5 0 0,0 0 1,2 0-1,1 0 589,2 0 0,1 0 0,2 1 0,0-2 0,1 1-543,-6-2 1,1 0-1,1-1 1,-1 0-1,1 0 1,0 0 542,2 0 0,-1 1 0,1-1 0,0 0 0,1-1 0,0-1 0,-3-1 0,0-1 0,1 0 0,0-2 0,0 1 0,0 1 0,0 0 0,-1 2 0,0 0 0,0 1 0,0 0 0,0 0 0,-1-1 0,1 1 0,4-2 0,-1 0 0,1 0 0,-1 0 0,0 1 0,0 1 0,-1 1 0,1 1 0,0 1 0,-1 0 0,0 0 0,-2 1-327,5-1 0,-2 1 0,0 0 0,-1 1 1,0-1 326,3 0 0,-1 0 0,-1 0 0,1 0 0,0 0 0,1 0 0,-1 0 0,-1 0 0,-6 0 0,0 0 0,-1 0 0,3 0 0,-2 0 0,2 0 0,2 0 0,0 0 0,1 0-480,-3 0 1,1 0 0,1 0 0,0 0 0,2 0 0,0 0 479,-1 0 0,1 0 0,1 1 0,0-1 0,1 0 0,0 0 0,0-1-215,1-1 1,1 0 0,-1 0 0,1-1 0,0 0 0,0 1 0,1 0 214,-6 1 0,1 1 0,0 0 0,0 0 0,0 0 0,0 0 0,0-1 0,-1-1 0,5-1 0,-1-2 0,1 0 0,-2 0 0,1 0 0,1 0 0,-1 2 0,-4 1 0,0 1 0,0 1 0,0 1 0,0-1 0,0 0 0,1-1 0,-1 0 0,1-2 0,0 0 0,0-1 0,1-1 0,-1 1 0,1-1 0,-1 1 0,0 1 0,1 0 0,-1 0 0,1 1 0,-1 0 0,1 0 0,-1 0 0,1-1 0,0 0-127,1-1 0,0 1 0,0-2 0,0 1 0,1 0 1,-1-1-1,1 0 0,-1 0 127,0-1 0,1 0 0,-1-1 0,0 0 0,1 1 0,-1-1 0,1 1 0,0 0 0,-4 1 0,0 0 0,0 1 0,0 0 0,1 0 0,-1 0 0,0 0 0,0-1 0,0 0 0,3 0 0,0-2 0,0 1 0,0-1 0,0 0 0,0 0 0,0 1 0,0 1 0,1-1 0,0 2 0,0-1 0,0 1 0,0 0 0,0 0 0,0 0 0,0-1 0,-2 1 0,-1 0 0,1-1 0,-1 1 0,0-1 0,1 1 0,-2-1 0,1 1-140,-2 0 1,0-1-1,0 1 1,-1-1-1,0 1 1,1 0-1,-1-1 1,1 1 139,0-1 0,1 1 0,0 0 0,0-1 0,0 1 0,0-1 0,-1 1 0,0-1 0,2 0 0,0 0 0,0 0 0,-1 0 0,0 0 0,1 0 0,-1 0 16,1 0 1,-1 0 0,1 0 0,-1 0 0,1 0 0,-1 0-1,0 0-16,-2 0 0,1-1 0,-1 1 0,0 0 0,0 0 0,-1 0 0,-1 1 170,4 0 0,-1 1 0,-1 0 0,0 0 1,-1 0-1,0-1-170,5-2 0,0-1 0,-2 0 0,0 0 0,-1 3 615,2 1 1,-1 3 0,-2 0 0,-1-1-616,2-4 0,-2-2 0,-3 3 1600,11 3 1,-6 2-1601,-16-1 0,-3 0 3276,18 0-3095,-23 0 2364,-4 0-2545,-16 0 945,-16-16-945,-4 12 0,1-27 0,-5 11 0,22-3 0,2-4 0,-10-8 0,-3-1 0,3-4 0,0-2 0,-1 8 0,-1-1 0,0 0-214,0-3 0,-1 0 0,3 0 214,3 1 0,1 1 0,-1-1 0,-3 1 0,-1 1 0,1 1 0,0-11 0,0 3 0,0 14 0,1 1 0,-1-7 0,4 2 0,6-7 0,0 14 0,0-1 0,0 1 0,0-1 0,0-8 0,0-3 0,1-10 0,-2-4-374,-2 15 0,-2-2 1,1-2-1,0-1 374,2-4 0,2-1 0,0-2 0,-2-1-533,0 4 0,-2 0 0,0-2 0,1 0 0,1 0 533,1-1 0,0 0 0,2 0 0,-1 0 0,1 1 0,-1 0 0,0 0 0,0 1 0,0 0 0,0 2-149,0-1 0,0 1 1,0 1-1,0 3 149,0-3 0,0 2 0,0 3 0,0 1 0,0 8 0,0 9 1757,0 5-1757,0 15 2862,-16 0-2862,-4 15 778,-15-11-778,10 12 0,-1 0 0,0-13 0,-3-3 0,-13 8 0,-2 0 0,0-7 0,-2-2 0,12 1 0,-2 0 0,0 0-487,-6 0 1,-1 0-1,-1 0 487,6 0 0,-1-1 0,-1 1 0,-2 1-638,-2 1 0,-2 1 0,-2 0 0,-1 1 0,1 0 638,6-1 0,0 0 0,0 0 0,-1 1 0,0-1 0,0 0 0,-5 1 0,0-1 0,-1-1 0,0 2 0,1-1 0,0 1 0,3 1 0,1 1 0,-1 0 0,2-1 0,-1 1 0,0-3 0,1-1 0,1-1 0,-1-1 0,0 0 0,1 0 0,0 1 0,-5 2 0,0 0 0,0 0 0,2 1 0,0-1-273,-4 1 1,2 0-1,0 1 1,2-2 272,5-2 0,0-1 0,2 1 0,1 1-163,-2 2 1,2 3 0,0-3 162,-4-3 0,0-1 0,1-1 0,4 1 0,0 0 0,-2 0 0,-7 0 0,-1 0 0,0 0 0,4 0 0,1 0 0,-1 0 57,-7 0 1,-1 0 0,0 0-58,2 0 0,0-1 0,1 2 0,-3 4 0,0 1 0,1-1 0,1-4 0,1-1 0,1 3 0,-2 6 0,2 4 0,-2-4 0,2-6 0,-2-3 0,1 1 0,0 3 0,1 2 0,-2 0 0,-1-1 0,-1 1 0,0-2 0,11-2 0,0-2 0,-1 1 0,0 0 381,-2 3 0,-1 0 0,1 1 0,0-2-381,2-2 0,-1-1 0,1-1 0,0 1 0,1 0 0,-1 0 0,0 0 0,3 0 206,-6 0 0,1 0 0,1 0-206,1 0 0,-1 0 0,1 0 0,-3 0 0,0 0 0,-1 0-386,-2 0 1,-1 0 0,-3 0 385,3 0 0,-4 0 0,0 0 0,0 0-252,1 0 0,1 0 0,-1 0 0,-1 0 252,8 0 0,-1 0 0,-1 0 0,1 0 0,1 0 0,-7 0 0,1 0 0,1 0 0,1 0 27,4 0 0,0 0 0,2 0 1,-1 0-28,2 0 0,0 0 0,1 0 0,1 0 1,-4 0 1,0 0-1,1 0-1,0 0 0,0 0 0,2 0 0,3 0 0,1 0 0,0 0 0,0 0 0,0 0 0,-1 0 0,-6 0 0,-2 0 0,0 0 180,3 0 1,-1 0 0,-2 0-181,4 0 0,-1 0 0,-1 0 0,0 0 0,2 0 0,0 0 0,0 0 0,0 0 0,-4 0 0,-1 0 0,0 0 0,2 0 0,-6 0 0,1 0 0,0 0 0,4 0 0,1 0 0,1 0 655,6 0 1,1 0 0,2 0-656,-8 0 0,0 0 0,7-1 0,0 1 0,0 1 0,-11 7 0,0 0 231,5-6 0,-1-2 1,0 2-232,5 3 0,0 1 0,-2-2 0,-6-2 0,-3-3 0,1 0 0,7 1 0,0 0 0,0 0 0,-2 0 0,-1 0 0,1 0 0,2 0 0,0 0 0,4 0 297,-3 0 1,1 0-298,-6 0 0,4 0 1314,0 0-1314,5 0 0,1 0 134,-6 0-134,5 0 0,1 0 717,-6 0-717,6 0 0,-1 0 0,-5 0 0,14 0 0,-1 0 0,-1 0 0,3 0 0,1 0 0,-24 0 0,27 0 0,0 0 0,-11 0 0,27 0 0,-27 0 0,27 0 0,-12 0 0,8 0 0,6 0 0,-21 0 0,3 0 0,-15 0 0,0 0 0,-1 0 0,1 0 0,16 0 0,-13 16 0,13-12 0,-17 12 0,1-16 0,0 0 0,-1 0 0,1 7 0,10-6 0,-1 0 0,-13 7 0,12 0 0,3 0 0,4-4 0,-11 12 0,27-16 0,-11 0 0,-1 0 0,12 0 0,-27 0 0,27 0 0,-12 0 0,0 0 0,12 0 0,-11 0 0,15 0 0,0 0 0,-16 15 0,12-11 0,-12 12 0,16-16 0,0 0 0,0 0 0</inkml:trace>
 </inkml:ink>
 </file>
 
@@ -15848,7 +16035,15 @@
             </a:pPr>
             <a:r>
               <a:rPr lang="en-US"/>
-              <a:t>In Python, a for-loop is the a common way to repeat code …</a:t>
+              <a:t>In Python, a </a:t>
+            </a:r>
+            <a:r>
+              <a:rPr lang="en-US" b="1"/>
+              <a:t>for-loop</a:t>
+            </a:r>
+            <a:r>
+              <a:rPr lang="en-US"/>
+              <a:t> is a common way to repeat code …</a:t>
             </a:r>
           </a:p>
         </p:txBody>
@@ -16838,6 +17033,57 @@
           </a:p>
         </p:txBody>
       </p:sp>
+      <mc:AlternateContent xmlns:mc="http://schemas.openxmlformats.org/markup-compatibility/2006">
+        <mc:Choice xmlns:p14="http://schemas.microsoft.com/office/powerpoint/2010/main" Requires="p14">
+          <p:contentPart p14:bwMode="auto" r:id="rId2">
+            <p14:nvContentPartPr>
+              <p14:cNvPr id="8" name="Ink 7">
+                <a:extLst>
+                  <a:ext uri="{FF2B5EF4-FFF2-40B4-BE49-F238E27FC236}">
+                    <a16:creationId xmlns:a16="http://schemas.microsoft.com/office/drawing/2014/main" id="{247A5D44-A0D1-C696-4102-EB248C628E79}"/>
+                  </a:ext>
+                </a:extLst>
+              </p14:cNvPr>
+              <p14:cNvContentPartPr/>
+              <p14:nvPr/>
+            </p14:nvContentPartPr>
+            <p14:xfrm>
+              <a:off x="3949560" y="2082960"/>
+              <a:ext cx="4039200" cy="1232640"/>
+            </p14:xfrm>
+          </p:contentPart>
+        </mc:Choice>
+        <mc:Fallback>
+          <p:pic>
+            <p:nvPicPr>
+              <p:cNvPr id="8" name="Ink 7">
+                <a:extLst>
+                  <a:ext uri="{FF2B5EF4-FFF2-40B4-BE49-F238E27FC236}">
+                    <a16:creationId xmlns:a16="http://schemas.microsoft.com/office/drawing/2014/main" id="{247A5D44-A0D1-C696-4102-EB248C628E79}"/>
+                  </a:ext>
+                </a:extLst>
+              </p:cNvPr>
+              <p:cNvPicPr/>
+              <p:nvPr/>
+            </p:nvPicPr>
+            <p:blipFill>
+              <a:blip r:embed="rId3"/>
+              <a:stretch>
+                <a:fillRect/>
+              </a:stretch>
+            </p:blipFill>
+            <p:spPr>
+              <a:xfrm>
+                <a:off x="3940200" y="2073600"/>
+                <a:ext cx="4057920" cy="1251360"/>
+              </a:xfrm>
+              <a:prstGeom prst="rect">
+                <a:avLst/>
+              </a:prstGeom>
+            </p:spPr>
+          </p:pic>
+        </mc:Fallback>
+      </mc:AlternateContent>
     </p:spTree>
     <p:extLst>
       <p:ext uri="{BB962C8B-B14F-4D97-AF65-F5344CB8AC3E}">
@@ -20953,6 +21199,57 @@
           </a:fontRef>
         </p:style>
       </p:cxnSp>
+      <mc:AlternateContent xmlns:mc="http://schemas.openxmlformats.org/markup-compatibility/2006">
+        <mc:Choice xmlns:p14="http://schemas.microsoft.com/office/powerpoint/2010/main" Requires="p14">
+          <p:contentPart p14:bwMode="auto" r:id="rId2">
+            <p14:nvContentPartPr>
+              <p14:cNvPr id="2" name="Ink 1">
+                <a:extLst>
+                  <a:ext uri="{FF2B5EF4-FFF2-40B4-BE49-F238E27FC236}">
+                    <a16:creationId xmlns:a16="http://schemas.microsoft.com/office/drawing/2014/main" id="{40290BB4-3C92-DA12-321B-BDF25F2E5952}"/>
+                  </a:ext>
+                </a:extLst>
+              </p14:cNvPr>
+              <p14:cNvContentPartPr/>
+              <p14:nvPr/>
+            </p14:nvContentPartPr>
+            <p14:xfrm>
+              <a:off x="6184800" y="2952720"/>
+              <a:ext cx="4350240" cy="3036240"/>
+            </p14:xfrm>
+          </p:contentPart>
+        </mc:Choice>
+        <mc:Fallback>
+          <p:pic>
+            <p:nvPicPr>
+              <p:cNvPr id="2" name="Ink 1">
+                <a:extLst>
+                  <a:ext uri="{FF2B5EF4-FFF2-40B4-BE49-F238E27FC236}">
+                    <a16:creationId xmlns:a16="http://schemas.microsoft.com/office/drawing/2014/main" id="{40290BB4-3C92-DA12-321B-BDF25F2E5952}"/>
+                  </a:ext>
+                </a:extLst>
+              </p:cNvPr>
+              <p:cNvPicPr/>
+              <p:nvPr/>
+            </p:nvPicPr>
+            <p:blipFill>
+              <a:blip r:embed="rId3"/>
+              <a:stretch>
+                <a:fillRect/>
+              </a:stretch>
+            </p:blipFill>
+            <p:spPr>
+              <a:xfrm>
+                <a:off x="6175440" y="2943360"/>
+                <a:ext cx="4368960" cy="3054960"/>
+              </a:xfrm>
+              <a:prstGeom prst="rect">
+                <a:avLst/>
+              </a:prstGeom>
+            </p:spPr>
+          </p:pic>
+        </mc:Fallback>
+      </mc:AlternateContent>
     </p:spTree>
     <p:extLst>
       <p:ext uri="{BB962C8B-B14F-4D97-AF65-F5344CB8AC3E}">
@@ -22038,6 +22335,57 @@
           </a:fontRef>
         </p:style>
       </p:cxnSp>
+      <mc:AlternateContent xmlns:mc="http://schemas.openxmlformats.org/markup-compatibility/2006">
+        <mc:Choice xmlns:p14="http://schemas.microsoft.com/office/powerpoint/2010/main" Requires="p14">
+          <p:contentPart p14:bwMode="auto" r:id="rId2">
+            <p14:nvContentPartPr>
+              <p14:cNvPr id="16" name="Ink 15">
+                <a:extLst>
+                  <a:ext uri="{FF2B5EF4-FFF2-40B4-BE49-F238E27FC236}">
+                    <a16:creationId xmlns:a16="http://schemas.microsoft.com/office/drawing/2014/main" id="{52106321-4541-A97E-D2ED-96D07A4B415F}"/>
+                  </a:ext>
+                </a:extLst>
+              </p14:cNvPr>
+              <p14:cNvContentPartPr/>
+              <p14:nvPr/>
+            </p14:nvContentPartPr>
+            <p14:xfrm>
+              <a:off x="8763120" y="3016080"/>
+              <a:ext cx="324000" cy="51480"/>
+            </p14:xfrm>
+          </p:contentPart>
+        </mc:Choice>
+        <mc:Fallback>
+          <p:pic>
+            <p:nvPicPr>
+              <p:cNvPr id="16" name="Ink 15">
+                <a:extLst>
+                  <a:ext uri="{FF2B5EF4-FFF2-40B4-BE49-F238E27FC236}">
+                    <a16:creationId xmlns:a16="http://schemas.microsoft.com/office/drawing/2014/main" id="{52106321-4541-A97E-D2ED-96D07A4B415F}"/>
+                  </a:ext>
+                </a:extLst>
+              </p:cNvPr>
+              <p:cNvPicPr/>
+              <p:nvPr/>
+            </p:nvPicPr>
+            <p:blipFill>
+              <a:blip r:embed="rId3"/>
+              <a:stretch>
+                <a:fillRect/>
+              </a:stretch>
+            </p:blipFill>
+            <p:spPr>
+              <a:xfrm>
+                <a:off x="8753760" y="3006720"/>
+                <a:ext cx="342720" cy="70200"/>
+              </a:xfrm>
+              <a:prstGeom prst="rect">
+                <a:avLst/>
+              </a:prstGeom>
+            </p:spPr>
+          </p:pic>
+        </mc:Fallback>
+      </mc:AlternateContent>
     </p:spTree>
     <p:extLst>
       <p:ext uri="{BB962C8B-B14F-4D97-AF65-F5344CB8AC3E}">
@@ -22580,6 +22928,57 @@
           </a:p>
         </p:txBody>
       </p:sp>
+      <mc:AlternateContent xmlns:mc="http://schemas.openxmlformats.org/markup-compatibility/2006">
+        <mc:Choice xmlns:p14="http://schemas.microsoft.com/office/powerpoint/2010/main" Requires="p14">
+          <p:contentPart p14:bwMode="auto" r:id="rId2">
+            <p14:nvContentPartPr>
+              <p14:cNvPr id="2" name="Ink 1">
+                <a:extLst>
+                  <a:ext uri="{FF2B5EF4-FFF2-40B4-BE49-F238E27FC236}">
+                    <a16:creationId xmlns:a16="http://schemas.microsoft.com/office/drawing/2014/main" id="{81E3B2A9-1F0C-5D9A-AE88-B1747EA5458B}"/>
+                  </a:ext>
+                </a:extLst>
+              </p14:cNvPr>
+              <p14:cNvContentPartPr/>
+              <p14:nvPr/>
+            </p14:nvContentPartPr>
+            <p14:xfrm>
+              <a:off x="5435640" y="3556080"/>
+              <a:ext cx="749520" cy="12960"/>
+            </p14:xfrm>
+          </p:contentPart>
+        </mc:Choice>
+        <mc:Fallback>
+          <p:pic>
+            <p:nvPicPr>
+              <p:cNvPr id="2" name="Ink 1">
+                <a:extLst>
+                  <a:ext uri="{FF2B5EF4-FFF2-40B4-BE49-F238E27FC236}">
+                    <a16:creationId xmlns:a16="http://schemas.microsoft.com/office/drawing/2014/main" id="{81E3B2A9-1F0C-5D9A-AE88-B1747EA5458B}"/>
+                  </a:ext>
+                </a:extLst>
+              </p:cNvPr>
+              <p:cNvPicPr/>
+              <p:nvPr/>
+            </p:nvPicPr>
+            <p:blipFill>
+              <a:blip r:embed="rId3"/>
+              <a:stretch>
+                <a:fillRect/>
+              </a:stretch>
+            </p:blipFill>
+            <p:spPr>
+              <a:xfrm>
+                <a:off x="5426280" y="3546720"/>
+                <a:ext cx="768240" cy="31680"/>
+              </a:xfrm>
+              <a:prstGeom prst="rect">
+                <a:avLst/>
+              </a:prstGeom>
+            </p:spPr>
+          </p:pic>
+        </mc:Fallback>
+      </mc:AlternateContent>
     </p:spTree>
     <p:extLst>
       <p:ext uri="{BB962C8B-B14F-4D97-AF65-F5344CB8AC3E}">
@@ -23436,6 +23835,57 @@
           </a:p>
         </p:txBody>
       </p:sp>
+      <mc:AlternateContent xmlns:mc="http://schemas.openxmlformats.org/markup-compatibility/2006">
+        <mc:Choice xmlns:p14="http://schemas.microsoft.com/office/powerpoint/2010/main" Requires="p14">
+          <p:contentPart p14:bwMode="auto" r:id="rId2">
+            <p14:nvContentPartPr>
+              <p14:cNvPr id="2" name="Ink 1">
+                <a:extLst>
+                  <a:ext uri="{FF2B5EF4-FFF2-40B4-BE49-F238E27FC236}">
+                    <a16:creationId xmlns:a16="http://schemas.microsoft.com/office/drawing/2014/main" id="{158C6875-F21B-F6EE-BC00-69F69F73889C}"/>
+                  </a:ext>
+                </a:extLst>
+              </p14:cNvPr>
+              <p14:cNvContentPartPr/>
+              <p14:nvPr/>
+            </p14:nvContentPartPr>
+            <p14:xfrm>
+              <a:off x="1231920" y="1758960"/>
+              <a:ext cx="9785520" cy="4439520"/>
+            </p14:xfrm>
+          </p:contentPart>
+        </mc:Choice>
+        <mc:Fallback>
+          <p:pic>
+            <p:nvPicPr>
+              <p:cNvPr id="2" name="Ink 1">
+                <a:extLst>
+                  <a:ext uri="{FF2B5EF4-FFF2-40B4-BE49-F238E27FC236}">
+                    <a16:creationId xmlns:a16="http://schemas.microsoft.com/office/drawing/2014/main" id="{158C6875-F21B-F6EE-BC00-69F69F73889C}"/>
+                  </a:ext>
+                </a:extLst>
+              </p:cNvPr>
+              <p:cNvPicPr/>
+              <p:nvPr/>
+            </p:nvPicPr>
+            <p:blipFill>
+              <a:blip r:embed="rId3"/>
+              <a:stretch>
+                <a:fillRect/>
+              </a:stretch>
+            </p:blipFill>
+            <p:spPr>
+              <a:xfrm>
+                <a:off x="1222560" y="1749600"/>
+                <a:ext cx="9804240" cy="4458240"/>
+              </a:xfrm>
+              <a:prstGeom prst="rect">
+                <a:avLst/>
+              </a:prstGeom>
+            </p:spPr>
+          </p:pic>
+        </mc:Fallback>
+      </mc:AlternateContent>
     </p:spTree>
     <p:extLst>
       <p:ext uri="{BB962C8B-B14F-4D97-AF65-F5344CB8AC3E}">
@@ -23654,6 +24104,57 @@
           </a:p>
         </p:txBody>
       </p:sp>
+      <mc:AlternateContent xmlns:mc="http://schemas.openxmlformats.org/markup-compatibility/2006">
+        <mc:Choice xmlns:p14="http://schemas.microsoft.com/office/powerpoint/2010/main" Requires="p14">
+          <p:contentPart p14:bwMode="auto" r:id="rId2">
+            <p14:nvContentPartPr>
+              <p14:cNvPr id="3" name="Ink 2">
+                <a:extLst>
+                  <a:ext uri="{FF2B5EF4-FFF2-40B4-BE49-F238E27FC236}">
+                    <a16:creationId xmlns:a16="http://schemas.microsoft.com/office/drawing/2014/main" id="{9647195D-3C2B-D692-3305-B4714B1CCA13}"/>
+                  </a:ext>
+                </a:extLst>
+              </p14:cNvPr>
+              <p14:cNvContentPartPr/>
+              <p14:nvPr/>
+            </p14:nvContentPartPr>
+            <p14:xfrm>
+              <a:off x="1219320" y="2831760"/>
+              <a:ext cx="2718000" cy="1334160"/>
+            </p14:xfrm>
+          </p:contentPart>
+        </mc:Choice>
+        <mc:Fallback>
+          <p:pic>
+            <p:nvPicPr>
+              <p:cNvPr id="3" name="Ink 2">
+                <a:extLst>
+                  <a:ext uri="{FF2B5EF4-FFF2-40B4-BE49-F238E27FC236}">
+                    <a16:creationId xmlns:a16="http://schemas.microsoft.com/office/drawing/2014/main" id="{9647195D-3C2B-D692-3305-B4714B1CCA13}"/>
+                  </a:ext>
+                </a:extLst>
+              </p:cNvPr>
+              <p:cNvPicPr/>
+              <p:nvPr/>
+            </p:nvPicPr>
+            <p:blipFill>
+              <a:blip r:embed="rId3"/>
+              <a:stretch>
+                <a:fillRect/>
+              </a:stretch>
+            </p:blipFill>
+            <p:spPr>
+              <a:xfrm>
+                <a:off x="1209960" y="2822400"/>
+                <a:ext cx="2736720" cy="1352880"/>
+              </a:xfrm>
+              <a:prstGeom prst="rect">
+                <a:avLst/>
+              </a:prstGeom>
+            </p:spPr>
+          </p:pic>
+        </mc:Fallback>
+      </mc:AlternateContent>
     </p:spTree>
     <p:extLst>
       <p:ext uri="{BB962C8B-B14F-4D97-AF65-F5344CB8AC3E}">
@@ -24167,6 +24668,57 @@
           </a:fontRef>
         </p:style>
       </p:cxnSp>
+      <mc:AlternateContent xmlns:mc="http://schemas.openxmlformats.org/markup-compatibility/2006">
+        <mc:Choice xmlns:p14="http://schemas.microsoft.com/office/powerpoint/2010/main" Requires="p14">
+          <p:contentPart p14:bwMode="auto" r:id="rId2">
+            <p14:nvContentPartPr>
+              <p14:cNvPr id="6" name="Ink 5">
+                <a:extLst>
+                  <a:ext uri="{FF2B5EF4-FFF2-40B4-BE49-F238E27FC236}">
+                    <a16:creationId xmlns:a16="http://schemas.microsoft.com/office/drawing/2014/main" id="{743EA98C-A8FA-DB9F-8D63-D2E3432A5F4F}"/>
+                  </a:ext>
+                </a:extLst>
+              </p14:cNvPr>
+              <p14:cNvContentPartPr/>
+              <p14:nvPr/>
+            </p14:nvContentPartPr>
+            <p14:xfrm>
+              <a:off x="2330280" y="3378240"/>
+              <a:ext cx="546480" cy="248040"/>
+            </p14:xfrm>
+          </p:contentPart>
+        </mc:Choice>
+        <mc:Fallback>
+          <p:pic>
+            <p:nvPicPr>
+              <p:cNvPr id="6" name="Ink 5">
+                <a:extLst>
+                  <a:ext uri="{FF2B5EF4-FFF2-40B4-BE49-F238E27FC236}">
+                    <a16:creationId xmlns:a16="http://schemas.microsoft.com/office/drawing/2014/main" id="{743EA98C-A8FA-DB9F-8D63-D2E3432A5F4F}"/>
+                  </a:ext>
+                </a:extLst>
+              </p:cNvPr>
+              <p:cNvPicPr/>
+              <p:nvPr/>
+            </p:nvPicPr>
+            <p:blipFill>
+              <a:blip r:embed="rId3"/>
+              <a:stretch>
+                <a:fillRect/>
+              </a:stretch>
+            </p:blipFill>
+            <p:spPr>
+              <a:xfrm>
+                <a:off x="2320920" y="3368880"/>
+                <a:ext cx="565200" cy="266760"/>
+              </a:xfrm>
+              <a:prstGeom prst="rect">
+                <a:avLst/>
+              </a:prstGeom>
+            </p:spPr>
+          </p:pic>
+        </mc:Fallback>
+      </mc:AlternateContent>
     </p:spTree>
     <p:extLst>
       <p:ext uri="{BB962C8B-B14F-4D97-AF65-F5344CB8AC3E}">
@@ -25033,6 +25585,57 @@
           </a:p>
         </p:txBody>
       </p:sp>
+      <mc:AlternateContent xmlns:mc="http://schemas.openxmlformats.org/markup-compatibility/2006">
+        <mc:Choice xmlns:p14="http://schemas.microsoft.com/office/powerpoint/2010/main" Requires="p14">
+          <p:contentPart p14:bwMode="auto" r:id="rId2">
+            <p14:nvContentPartPr>
+              <p14:cNvPr id="2" name="Ink 1">
+                <a:extLst>
+                  <a:ext uri="{FF2B5EF4-FFF2-40B4-BE49-F238E27FC236}">
+                    <a16:creationId xmlns:a16="http://schemas.microsoft.com/office/drawing/2014/main" id="{FD6FDE8A-869D-C113-8C06-8B6E28C9AE5A}"/>
+                  </a:ext>
+                </a:extLst>
+              </p14:cNvPr>
+              <p14:cNvContentPartPr/>
+              <p14:nvPr/>
+            </p14:nvContentPartPr>
+            <p14:xfrm>
+              <a:off x="1993680" y="2521080"/>
+              <a:ext cx="4464720" cy="1759320"/>
+            </p14:xfrm>
+          </p:contentPart>
+        </mc:Choice>
+        <mc:Fallback>
+          <p:pic>
+            <p:nvPicPr>
+              <p:cNvPr id="2" name="Ink 1">
+                <a:extLst>
+                  <a:ext uri="{FF2B5EF4-FFF2-40B4-BE49-F238E27FC236}">
+                    <a16:creationId xmlns:a16="http://schemas.microsoft.com/office/drawing/2014/main" id="{FD6FDE8A-869D-C113-8C06-8B6E28C9AE5A}"/>
+                  </a:ext>
+                </a:extLst>
+              </p:cNvPr>
+              <p:cNvPicPr/>
+              <p:nvPr/>
+            </p:nvPicPr>
+            <p:blipFill>
+              <a:blip r:embed="rId3"/>
+              <a:stretch>
+                <a:fillRect/>
+              </a:stretch>
+            </p:blipFill>
+            <p:spPr>
+              <a:xfrm>
+                <a:off x="1984320" y="2511720"/>
+                <a:ext cx="4483440" cy="1778040"/>
+              </a:xfrm>
+              <a:prstGeom prst="rect">
+                <a:avLst/>
+              </a:prstGeom>
+            </p:spPr>
+          </p:pic>
+        </mc:Fallback>
+      </mc:AlternateContent>
     </p:spTree>
     <p:extLst>
       <p:ext uri="{BB962C8B-B14F-4D97-AF65-F5344CB8AC3E}">
@@ -26167,6 +26770,57 @@
           </a:fontRef>
         </p:style>
       </p:cxnSp>
+      <mc:AlternateContent xmlns:mc="http://schemas.openxmlformats.org/markup-compatibility/2006">
+        <mc:Choice xmlns:p14="http://schemas.microsoft.com/office/powerpoint/2010/main" Requires="p14">
+          <p:contentPart p14:bwMode="auto" r:id="rId2">
+            <p14:nvContentPartPr>
+              <p14:cNvPr id="9" name="Ink 8">
+                <a:extLst>
+                  <a:ext uri="{FF2B5EF4-FFF2-40B4-BE49-F238E27FC236}">
+                    <a16:creationId xmlns:a16="http://schemas.microsoft.com/office/drawing/2014/main" id="{48E50C94-2E1E-9455-1F1C-5A502239909D}"/>
+                  </a:ext>
+                </a:extLst>
+              </p14:cNvPr>
+              <p14:cNvContentPartPr/>
+              <p14:nvPr/>
+            </p14:nvContentPartPr>
+            <p14:xfrm>
+              <a:off x="1346040" y="2965320"/>
+              <a:ext cx="1588680" cy="1149840"/>
+            </p14:xfrm>
+          </p:contentPart>
+        </mc:Choice>
+        <mc:Fallback>
+          <p:pic>
+            <p:nvPicPr>
+              <p:cNvPr id="9" name="Ink 8">
+                <a:extLst>
+                  <a:ext uri="{FF2B5EF4-FFF2-40B4-BE49-F238E27FC236}">
+                    <a16:creationId xmlns:a16="http://schemas.microsoft.com/office/drawing/2014/main" id="{48E50C94-2E1E-9455-1F1C-5A502239909D}"/>
+                  </a:ext>
+                </a:extLst>
+              </p:cNvPr>
+              <p:cNvPicPr/>
+              <p:nvPr/>
+            </p:nvPicPr>
+            <p:blipFill>
+              <a:blip r:embed="rId3"/>
+              <a:stretch>
+                <a:fillRect/>
+              </a:stretch>
+            </p:blipFill>
+            <p:spPr>
+              <a:xfrm>
+                <a:off x="1336680" y="2955960"/>
+                <a:ext cx="1607400" cy="1168560"/>
+              </a:xfrm>
+              <a:prstGeom prst="rect">
+                <a:avLst/>
+              </a:prstGeom>
+            </p:spPr>
+          </p:pic>
+        </mc:Fallback>
+      </mc:AlternateContent>
     </p:spTree>
     <p:extLst>
       <p:ext uri="{BB962C8B-B14F-4D97-AF65-F5344CB8AC3E}">
@@ -27566,6 +28220,57 @@
           </a:p>
         </p:txBody>
       </p:sp>
+      <mc:AlternateContent xmlns:mc="http://schemas.openxmlformats.org/markup-compatibility/2006">
+        <mc:Choice xmlns:p14="http://schemas.microsoft.com/office/powerpoint/2010/main" Requires="p14">
+          <p:contentPart p14:bwMode="auto" r:id="rId2">
+            <p14:nvContentPartPr>
+              <p14:cNvPr id="3" name="Ink 2">
+                <a:extLst>
+                  <a:ext uri="{FF2B5EF4-FFF2-40B4-BE49-F238E27FC236}">
+                    <a16:creationId xmlns:a16="http://schemas.microsoft.com/office/drawing/2014/main" id="{B79E35DA-0F52-F1C1-C037-0F49E15B327C}"/>
+                  </a:ext>
+                </a:extLst>
+              </p14:cNvPr>
+              <p14:cNvContentPartPr/>
+              <p14:nvPr/>
+            </p14:nvContentPartPr>
+            <p14:xfrm>
+              <a:off x="2070000" y="787320"/>
+              <a:ext cx="9335520" cy="4762800"/>
+            </p14:xfrm>
+          </p:contentPart>
+        </mc:Choice>
+        <mc:Fallback>
+          <p:pic>
+            <p:nvPicPr>
+              <p:cNvPr id="3" name="Ink 2">
+                <a:extLst>
+                  <a:ext uri="{FF2B5EF4-FFF2-40B4-BE49-F238E27FC236}">
+                    <a16:creationId xmlns:a16="http://schemas.microsoft.com/office/drawing/2014/main" id="{B79E35DA-0F52-F1C1-C037-0F49E15B327C}"/>
+                  </a:ext>
+                </a:extLst>
+              </p:cNvPr>
+              <p:cNvPicPr/>
+              <p:nvPr/>
+            </p:nvPicPr>
+            <p:blipFill>
+              <a:blip r:embed="rId3"/>
+              <a:stretch>
+                <a:fillRect/>
+              </a:stretch>
+            </p:blipFill>
+            <p:spPr>
+              <a:xfrm>
+                <a:off x="2060640" y="777960"/>
+                <a:ext cx="9354240" cy="4781520"/>
+              </a:xfrm>
+              <a:prstGeom prst="rect">
+                <a:avLst/>
+              </a:prstGeom>
+            </p:spPr>
+          </p:pic>
+        </mc:Fallback>
+      </mc:AlternateContent>
     </p:spTree>
     <p:extLst>
       <p:ext uri="{BB962C8B-B14F-4D97-AF65-F5344CB8AC3E}">
@@ -28227,6 +28932,57 @@
           </a:fontRef>
         </p:style>
       </p:cxnSp>
+      <mc:AlternateContent xmlns:mc="http://schemas.openxmlformats.org/markup-compatibility/2006">
+        <mc:Choice xmlns:p14="http://schemas.microsoft.com/office/powerpoint/2010/main" Requires="p14">
+          <p:contentPart p14:bwMode="auto" r:id="rId2">
+            <p14:nvContentPartPr>
+              <p14:cNvPr id="2" name="Ink 1">
+                <a:extLst>
+                  <a:ext uri="{FF2B5EF4-FFF2-40B4-BE49-F238E27FC236}">
+                    <a16:creationId xmlns:a16="http://schemas.microsoft.com/office/drawing/2014/main" id="{20FB4869-66C2-BC1C-CF4B-044896FE3AEA}"/>
+                  </a:ext>
+                </a:extLst>
+              </p14:cNvPr>
+              <p14:cNvContentPartPr/>
+              <p14:nvPr/>
+            </p14:nvContentPartPr>
+            <p14:xfrm>
+              <a:off x="1333440" y="2856960"/>
+              <a:ext cx="3924720" cy="496080"/>
+            </p14:xfrm>
+          </p:contentPart>
+        </mc:Choice>
+        <mc:Fallback>
+          <p:pic>
+            <p:nvPicPr>
+              <p:cNvPr id="2" name="Ink 1">
+                <a:extLst>
+                  <a:ext uri="{FF2B5EF4-FFF2-40B4-BE49-F238E27FC236}">
+                    <a16:creationId xmlns:a16="http://schemas.microsoft.com/office/drawing/2014/main" id="{20FB4869-66C2-BC1C-CF4B-044896FE3AEA}"/>
+                  </a:ext>
+                </a:extLst>
+              </p:cNvPr>
+              <p:cNvPicPr/>
+              <p:nvPr/>
+            </p:nvPicPr>
+            <p:blipFill>
+              <a:blip r:embed="rId3"/>
+              <a:stretch>
+                <a:fillRect/>
+              </a:stretch>
+            </p:blipFill>
+            <p:spPr>
+              <a:xfrm>
+                <a:off x="1324080" y="2847600"/>
+                <a:ext cx="3943440" cy="514800"/>
+              </a:xfrm>
+              <a:prstGeom prst="rect">
+                <a:avLst/>
+              </a:prstGeom>
+            </p:spPr>
+          </p:pic>
+        </mc:Fallback>
+      </mc:AlternateContent>
     </p:spTree>
     <p:extLst>
       <p:ext uri="{BB962C8B-B14F-4D97-AF65-F5344CB8AC3E}">

</xml_diff>